<commit_message>
Added new bundled figures
</commit_message>
<xml_diff>
--- a/Notes/TFM_presentations/2020_02_24_v2/2020_02_24_v2.pptx
+++ b/Notes/TFM_presentations/2020_02_24_v2/2020_02_24_v2.pptx
@@ -5,7 +5,7 @@
     <p:sldMasterId id="2147483648" r:id="rId1"/>
   </p:sldMasterIdLst>
   <p:notesMasterIdLst>
-    <p:notesMasterId r:id="rId8"/>
+    <p:notesMasterId r:id="rId12"/>
   </p:notesMasterIdLst>
   <p:sldIdLst>
     <p:sldId id="256" r:id="rId2"/>
@@ -14,6 +14,10 @@
     <p:sldId id="259" r:id="rId5"/>
     <p:sldId id="260" r:id="rId6"/>
     <p:sldId id="261" r:id="rId7"/>
+    <p:sldId id="262" r:id="rId8"/>
+    <p:sldId id="263" r:id="rId9"/>
+    <p:sldId id="264" r:id="rId10"/>
+    <p:sldId id="265" r:id="rId11"/>
   </p:sldIdLst>
   <p:sldSz cx="12192000" cy="6858000"/>
   <p:notesSz cx="6858000" cy="9144000"/>
@@ -169,7 +173,7 @@
             </a:lvl1pPr>
           </a:lstStyle>
           <a:p>
-            <a:endParaRPr lang="en-GB"/>
+            <a:endParaRPr lang="en-GB" dirty="0"/>
           </a:p>
         </p:txBody>
       </p:sp>
@@ -204,7 +208,7 @@
               <a:rPr lang="en-GB" smtClean="0"/>
               <a:t>18/02/2020</a:t>
             </a:fld>
-            <a:endParaRPr lang="en-GB"/>
+            <a:endParaRPr lang="en-GB" dirty="0"/>
           </a:p>
         </p:txBody>
       </p:sp>
@@ -237,7 +241,7 @@
           <a:bodyPr vert="horz" lIns="91440" tIns="45720" rIns="91440" bIns="45720" rtlCol="0" anchor="ctr"/>
           <a:lstStyle/>
           <a:p>
-            <a:endParaRPr lang="en-GB"/>
+            <a:endParaRPr lang="en-GB" dirty="0"/>
           </a:p>
         </p:txBody>
       </p:sp>
@@ -328,7 +332,7 @@
             </a:lvl1pPr>
           </a:lstStyle>
           <a:p>
-            <a:endParaRPr lang="en-GB"/>
+            <a:endParaRPr lang="en-GB" dirty="0"/>
           </a:p>
         </p:txBody>
       </p:sp>
@@ -363,7 +367,7 @@
               <a:rPr lang="en-GB" smtClean="0"/>
               <a:t>‹#›</a:t>
             </a:fld>
-            <a:endParaRPr lang="en-GB"/>
+            <a:endParaRPr lang="en-GB" dirty="0"/>
           </a:p>
         </p:txBody>
       </p:sp>
@@ -629,7 +633,7 @@
               <a:rPr lang="en-GB" smtClean="0"/>
               <a:t>18/02/2020</a:t>
             </a:fld>
-            <a:endParaRPr lang="en-GB"/>
+            <a:endParaRPr lang="en-GB" dirty="0"/>
           </a:p>
         </p:txBody>
       </p:sp>
@@ -662,7 +666,7 @@
             </a:lvl1pPr>
           </a:lstStyle>
           <a:p>
-            <a:endParaRPr lang="en-GB"/>
+            <a:endParaRPr lang="en-GB" dirty="0"/>
           </a:p>
         </p:txBody>
       </p:sp>
@@ -700,7 +704,7 @@
               <a:pPr/>
               <a:t>‹#›</a:t>
             </a:fld>
-            <a:endParaRPr lang="en-GB"/>
+            <a:endParaRPr lang="en-GB" dirty="0"/>
           </a:p>
         </p:txBody>
       </p:sp>
@@ -846,7 +850,7 @@
               <a:rPr lang="en-GB" smtClean="0"/>
               <a:t>18/02/2020</a:t>
             </a:fld>
-            <a:endParaRPr lang="en-GB"/>
+            <a:endParaRPr lang="en-GB" dirty="0"/>
           </a:p>
         </p:txBody>
       </p:sp>
@@ -871,7 +875,7 @@
           <a:bodyPr/>
           <a:lstStyle/>
           <a:p>
-            <a:endParaRPr lang="en-GB"/>
+            <a:endParaRPr lang="en-GB" dirty="0"/>
           </a:p>
         </p:txBody>
       </p:sp>
@@ -900,7 +904,7 @@
               <a:rPr lang="en-GB" smtClean="0"/>
               <a:t>‹#›</a:t>
             </a:fld>
-            <a:endParaRPr lang="en-GB"/>
+            <a:endParaRPr lang="en-GB" dirty="0"/>
           </a:p>
         </p:txBody>
       </p:sp>
@@ -1056,7 +1060,7 @@
               <a:rPr lang="en-GB" smtClean="0"/>
               <a:t>18/02/2020</a:t>
             </a:fld>
-            <a:endParaRPr lang="en-GB"/>
+            <a:endParaRPr lang="en-GB" dirty="0"/>
           </a:p>
         </p:txBody>
       </p:sp>
@@ -1081,7 +1085,7 @@
           <a:bodyPr/>
           <a:lstStyle/>
           <a:p>
-            <a:endParaRPr lang="en-GB"/>
+            <a:endParaRPr lang="en-GB" dirty="0"/>
           </a:p>
         </p:txBody>
       </p:sp>
@@ -1110,7 +1114,7 @@
               <a:rPr lang="en-GB" smtClean="0"/>
               <a:t>‹#›</a:t>
             </a:fld>
-            <a:endParaRPr lang="en-GB"/>
+            <a:endParaRPr lang="en-GB" dirty="0"/>
           </a:p>
         </p:txBody>
       </p:sp>
@@ -1256,7 +1260,7 @@
               <a:rPr lang="en-GB" smtClean="0"/>
               <a:t>18/02/2020</a:t>
             </a:fld>
-            <a:endParaRPr lang="en-GB"/>
+            <a:endParaRPr lang="en-GB" dirty="0"/>
           </a:p>
         </p:txBody>
       </p:sp>
@@ -1281,7 +1285,7 @@
           <a:bodyPr/>
           <a:lstStyle/>
           <a:p>
-            <a:endParaRPr lang="en-GB"/>
+            <a:endParaRPr lang="en-GB" dirty="0"/>
           </a:p>
         </p:txBody>
       </p:sp>
@@ -1310,7 +1314,7 @@
               <a:rPr lang="en-GB" smtClean="0"/>
               <a:t>‹#›</a:t>
             </a:fld>
-            <a:endParaRPr lang="en-GB"/>
+            <a:endParaRPr lang="en-GB" dirty="0"/>
           </a:p>
         </p:txBody>
       </p:sp>
@@ -1532,7 +1536,7 @@
               <a:rPr lang="en-GB" smtClean="0"/>
               <a:t>18/02/2020</a:t>
             </a:fld>
-            <a:endParaRPr lang="en-GB"/>
+            <a:endParaRPr lang="en-GB" dirty="0"/>
           </a:p>
         </p:txBody>
       </p:sp>
@@ -1557,7 +1561,7 @@
           <a:bodyPr/>
           <a:lstStyle/>
           <a:p>
-            <a:endParaRPr lang="en-GB"/>
+            <a:endParaRPr lang="en-GB" dirty="0"/>
           </a:p>
         </p:txBody>
       </p:sp>
@@ -1586,7 +1590,7 @@
               <a:rPr lang="en-GB" smtClean="0"/>
               <a:t>‹#›</a:t>
             </a:fld>
-            <a:endParaRPr lang="en-GB"/>
+            <a:endParaRPr lang="en-GB" dirty="0"/>
           </a:p>
         </p:txBody>
       </p:sp>
@@ -1800,7 +1804,7 @@
               <a:rPr lang="en-GB" smtClean="0"/>
               <a:t>18/02/2020</a:t>
             </a:fld>
-            <a:endParaRPr lang="en-GB"/>
+            <a:endParaRPr lang="en-GB" dirty="0"/>
           </a:p>
         </p:txBody>
       </p:sp>
@@ -1825,7 +1829,7 @@
           <a:bodyPr/>
           <a:lstStyle/>
           <a:p>
-            <a:endParaRPr lang="en-GB"/>
+            <a:endParaRPr lang="en-GB" dirty="0"/>
           </a:p>
         </p:txBody>
       </p:sp>
@@ -1854,7 +1858,7 @@
               <a:rPr lang="en-GB" smtClean="0"/>
               <a:t>‹#›</a:t>
             </a:fld>
-            <a:endParaRPr lang="en-GB"/>
+            <a:endParaRPr lang="en-GB" dirty="0"/>
           </a:p>
         </p:txBody>
       </p:sp>
@@ -2215,7 +2219,7 @@
               <a:rPr lang="en-GB" smtClean="0"/>
               <a:t>18/02/2020</a:t>
             </a:fld>
-            <a:endParaRPr lang="en-GB"/>
+            <a:endParaRPr lang="en-GB" dirty="0"/>
           </a:p>
         </p:txBody>
       </p:sp>
@@ -2240,7 +2244,7 @@
           <a:bodyPr/>
           <a:lstStyle/>
           <a:p>
-            <a:endParaRPr lang="en-GB"/>
+            <a:endParaRPr lang="en-GB" dirty="0"/>
           </a:p>
         </p:txBody>
       </p:sp>
@@ -2269,7 +2273,7 @@
               <a:rPr lang="en-GB" smtClean="0"/>
               <a:t>‹#›</a:t>
             </a:fld>
-            <a:endParaRPr lang="en-GB"/>
+            <a:endParaRPr lang="en-GB" dirty="0"/>
           </a:p>
         </p:txBody>
       </p:sp>
@@ -2357,7 +2361,7 @@
               <a:rPr lang="en-GB" smtClean="0"/>
               <a:t>18/02/2020</a:t>
             </a:fld>
-            <a:endParaRPr lang="en-GB"/>
+            <a:endParaRPr lang="en-GB" dirty="0"/>
           </a:p>
         </p:txBody>
       </p:sp>
@@ -2382,7 +2386,7 @@
           <a:bodyPr/>
           <a:lstStyle/>
           <a:p>
-            <a:endParaRPr lang="en-GB"/>
+            <a:endParaRPr lang="en-GB" dirty="0"/>
           </a:p>
         </p:txBody>
       </p:sp>
@@ -2411,7 +2415,7 @@
               <a:rPr lang="en-GB" smtClean="0"/>
               <a:t>‹#›</a:t>
             </a:fld>
-            <a:endParaRPr lang="en-GB"/>
+            <a:endParaRPr lang="en-GB" dirty="0"/>
           </a:p>
         </p:txBody>
       </p:sp>
@@ -2470,7 +2474,7 @@
               <a:rPr lang="en-GB" smtClean="0"/>
               <a:t>18/02/2020</a:t>
             </a:fld>
-            <a:endParaRPr lang="en-GB"/>
+            <a:endParaRPr lang="en-GB" dirty="0"/>
           </a:p>
         </p:txBody>
       </p:sp>
@@ -2495,7 +2499,7 @@
           <a:bodyPr/>
           <a:lstStyle/>
           <a:p>
-            <a:endParaRPr lang="en-GB"/>
+            <a:endParaRPr lang="en-GB" dirty="0"/>
           </a:p>
         </p:txBody>
       </p:sp>
@@ -2524,7 +2528,7 @@
               <a:rPr lang="en-GB" smtClean="0"/>
               <a:t>‹#›</a:t>
             </a:fld>
-            <a:endParaRPr lang="en-GB"/>
+            <a:endParaRPr lang="en-GB" dirty="0"/>
           </a:p>
         </p:txBody>
       </p:sp>
@@ -2783,7 +2787,7 @@
               <a:rPr lang="en-GB" smtClean="0"/>
               <a:t>18/02/2020</a:t>
             </a:fld>
-            <a:endParaRPr lang="en-GB"/>
+            <a:endParaRPr lang="en-GB" dirty="0"/>
           </a:p>
         </p:txBody>
       </p:sp>
@@ -2808,7 +2812,7 @@
           <a:bodyPr/>
           <a:lstStyle/>
           <a:p>
-            <a:endParaRPr lang="en-GB"/>
+            <a:endParaRPr lang="en-GB" dirty="0"/>
           </a:p>
         </p:txBody>
       </p:sp>
@@ -2837,7 +2841,7 @@
               <a:rPr lang="en-GB" smtClean="0"/>
               <a:t>‹#›</a:t>
             </a:fld>
-            <a:endParaRPr lang="en-GB"/>
+            <a:endParaRPr lang="en-GB" dirty="0"/>
           </a:p>
         </p:txBody>
       </p:sp>
@@ -2973,10 +2977,10 @@
           </a:lstStyle>
           <a:p>
             <a:r>
-              <a:rPr lang="en-US"/>
+              <a:rPr lang="en-US" dirty="0"/>
               <a:t>Click icon to add picture</a:t>
             </a:r>
-            <a:endParaRPr lang="en-GB"/>
+            <a:endParaRPr lang="en-GB" dirty="0"/>
           </a:p>
         </p:txBody>
       </p:sp>
@@ -3076,7 +3080,7 @@
               <a:rPr lang="en-GB" smtClean="0"/>
               <a:t>18/02/2020</a:t>
             </a:fld>
-            <a:endParaRPr lang="en-GB"/>
+            <a:endParaRPr lang="en-GB" dirty="0"/>
           </a:p>
         </p:txBody>
       </p:sp>
@@ -3101,7 +3105,7 @@
           <a:bodyPr/>
           <a:lstStyle/>
           <a:p>
-            <a:endParaRPr lang="en-GB"/>
+            <a:endParaRPr lang="en-GB" dirty="0"/>
           </a:p>
         </p:txBody>
       </p:sp>
@@ -3130,7 +3134,7 @@
               <a:rPr lang="en-GB" smtClean="0"/>
               <a:t>‹#›</a:t>
             </a:fld>
-            <a:endParaRPr lang="en-GB"/>
+            <a:endParaRPr lang="en-GB" dirty="0"/>
           </a:p>
         </p:txBody>
       </p:sp>
@@ -3217,7 +3221,7 @@
           <a:lstStyle/>
           <a:p>
             <a:pPr algn="ctr"/>
-            <a:endParaRPr lang="en-GB">
+            <a:endParaRPr lang="en-GB" dirty="0">
               <a:solidFill>
                 <a:schemeClr val="bg1"/>
               </a:solidFill>
@@ -4805,6 +4809,411 @@
     <p:extLst>
       <p:ext uri="{BB962C8B-B14F-4D97-AF65-F5344CB8AC3E}">
         <p14:creationId xmlns:p14="http://schemas.microsoft.com/office/powerpoint/2010/main" val="2297138732"/>
+      </p:ext>
+    </p:extLst>
+  </p:cSld>
+  <p:clrMapOvr>
+    <a:masterClrMapping/>
+  </p:clrMapOvr>
+</p:sld>
+</file>
+
+<file path=ppt/slides/slide10.xml><?xml version="1.0" encoding="utf-8"?>
+<p:sld xmlns:a="http://schemas.openxmlformats.org/drawingml/2006/main" xmlns:r="http://schemas.openxmlformats.org/officeDocument/2006/relationships" xmlns:p="http://schemas.openxmlformats.org/presentationml/2006/main">
+  <p:cSld>
+    <p:spTree>
+      <p:nvGrpSpPr>
+        <p:cNvPr id="1" name=""/>
+        <p:cNvGrpSpPr/>
+        <p:nvPr/>
+      </p:nvGrpSpPr>
+      <p:grpSpPr>
+        <a:xfrm>
+          <a:off x="0" y="0"/>
+          <a:ext cx="0" cy="0"/>
+          <a:chOff x="0" y="0"/>
+          <a:chExt cx="0" cy="0"/>
+        </a:xfrm>
+      </p:grpSpPr>
+      <p:sp>
+        <p:nvSpPr>
+          <p:cNvPr id="2" name="Title 1">
+            <a:extLst>
+              <a:ext uri="{FF2B5EF4-FFF2-40B4-BE49-F238E27FC236}">
+                <a16:creationId xmlns:a16="http://schemas.microsoft.com/office/drawing/2014/main" id="{EE4C1511-9365-4A7D-80BF-399D510B97D3}"/>
+              </a:ext>
+            </a:extLst>
+          </p:cNvPr>
+          <p:cNvSpPr>
+            <a:spLocks noGrp="1"/>
+          </p:cNvSpPr>
+          <p:nvPr>
+            <p:ph type="title"/>
+          </p:nvPr>
+        </p:nvSpPr>
+        <p:spPr/>
+        <p:txBody>
+          <a:bodyPr/>
+          <a:lstStyle/>
+          <a:p>
+            <a:r>
+              <a:rPr lang="en-150" dirty="0"/>
+              <a:t>S</a:t>
+            </a:r>
+            <a:r>
+              <a:rPr lang="en-GB" dirty="0"/>
+              <a:t>u</a:t>
+            </a:r>
+            <a:r>
+              <a:rPr lang="en-150" dirty="0"/>
+              <a:t>m</a:t>
+            </a:r>
+            <a:r>
+              <a:rPr lang="en-GB" dirty="0"/>
+              <a:t>m</a:t>
+            </a:r>
+            <a:r>
+              <a:rPr lang="en-150" dirty="0"/>
+              <a:t>a</a:t>
+            </a:r>
+            <a:r>
+              <a:rPr lang="en-GB" dirty="0"/>
+              <a:t>r</a:t>
+            </a:r>
+            <a:r>
+              <a:rPr lang="en-150" dirty="0"/>
+              <a:t>i</a:t>
+            </a:r>
+            <a:r>
+              <a:rPr lang="en-GB" dirty="0"/>
+              <a:t>z</a:t>
+            </a:r>
+            <a:r>
+              <a:rPr lang="en-150" dirty="0"/>
+              <a:t>i</a:t>
+            </a:r>
+            <a:r>
+              <a:rPr lang="en-GB" dirty="0"/>
+              <a:t>n</a:t>
+            </a:r>
+            <a:r>
+              <a:rPr lang="en-150" dirty="0"/>
+              <a:t>g</a:t>
+            </a:r>
+            <a:endParaRPr lang="en-GB" dirty="0"/>
+          </a:p>
+        </p:txBody>
+      </p:sp>
+      <p:sp>
+        <p:nvSpPr>
+          <p:cNvPr id="4" name="Content Placeholder 3">
+            <a:extLst>
+              <a:ext uri="{FF2B5EF4-FFF2-40B4-BE49-F238E27FC236}">
+                <a16:creationId xmlns:a16="http://schemas.microsoft.com/office/drawing/2014/main" id="{BAB64231-F9F9-4019-AF12-1BDB268D5308}"/>
+              </a:ext>
+            </a:extLst>
+          </p:cNvPr>
+          <p:cNvSpPr>
+            <a:spLocks noGrp="1"/>
+          </p:cNvSpPr>
+          <p:nvPr>
+            <p:ph idx="1"/>
+          </p:nvPr>
+        </p:nvSpPr>
+        <p:spPr/>
+        <p:txBody>
+          <a:bodyPr/>
+          <a:lstStyle/>
+          <a:p>
+            <a:r>
+              <a:rPr lang="en-150" dirty="0"/>
+              <a:t>Rigid gang reserves the whole block</a:t>
+            </a:r>
+          </a:p>
+          <a:p>
+            <a:r>
+              <a:rPr lang="en-150" dirty="0"/>
+              <a:t>Bundled creates multiple rigid blocks w</a:t>
+            </a:r>
+            <a:r>
+              <a:rPr lang="en-GB" dirty="0"/>
+              <a:t>i</a:t>
+            </a:r>
+            <a:r>
+              <a:rPr lang="en-150" dirty="0"/>
+              <a:t>t</a:t>
+            </a:r>
+            <a:r>
+              <a:rPr lang="en-GB" dirty="0"/>
+              <a:t>h</a:t>
+            </a:r>
+            <a:r>
+              <a:rPr lang="en-150" dirty="0"/>
+              <a:t> </a:t>
+            </a:r>
+            <a:r>
+              <a:rPr lang="en-GB" dirty="0"/>
+              <a:t>d</a:t>
+            </a:r>
+            <a:r>
+              <a:rPr lang="en-150" dirty="0"/>
+              <a:t>e</a:t>
+            </a:r>
+            <a:r>
+              <a:rPr lang="en-GB" dirty="0"/>
+              <a:t>p</a:t>
+            </a:r>
+            <a:r>
+              <a:rPr lang="en-150" dirty="0"/>
+              <a:t>e</a:t>
+            </a:r>
+            <a:r>
+              <a:rPr lang="en-GB" dirty="0"/>
+              <a:t>n</a:t>
+            </a:r>
+            <a:r>
+              <a:rPr lang="en-150" dirty="0"/>
+              <a:t>c</a:t>
+            </a:r>
+            <a:r>
+              <a:rPr lang="en-GB" dirty="0"/>
+              <a:t>e</a:t>
+            </a:r>
+            <a:r>
+              <a:rPr lang="en-150" dirty="0"/>
+              <a:t>n</a:t>
+            </a:r>
+            <a:r>
+              <a:rPr lang="en-GB" dirty="0"/>
+              <a:t>c</a:t>
+            </a:r>
+            <a:r>
+              <a:rPr lang="en-150" dirty="0"/>
+              <a:t>i</a:t>
+            </a:r>
+            <a:r>
+              <a:rPr lang="en-GB" dirty="0"/>
+              <a:t>e</a:t>
+            </a:r>
+            <a:r>
+              <a:rPr lang="en-150" dirty="0"/>
+              <a:t>s</a:t>
+            </a:r>
+          </a:p>
+          <a:p>
+            <a:r>
+              <a:rPr lang="en-150" dirty="0"/>
+              <a:t>L</a:t>
+            </a:r>
+            <a:r>
+              <a:rPr lang="en-GB" dirty="0"/>
+              <a:t>i</a:t>
+            </a:r>
+            <a:r>
+              <a:rPr lang="en-150" dirty="0"/>
+              <a:t>m</a:t>
+            </a:r>
+            <a:r>
+              <a:rPr lang="en-GB" dirty="0"/>
+              <a:t>i</a:t>
+            </a:r>
+            <a:r>
+              <a:rPr lang="en-150" dirty="0"/>
+              <a:t>t</a:t>
+            </a:r>
+            <a:r>
+              <a:rPr lang="en-GB" dirty="0"/>
+              <a:t>e</a:t>
+            </a:r>
+            <a:r>
+              <a:rPr lang="en-150" dirty="0"/>
+              <a:t>d-</a:t>
+            </a:r>
+            <a:r>
+              <a:rPr lang="en-GB" dirty="0"/>
+              <a:t>P</a:t>
+            </a:r>
+            <a:r>
+              <a:rPr lang="en-150" dirty="0"/>
+              <a:t>r</a:t>
+            </a:r>
+            <a:r>
+              <a:rPr lang="en-GB" dirty="0"/>
+              <a:t>e</a:t>
+            </a:r>
+            <a:r>
+              <a:rPr lang="en-150" dirty="0"/>
+              <a:t>e</a:t>
+            </a:r>
+            <a:r>
+              <a:rPr lang="en-GB" dirty="0"/>
+              <a:t>m</a:t>
+            </a:r>
+            <a:r>
+              <a:rPr lang="en-150" dirty="0"/>
+              <a:t>p</a:t>
+            </a:r>
+            <a:r>
+              <a:rPr lang="en-GB" dirty="0"/>
+              <a:t>t</a:t>
+            </a:r>
+            <a:r>
+              <a:rPr lang="en-150" dirty="0"/>
+              <a:t>i</a:t>
+            </a:r>
+            <a:r>
+              <a:rPr lang="en-GB" dirty="0"/>
+              <a:t>v</a:t>
+            </a:r>
+            <a:r>
+              <a:rPr lang="en-150" dirty="0"/>
+              <a:t>e </a:t>
+            </a:r>
+            <a:r>
+              <a:rPr lang="en-GB" dirty="0"/>
+              <a:t>t</a:t>
+            </a:r>
+            <a:r>
+              <a:rPr lang="en-150" dirty="0"/>
+              <a:t>r</a:t>
+            </a:r>
+            <a:r>
+              <a:rPr lang="en-GB" dirty="0"/>
+              <a:t>i</a:t>
+            </a:r>
+            <a:r>
+              <a:rPr lang="en-150" dirty="0"/>
+              <a:t>e</a:t>
+            </a:r>
+            <a:r>
+              <a:rPr lang="en-GB" dirty="0"/>
+              <a:t>s</a:t>
+            </a:r>
+            <a:r>
+              <a:rPr lang="en-150" dirty="0"/>
+              <a:t> </a:t>
+            </a:r>
+            <a:r>
+              <a:rPr lang="en-GB" dirty="0"/>
+              <a:t>t</a:t>
+            </a:r>
+            <a:r>
+              <a:rPr lang="en-150" dirty="0"/>
+              <a:t>o </a:t>
+            </a:r>
+            <a:r>
+              <a:rPr lang="en-GB" dirty="0"/>
+              <a:t>s</a:t>
+            </a:r>
+            <a:r>
+              <a:rPr lang="en-150" dirty="0"/>
+              <a:t>c</a:t>
+            </a:r>
+            <a:r>
+              <a:rPr lang="en-GB" dirty="0"/>
+              <a:t>h</a:t>
+            </a:r>
+            <a:r>
+              <a:rPr lang="en-150" dirty="0"/>
+              <a:t>e</a:t>
+            </a:r>
+            <a:r>
+              <a:rPr lang="en-GB" dirty="0"/>
+              <a:t>d</a:t>
+            </a:r>
+            <a:r>
+              <a:rPr lang="en-150" dirty="0"/>
+              <a:t>u</a:t>
+            </a:r>
+            <a:r>
+              <a:rPr lang="en-GB" dirty="0"/>
+              <a:t>l</a:t>
+            </a:r>
+            <a:r>
+              <a:rPr lang="en-150" dirty="0"/>
+              <a:t>e these blocks in a moldable w</a:t>
+            </a:r>
+            <a:r>
+              <a:rPr lang="en-GB" dirty="0"/>
+              <a:t>a</a:t>
+            </a:r>
+            <a:r>
+              <a:rPr lang="en-150" dirty="0"/>
+              <a:t>y</a:t>
+            </a:r>
+            <a:endParaRPr lang="en-GB" dirty="0"/>
+          </a:p>
+        </p:txBody>
+      </p:sp>
+      <p:sp>
+        <p:nvSpPr>
+          <p:cNvPr id="3" name="Slide Number Placeholder 2">
+            <a:extLst>
+              <a:ext uri="{FF2B5EF4-FFF2-40B4-BE49-F238E27FC236}">
+                <a16:creationId xmlns:a16="http://schemas.microsoft.com/office/drawing/2014/main" id="{7552D5A4-DDCF-4A61-922F-712272E1E5A6}"/>
+              </a:ext>
+            </a:extLst>
+          </p:cNvPr>
+          <p:cNvSpPr>
+            <a:spLocks noGrp="1"/>
+          </p:cNvSpPr>
+          <p:nvPr>
+            <p:ph type="sldNum" sz="quarter" idx="12"/>
+          </p:nvPr>
+        </p:nvSpPr>
+        <p:spPr/>
+        <p:txBody>
+          <a:bodyPr/>
+          <a:lstStyle/>
+          <a:p>
+            <a:fld id="{6565F0C3-D9E9-4961-A3A4-87F2116D4289}" type="slidenum">
+              <a:rPr lang="en-GB" smtClean="0"/>
+              <a:t>10</a:t>
+            </a:fld>
+            <a:endParaRPr lang="en-GB" dirty="0"/>
+          </a:p>
+        </p:txBody>
+      </p:sp>
+      <p:pic>
+        <p:nvPicPr>
+          <p:cNvPr id="6" name="Picture 5" descr="A screenshot of a cell phone&#10;&#10;Description automatically generated">
+            <a:extLst>
+              <a:ext uri="{FF2B5EF4-FFF2-40B4-BE49-F238E27FC236}">
+                <a16:creationId xmlns:a16="http://schemas.microsoft.com/office/drawing/2014/main" id="{D9EDF3EB-DBDB-4A69-B86A-776206493D5B}"/>
+              </a:ext>
+            </a:extLst>
+          </p:cNvPr>
+          <p:cNvPicPr>
+            <a:picLocks noChangeAspect="1"/>
+          </p:cNvPicPr>
+          <p:nvPr/>
+        </p:nvPicPr>
+        <p:blipFill>
+          <a:blip r:embed="rId2">
+            <a:extLst>
+              <a:ext uri="{28A0092B-C50C-407E-A947-70E740481C1C}">
+                <a14:useLocalDpi xmlns:a14="http://schemas.microsoft.com/office/drawing/2010/main" val="0"/>
+              </a:ext>
+            </a:extLst>
+          </a:blip>
+          <a:stretch>
+            <a:fillRect/>
+          </a:stretch>
+        </p:blipFill>
+        <p:spPr>
+          <a:xfrm>
+            <a:off x="2576468" y="3429000"/>
+            <a:ext cx="7039064" cy="2543962"/>
+          </a:xfrm>
+          <a:prstGeom prst="rect">
+            <a:avLst/>
+          </a:prstGeom>
+        </p:spPr>
+      </p:pic>
+    </p:spTree>
+    <p:extLst>
+      <p:ext uri="{BB962C8B-B14F-4D97-AF65-F5344CB8AC3E}">
+        <p14:creationId xmlns:p14="http://schemas.microsoft.com/office/powerpoint/2010/main" val="3409069453"/>
       </p:ext>
     </p:extLst>
   </p:cSld>
@@ -5883,7 +6292,7 @@
               <a:rPr lang="en-GB" smtClean="0"/>
               <a:t>3</a:t>
             </a:fld>
-            <a:endParaRPr lang="en-GB"/>
+            <a:endParaRPr lang="en-GB" dirty="0"/>
           </a:p>
         </p:txBody>
       </p:sp>
@@ -6445,7 +6854,7 @@
               <a:rPr lang="en-GB" smtClean="0"/>
               <a:t>4</a:t>
             </a:fld>
-            <a:endParaRPr lang="en-GB"/>
+            <a:endParaRPr lang="en-GB" dirty="0"/>
           </a:p>
         </p:txBody>
       </p:sp>
@@ -6720,147 +7129,147 @@
           <a:lstStyle/>
           <a:p>
             <a:r>
-              <a:rPr lang="en-150" b="1" dirty="0"/>
+              <a:rPr lang="en-150" b="1"/>
               <a:t>R</a:t>
             </a:r>
             <a:r>
-              <a:rPr lang="en-GB" b="1" dirty="0"/>
+              <a:rPr lang="en-GB" b="1"/>
               <a:t>i</a:t>
             </a:r>
             <a:r>
-              <a:rPr lang="en-150" b="1" dirty="0"/>
+              <a:rPr lang="en-150" b="1"/>
               <a:t>g</a:t>
             </a:r>
             <a:r>
-              <a:rPr lang="en-GB" b="1" dirty="0"/>
+              <a:rPr lang="en-GB" b="1"/>
               <a:t>i</a:t>
             </a:r>
             <a:r>
-              <a:rPr lang="en-150" b="1" dirty="0"/>
+              <a:rPr lang="en-150" b="1"/>
               <a:t>d</a:t>
             </a:r>
             <a:r>
-              <a:rPr lang="en-150" dirty="0"/>
+              <a:rPr lang="en-150"/>
               <a:t>: </a:t>
             </a:r>
             <a:r>
-              <a:rPr lang="en-GB" dirty="0"/>
+              <a:rPr lang="en-GB"/>
               <a:t>n</a:t>
             </a:r>
             <a:r>
-              <a:rPr lang="en-150" dirty="0"/>
+              <a:rPr lang="en-150"/>
               <a:t>u</a:t>
             </a:r>
             <a:r>
-              <a:rPr lang="en-GB" dirty="0"/>
+              <a:rPr lang="en-GB"/>
               <a:t>m</a:t>
             </a:r>
             <a:r>
-              <a:rPr lang="en-150" dirty="0"/>
+              <a:rPr lang="en-150"/>
               <a:t>b</a:t>
             </a:r>
             <a:r>
-              <a:rPr lang="en-GB" dirty="0"/>
+              <a:rPr lang="en-GB"/>
               <a:t>e</a:t>
             </a:r>
             <a:r>
-              <a:rPr lang="en-150" dirty="0"/>
+              <a:rPr lang="en-150"/>
               <a:t>r </a:t>
             </a:r>
             <a:r>
-              <a:rPr lang="en-GB" dirty="0"/>
+              <a:rPr lang="en-GB"/>
               <a:t>o</a:t>
             </a:r>
             <a:r>
-              <a:rPr lang="en-150" dirty="0"/>
+              <a:rPr lang="en-150"/>
               <a:t>f </a:t>
             </a:r>
             <a:r>
-              <a:rPr lang="en-GB" dirty="0"/>
+              <a:rPr lang="en-GB"/>
               <a:t>c</a:t>
             </a:r>
             <a:r>
-              <a:rPr lang="en-150" dirty="0"/>
+              <a:rPr lang="en-150"/>
               <a:t>o</a:t>
             </a:r>
             <a:r>
-              <a:rPr lang="en-GB" dirty="0"/>
+              <a:rPr lang="en-GB"/>
               <a:t>r</a:t>
             </a:r>
             <a:r>
-              <a:rPr lang="en-150" dirty="0"/>
+              <a:rPr lang="en-150"/>
               <a:t>e</a:t>
             </a:r>
             <a:r>
-              <a:rPr lang="en-GB" dirty="0"/>
+              <a:rPr lang="en-GB"/>
               <a:t>s</a:t>
             </a:r>
             <a:r>
-              <a:rPr lang="en-150" dirty="0"/>
+              <a:rPr lang="en-150"/>
               <a:t> </a:t>
             </a:r>
             <a:r>
-              <a:rPr lang="en-GB" dirty="0"/>
+              <a:rPr lang="en-GB"/>
               <a:t>s</a:t>
             </a:r>
             <a:r>
-              <a:rPr lang="en-150" dirty="0"/>
+              <a:rPr lang="en-150"/>
               <a:t>e</a:t>
             </a:r>
             <a:r>
-              <a:rPr lang="en-GB" dirty="0"/>
+              <a:rPr lang="en-GB"/>
               <a:t>t</a:t>
             </a:r>
             <a:r>
-              <a:rPr lang="en-150" dirty="0"/>
+              <a:rPr lang="en-150"/>
               <a:t> </a:t>
             </a:r>
             <a:r>
-              <a:rPr lang="en-GB" dirty="0"/>
+              <a:rPr lang="en-GB"/>
               <a:t>b</a:t>
             </a:r>
             <a:r>
-              <a:rPr lang="en-150" dirty="0"/>
+              <a:rPr lang="en-150"/>
               <a:t>y </a:t>
             </a:r>
             <a:r>
-              <a:rPr lang="en-GB" dirty="0"/>
+              <a:rPr lang="en-GB"/>
               <a:t>p</a:t>
             </a:r>
             <a:r>
-              <a:rPr lang="en-150" dirty="0"/>
+              <a:rPr lang="en-150"/>
               <a:t>r</a:t>
             </a:r>
             <a:r>
-              <a:rPr lang="en-GB" dirty="0"/>
+              <a:rPr lang="en-GB"/>
               <a:t>o</a:t>
             </a:r>
             <a:r>
-              <a:rPr lang="en-150" dirty="0"/>
+              <a:rPr lang="en-150"/>
               <a:t>g</a:t>
             </a:r>
             <a:r>
-              <a:rPr lang="en-GB" dirty="0"/>
+              <a:rPr lang="en-GB"/>
               <a:t>r</a:t>
             </a:r>
             <a:r>
-              <a:rPr lang="en-150" dirty="0"/>
+              <a:rPr lang="en-150"/>
               <a:t>a</a:t>
             </a:r>
             <a:r>
-              <a:rPr lang="en-GB" dirty="0"/>
+              <a:rPr lang="en-GB"/>
               <a:t>m</a:t>
             </a:r>
             <a:r>
-              <a:rPr lang="en-150" dirty="0"/>
+              <a:rPr lang="en-150"/>
               <a:t>m</a:t>
             </a:r>
             <a:r>
-              <a:rPr lang="en-GB" dirty="0"/>
+              <a:rPr lang="en-GB"/>
               <a:t>e</a:t>
             </a:r>
             <a:r>
-              <a:rPr lang="en-150" dirty="0"/>
+              <a:rPr lang="en-150"/>
               <a:t>r</a:t>
             </a:r>
             <a:endParaRPr lang="en-GB" dirty="0"/>
@@ -6892,7 +7301,7 @@
               <a:rPr lang="en-GB" smtClean="0"/>
               <a:t>5</a:t>
             </a:fld>
-            <a:endParaRPr lang="en-GB"/>
+            <a:endParaRPr lang="en-GB" dirty="0"/>
           </a:p>
         </p:txBody>
       </p:sp>
@@ -6942,6 +7351,133 @@
   <p:clrMapOvr>
     <a:masterClrMapping/>
   </p:clrMapOvr>
+  <p:timing>
+    <p:tnLst>
+      <p:par>
+        <p:cTn id="1" dur="indefinite" restart="never" nodeType="tmRoot">
+          <p:childTnLst>
+            <p:seq concurrent="1" nextAc="seek">
+              <p:cTn id="2" dur="indefinite" nodeType="mainSeq">
+                <p:childTnLst>
+                  <p:par>
+                    <p:cTn id="3" fill="hold">
+                      <p:stCondLst>
+                        <p:cond delay="indefinite"/>
+                      </p:stCondLst>
+                      <p:childTnLst>
+                        <p:par>
+                          <p:cTn id="4" fill="hold">
+                            <p:stCondLst>
+                              <p:cond delay="0"/>
+                            </p:stCondLst>
+                            <p:childTnLst>
+                              <p:par>
+                                <p:cTn id="5" presetID="1" presetClass="entr" presetSubtype="0" fill="hold" nodeType="clickEffect">
+                                  <p:stCondLst>
+                                    <p:cond delay="0"/>
+                                  </p:stCondLst>
+                                  <p:childTnLst>
+                                    <p:set>
+                                      <p:cBhvr>
+                                        <p:cTn id="6" dur="1" fill="hold">
+                                          <p:stCondLst>
+                                            <p:cond delay="0"/>
+                                          </p:stCondLst>
+                                        </p:cTn>
+                                        <p:tgtEl>
+                                          <p:spTgt spid="6"/>
+                                        </p:tgtEl>
+                                        <p:attrNameLst>
+                                          <p:attrName>style.visibility</p:attrName>
+                                        </p:attrNameLst>
+                                      </p:cBhvr>
+                                      <p:to>
+                                        <p:strVal val="visible"/>
+                                      </p:to>
+                                    </p:set>
+                                  </p:childTnLst>
+                                </p:cTn>
+                              </p:par>
+                            </p:childTnLst>
+                          </p:cTn>
+                        </p:par>
+                      </p:childTnLst>
+                    </p:cTn>
+                  </p:par>
+                  <p:par>
+                    <p:cTn id="7" fill="hold">
+                      <p:stCondLst>
+                        <p:cond delay="indefinite"/>
+                      </p:stCondLst>
+                      <p:childTnLst>
+                        <p:par>
+                          <p:cTn id="8" fill="hold">
+                            <p:stCondLst>
+                              <p:cond delay="0"/>
+                            </p:stCondLst>
+                            <p:childTnLst>
+                              <p:par>
+                                <p:cTn id="9" presetID="1" presetClass="entr" presetSubtype="0" fill="hold" grpId="0" nodeType="clickEffect">
+                                  <p:stCondLst>
+                                    <p:cond delay="0"/>
+                                  </p:stCondLst>
+                                  <p:childTnLst>
+                                    <p:set>
+                                      <p:cBhvr>
+                                        <p:cTn id="10" dur="1" fill="hold">
+                                          <p:stCondLst>
+                                            <p:cond delay="0"/>
+                                          </p:stCondLst>
+                                        </p:cTn>
+                                        <p:tgtEl>
+                                          <p:spTgt spid="3">
+                                            <p:txEl>
+                                              <p:pRg st="0" end="0"/>
+                                            </p:txEl>
+                                          </p:spTgt>
+                                        </p:tgtEl>
+                                        <p:attrNameLst>
+                                          <p:attrName>style.visibility</p:attrName>
+                                        </p:attrNameLst>
+                                      </p:cBhvr>
+                                      <p:to>
+                                        <p:strVal val="visible"/>
+                                      </p:to>
+                                    </p:set>
+                                  </p:childTnLst>
+                                </p:cTn>
+                              </p:par>
+                            </p:childTnLst>
+                          </p:cTn>
+                        </p:par>
+                      </p:childTnLst>
+                    </p:cTn>
+                  </p:par>
+                </p:childTnLst>
+              </p:cTn>
+              <p:prevCondLst>
+                <p:cond evt="onPrev" delay="0">
+                  <p:tgtEl>
+                    <p:sldTgt/>
+                  </p:tgtEl>
+                </p:cond>
+              </p:prevCondLst>
+              <p:nextCondLst>
+                <p:cond evt="onNext" delay="0">
+                  <p:tgtEl>
+                    <p:sldTgt/>
+                  </p:tgtEl>
+                </p:cond>
+              </p:nextCondLst>
+            </p:seq>
+          </p:childTnLst>
+        </p:cTn>
+      </p:par>
+    </p:tnLst>
+    <p:bldLst>
+      <p:bldP spid="3" grpId="0" build="p"/>
+    </p:bldLst>
+  </p:timing>
 </p:sld>
 </file>
 
@@ -7164,43 +7700,7 @@
             </a:r>
             <a:r>
               <a:rPr lang="en-150" dirty="0"/>
-              <a:t>: number of cores assigned during </a:t>
-            </a:r>
-            <a:r>
-              <a:rPr lang="en-150" dirty="0" err="1"/>
-              <a:t>sc</a:t>
-            </a:r>
-            <a:r>
-              <a:rPr lang="en-GB" dirty="0"/>
-              <a:t>h</a:t>
-            </a:r>
-            <a:r>
-              <a:rPr lang="en-150" dirty="0"/>
-              <a:t>e</a:t>
-            </a:r>
-            <a:r>
-              <a:rPr lang="en-GB" dirty="0"/>
-              <a:t>d</a:t>
-            </a:r>
-            <a:r>
-              <a:rPr lang="en-150" dirty="0"/>
-              <a:t>u</a:t>
-            </a:r>
-            <a:r>
-              <a:rPr lang="en-GB" dirty="0"/>
-              <a:t>l</a:t>
-            </a:r>
-            <a:r>
-              <a:rPr lang="en-150" dirty="0"/>
-              <a:t>i</a:t>
-            </a:r>
-            <a:r>
-              <a:rPr lang="en-GB" dirty="0"/>
-              <a:t>n</a:t>
-            </a:r>
-            <a:r>
-              <a:rPr lang="en-150" dirty="0"/>
-              <a:t>g</a:t>
+              <a:t>: number of cores assigned during scheduling</a:t>
             </a:r>
             <a:endParaRPr lang="en-GB" b="1" dirty="0"/>
           </a:p>
@@ -7231,16 +7731,16 @@
               <a:rPr lang="en-GB" smtClean="0"/>
               <a:t>6</a:t>
             </a:fld>
-            <a:endParaRPr lang="en-GB"/>
+            <a:endParaRPr lang="en-GB" dirty="0"/>
           </a:p>
         </p:txBody>
       </p:sp>
       <p:pic>
         <p:nvPicPr>
-          <p:cNvPr id="6" name="Picture 5" descr="A screenshot of a cell phone&#10;&#10;Description automatically generated">
-            <a:extLst>
-              <a:ext uri="{FF2B5EF4-FFF2-40B4-BE49-F238E27FC236}">
-                <a16:creationId xmlns:a16="http://schemas.microsoft.com/office/drawing/2014/main" id="{EED2414D-FCA4-430E-A634-7605D63A95FA}"/>
+          <p:cNvPr id="9" name="Picture 8" descr="A screenshot of a cell phone&#10;&#10;Description automatically generated">
+            <a:extLst>
+              <a:ext uri="{FF2B5EF4-FFF2-40B4-BE49-F238E27FC236}">
+                <a16:creationId xmlns:a16="http://schemas.microsoft.com/office/drawing/2014/main" id="{1CB01846-EFE4-42A9-B902-28F61CA76A6E}"/>
               </a:ext>
             </a:extLst>
           </p:cNvPr>
@@ -7251,42 +7751,6 @@
         </p:nvPicPr>
         <p:blipFill>
           <a:blip r:embed="rId2">
-            <a:extLst>
-              <a:ext uri="{28A0092B-C50C-407E-A947-70E740481C1C}">
-                <a14:useLocalDpi xmlns:a14="http://schemas.microsoft.com/office/drawing/2010/main" val="0"/>
-              </a:ext>
-            </a:extLst>
-          </a:blip>
-          <a:stretch>
-            <a:fillRect/>
-          </a:stretch>
-        </p:blipFill>
-        <p:spPr>
-          <a:xfrm>
-            <a:off x="2612915" y="3429000"/>
-            <a:ext cx="6966170" cy="2573831"/>
-          </a:xfrm>
-          <a:prstGeom prst="rect">
-            <a:avLst/>
-          </a:prstGeom>
-        </p:spPr>
-      </p:pic>
-      <p:pic>
-        <p:nvPicPr>
-          <p:cNvPr id="9" name="Picture 8" descr="A screenshot of a cell phone&#10;&#10;Description automatically generated">
-            <a:extLst>
-              <a:ext uri="{FF2B5EF4-FFF2-40B4-BE49-F238E27FC236}">
-                <a16:creationId xmlns:a16="http://schemas.microsoft.com/office/drawing/2014/main" id="{1CB01846-EFE4-42A9-B902-28F61CA76A6E}"/>
-              </a:ext>
-            </a:extLst>
-          </p:cNvPr>
-          <p:cNvPicPr>
-            <a:picLocks noChangeAspect="1"/>
-          </p:cNvPicPr>
-          <p:nvPr/>
-        </p:nvPicPr>
-        <p:blipFill>
-          <a:blip r:embed="rId3">
             <a:extLst>
               <a:ext uri="{28A0092B-C50C-407E-A947-70E740481C1C}">
                 <a14:useLocalDpi xmlns:a14="http://schemas.microsoft.com/office/drawing/2010/main" val="0"/>
@@ -7322,7 +7786,7 @@
           <p:nvPr/>
         </p:nvPicPr>
         <p:blipFill>
-          <a:blip r:embed="rId4">
+          <a:blip r:embed="rId3">
             <a:extLst>
               <a:ext uri="{28A0092B-C50C-407E-A947-70E740481C1C}">
                 <a14:useLocalDpi xmlns:a14="http://schemas.microsoft.com/office/drawing/2010/main" val="0"/>
@@ -7387,7 +7851,7 @@
                                           </p:stCondLst>
                                         </p:cTn>
                                         <p:tgtEl>
-                                          <p:spTgt spid="9"/>
+                                          <p:spTgt spid="7"/>
                                         </p:tgtEl>
                                         <p:attrNameLst>
                                           <p:attrName>style.visibility</p:attrName>
@@ -7419,7 +7883,7 @@
                             </p:stCondLst>
                             <p:childTnLst>
                               <p:par>
-                                <p:cTn id="9" presetID="1" presetClass="entr" presetSubtype="0" fill="hold" nodeType="clickEffect">
+                                <p:cTn id="9" presetID="1" presetClass="entr" presetSubtype="0" fill="hold" grpId="0" nodeType="clickEffect">
                                   <p:stCondLst>
                                     <p:cond delay="0"/>
                                   </p:stCondLst>
@@ -7432,7 +7896,11 @@
                                           </p:stCondLst>
                                         </p:cTn>
                                         <p:tgtEl>
-                                          <p:spTgt spid="7"/>
+                                          <p:spTgt spid="3">
+                                            <p:txEl>
+                                              <p:pRg st="1" end="1"/>
+                                            </p:txEl>
+                                          </p:spTgt>
                                         </p:tgtEl>
                                         <p:attrNameLst>
                                           <p:attrName>style.visibility</p:attrName>
@@ -7472,7 +7940,2296 @@
         </p:cTn>
       </p:par>
     </p:tnLst>
+    <p:bldLst>
+      <p:bldP spid="3" grpId="0" uiExpand="1" build="p"/>
+    </p:bldLst>
   </p:timing>
+</p:sld>
+</file>
+
+<file path=ppt/slides/slide7.xml><?xml version="1.0" encoding="utf-8"?>
+<p:sld xmlns:a="http://schemas.openxmlformats.org/drawingml/2006/main" xmlns:r="http://schemas.openxmlformats.org/officeDocument/2006/relationships" xmlns:p="http://schemas.openxmlformats.org/presentationml/2006/main">
+  <p:cSld>
+    <p:spTree>
+      <p:nvGrpSpPr>
+        <p:cNvPr id="1" name=""/>
+        <p:cNvGrpSpPr/>
+        <p:nvPr/>
+      </p:nvGrpSpPr>
+      <p:grpSpPr>
+        <a:xfrm>
+          <a:off x="0" y="0"/>
+          <a:ext cx="0" cy="0"/>
+          <a:chOff x="0" y="0"/>
+          <a:chExt cx="0" cy="0"/>
+        </a:xfrm>
+      </p:grpSpPr>
+      <p:sp>
+        <p:nvSpPr>
+          <p:cNvPr id="2" name="Title 1">
+            <a:extLst>
+              <a:ext uri="{FF2B5EF4-FFF2-40B4-BE49-F238E27FC236}">
+                <a16:creationId xmlns:a16="http://schemas.microsoft.com/office/drawing/2014/main" id="{7CDD1D12-FEB4-4C83-9F9D-DB0A41A9798C}"/>
+              </a:ext>
+            </a:extLst>
+          </p:cNvPr>
+          <p:cNvSpPr>
+            <a:spLocks noGrp="1"/>
+          </p:cNvSpPr>
+          <p:nvPr>
+            <p:ph type="title"/>
+          </p:nvPr>
+        </p:nvSpPr>
+        <p:spPr/>
+        <p:txBody>
+          <a:bodyPr/>
+          <a:lstStyle/>
+          <a:p>
+            <a:r>
+              <a:rPr lang="en-150" dirty="0"/>
+              <a:t>Types of gang</a:t>
+            </a:r>
+            <a:endParaRPr lang="en-GB" dirty="0"/>
+          </a:p>
+        </p:txBody>
+      </p:sp>
+      <p:sp>
+        <p:nvSpPr>
+          <p:cNvPr id="3" name="Content Placeholder 2">
+            <a:extLst>
+              <a:ext uri="{FF2B5EF4-FFF2-40B4-BE49-F238E27FC236}">
+                <a16:creationId xmlns:a16="http://schemas.microsoft.com/office/drawing/2014/main" id="{C856B570-CDA9-4735-B1B2-90D9C88391F5}"/>
+              </a:ext>
+            </a:extLst>
+          </p:cNvPr>
+          <p:cNvSpPr>
+            <a:spLocks noGrp="1"/>
+          </p:cNvSpPr>
+          <p:nvPr>
+            <p:ph idx="1"/>
+          </p:nvPr>
+        </p:nvSpPr>
+        <p:spPr/>
+        <p:txBody>
+          <a:bodyPr/>
+          <a:lstStyle/>
+          <a:p>
+            <a:r>
+              <a:rPr lang="en-150" b="1" dirty="0"/>
+              <a:t>R</a:t>
+            </a:r>
+            <a:r>
+              <a:rPr lang="en-GB" b="1" dirty="0"/>
+              <a:t>i</a:t>
+            </a:r>
+            <a:r>
+              <a:rPr lang="en-150" b="1" dirty="0"/>
+              <a:t>g</a:t>
+            </a:r>
+            <a:r>
+              <a:rPr lang="en-GB" b="1" dirty="0"/>
+              <a:t>i</a:t>
+            </a:r>
+            <a:r>
+              <a:rPr lang="en-150" b="1" dirty="0"/>
+              <a:t>d</a:t>
+            </a:r>
+            <a:r>
+              <a:rPr lang="en-150" dirty="0"/>
+              <a:t>: </a:t>
+            </a:r>
+            <a:r>
+              <a:rPr lang="en-GB" dirty="0"/>
+              <a:t>n</a:t>
+            </a:r>
+            <a:r>
+              <a:rPr lang="en-150" dirty="0"/>
+              <a:t>u</a:t>
+            </a:r>
+            <a:r>
+              <a:rPr lang="en-GB" dirty="0"/>
+              <a:t>m</a:t>
+            </a:r>
+            <a:r>
+              <a:rPr lang="en-150" dirty="0"/>
+              <a:t>b</a:t>
+            </a:r>
+            <a:r>
+              <a:rPr lang="en-GB" dirty="0"/>
+              <a:t>e</a:t>
+            </a:r>
+            <a:r>
+              <a:rPr lang="en-150" dirty="0"/>
+              <a:t>r </a:t>
+            </a:r>
+            <a:r>
+              <a:rPr lang="en-GB" dirty="0"/>
+              <a:t>o</a:t>
+            </a:r>
+            <a:r>
+              <a:rPr lang="en-150" dirty="0"/>
+              <a:t>f </a:t>
+            </a:r>
+            <a:r>
+              <a:rPr lang="en-GB" dirty="0"/>
+              <a:t>c</a:t>
+            </a:r>
+            <a:r>
+              <a:rPr lang="en-150" dirty="0"/>
+              <a:t>o</a:t>
+            </a:r>
+            <a:r>
+              <a:rPr lang="en-GB" dirty="0"/>
+              <a:t>r</a:t>
+            </a:r>
+            <a:r>
+              <a:rPr lang="en-150" dirty="0"/>
+              <a:t>e</a:t>
+            </a:r>
+            <a:r>
+              <a:rPr lang="en-GB" dirty="0"/>
+              <a:t>s</a:t>
+            </a:r>
+            <a:r>
+              <a:rPr lang="en-150" dirty="0"/>
+              <a:t> </a:t>
+            </a:r>
+            <a:r>
+              <a:rPr lang="en-GB" dirty="0"/>
+              <a:t>s</a:t>
+            </a:r>
+            <a:r>
+              <a:rPr lang="en-150" dirty="0"/>
+              <a:t>e</a:t>
+            </a:r>
+            <a:r>
+              <a:rPr lang="en-GB" dirty="0"/>
+              <a:t>t</a:t>
+            </a:r>
+            <a:r>
+              <a:rPr lang="en-150" dirty="0"/>
+              <a:t> </a:t>
+            </a:r>
+            <a:r>
+              <a:rPr lang="en-GB" dirty="0"/>
+              <a:t>b</a:t>
+            </a:r>
+            <a:r>
+              <a:rPr lang="en-150" dirty="0"/>
+              <a:t>y </a:t>
+            </a:r>
+            <a:r>
+              <a:rPr lang="en-GB" dirty="0"/>
+              <a:t>p</a:t>
+            </a:r>
+            <a:r>
+              <a:rPr lang="en-150" dirty="0"/>
+              <a:t>r</a:t>
+            </a:r>
+            <a:r>
+              <a:rPr lang="en-GB" dirty="0"/>
+              <a:t>o</a:t>
+            </a:r>
+            <a:r>
+              <a:rPr lang="en-150" dirty="0"/>
+              <a:t>g</a:t>
+            </a:r>
+            <a:r>
+              <a:rPr lang="en-GB" dirty="0"/>
+              <a:t>r</a:t>
+            </a:r>
+            <a:r>
+              <a:rPr lang="en-150" dirty="0"/>
+              <a:t>a</a:t>
+            </a:r>
+            <a:r>
+              <a:rPr lang="en-GB" dirty="0"/>
+              <a:t>m</a:t>
+            </a:r>
+            <a:r>
+              <a:rPr lang="en-150" dirty="0"/>
+              <a:t>m</a:t>
+            </a:r>
+            <a:r>
+              <a:rPr lang="en-GB" dirty="0"/>
+              <a:t>e</a:t>
+            </a:r>
+            <a:r>
+              <a:rPr lang="en-150" dirty="0"/>
+              <a:t>r</a:t>
+            </a:r>
+          </a:p>
+          <a:p>
+            <a:r>
+              <a:rPr lang="en-150" b="1" dirty="0"/>
+              <a:t>Moldable</a:t>
+            </a:r>
+            <a:r>
+              <a:rPr lang="en-150" dirty="0"/>
+              <a:t>: number of cores assigned during scheduling</a:t>
+            </a:r>
+          </a:p>
+          <a:p>
+            <a:r>
+              <a:rPr lang="en-150" b="1" dirty="0"/>
+              <a:t>Malleable</a:t>
+            </a:r>
+            <a:r>
+              <a:rPr lang="en-150" dirty="0"/>
+              <a:t>: Number of cores can change during runtime</a:t>
+            </a:r>
+            <a:endParaRPr lang="en-GB" b="1" dirty="0"/>
+          </a:p>
+        </p:txBody>
+      </p:sp>
+      <p:sp>
+        <p:nvSpPr>
+          <p:cNvPr id="4" name="Slide Number Placeholder 3">
+            <a:extLst>
+              <a:ext uri="{FF2B5EF4-FFF2-40B4-BE49-F238E27FC236}">
+                <a16:creationId xmlns:a16="http://schemas.microsoft.com/office/drawing/2014/main" id="{8AAC0DB3-D6CA-4A43-AC6F-7AAA3319BB58}"/>
+              </a:ext>
+            </a:extLst>
+          </p:cNvPr>
+          <p:cNvSpPr>
+            <a:spLocks noGrp="1"/>
+          </p:cNvSpPr>
+          <p:nvPr>
+            <p:ph type="sldNum" sz="quarter" idx="12"/>
+          </p:nvPr>
+        </p:nvSpPr>
+        <p:spPr/>
+        <p:txBody>
+          <a:bodyPr/>
+          <a:lstStyle/>
+          <a:p>
+            <a:fld id="{6565F0C3-D9E9-4961-A3A4-87F2116D4289}" type="slidenum">
+              <a:rPr lang="en-GB" smtClean="0"/>
+              <a:t>7</a:t>
+            </a:fld>
+            <a:endParaRPr lang="en-GB" dirty="0"/>
+          </a:p>
+        </p:txBody>
+      </p:sp>
+      <p:pic>
+        <p:nvPicPr>
+          <p:cNvPr id="9" name="Picture 8">
+            <a:extLst>
+              <a:ext uri="{FF2B5EF4-FFF2-40B4-BE49-F238E27FC236}">
+                <a16:creationId xmlns:a16="http://schemas.microsoft.com/office/drawing/2014/main" id="{1CB01846-EFE4-42A9-B902-28F61CA76A6E}"/>
+              </a:ext>
+            </a:extLst>
+          </p:cNvPr>
+          <p:cNvPicPr>
+            <a:picLocks noChangeAspect="1"/>
+          </p:cNvPicPr>
+          <p:nvPr/>
+        </p:nvPicPr>
+        <p:blipFill>
+          <a:blip r:embed="rId2">
+            <a:extLst>
+              <a:ext uri="{28A0092B-C50C-407E-A947-70E740481C1C}">
+                <a14:useLocalDpi xmlns:a14="http://schemas.microsoft.com/office/drawing/2010/main" val="0"/>
+              </a:ext>
+            </a:extLst>
+          </a:blip>
+          <a:srcRect/>
+          <a:stretch/>
+        </p:blipFill>
+        <p:spPr>
+          <a:xfrm>
+            <a:off x="2612917" y="3429000"/>
+            <a:ext cx="6966168" cy="2573830"/>
+          </a:xfrm>
+          <a:prstGeom prst="rect">
+            <a:avLst/>
+          </a:prstGeom>
+        </p:spPr>
+      </p:pic>
+    </p:spTree>
+    <p:extLst>
+      <p:ext uri="{BB962C8B-B14F-4D97-AF65-F5344CB8AC3E}">
+        <p14:creationId xmlns:p14="http://schemas.microsoft.com/office/powerpoint/2010/main" val="4017771857"/>
+      </p:ext>
+    </p:extLst>
+  </p:cSld>
+  <p:clrMapOvr>
+    <a:masterClrMapping/>
+  </p:clrMapOvr>
+  <p:timing>
+    <p:tnLst>
+      <p:par>
+        <p:cTn id="1" dur="indefinite" restart="never" nodeType="tmRoot">
+          <p:childTnLst>
+            <p:seq concurrent="1" nextAc="seek">
+              <p:cTn id="2" dur="indefinite" nodeType="mainSeq">
+                <p:childTnLst>
+                  <p:par>
+                    <p:cTn id="3" fill="hold">
+                      <p:stCondLst>
+                        <p:cond delay="indefinite"/>
+                      </p:stCondLst>
+                      <p:childTnLst>
+                        <p:par>
+                          <p:cTn id="4" fill="hold">
+                            <p:stCondLst>
+                              <p:cond delay="0"/>
+                            </p:stCondLst>
+                            <p:childTnLst>
+                              <p:par>
+                                <p:cTn id="5" presetID="19" presetClass="emph" presetSubtype="0" fill="hold" nodeType="clickEffect">
+                                  <p:stCondLst>
+                                    <p:cond delay="0"/>
+                                  </p:stCondLst>
+                                  <p:childTnLst>
+                                    <p:animClr clrSpc="rgb" dir="cw">
+                                      <p:cBhvr override="childStyle">
+                                        <p:cTn id="6" dur="10" fill="hold"/>
+                                        <p:tgtEl>
+                                          <p:spTgt spid="3">
+                                            <p:txEl>
+                                              <p:pRg st="2" end="2"/>
+                                            </p:txEl>
+                                          </p:spTgt>
+                                        </p:tgtEl>
+                                        <p:attrNameLst>
+                                          <p:attrName>style.color</p:attrName>
+                                        </p:attrNameLst>
+                                      </p:cBhvr>
+                                      <p:to>
+                                        <a:srgbClr val="E7E6E6"/>
+                                      </p:to>
+                                    </p:animClr>
+                                    <p:animClr clrSpc="rgb" dir="cw">
+                                      <p:cBhvr>
+                                        <p:cTn id="7" dur="10" fill="hold"/>
+                                        <p:tgtEl>
+                                          <p:spTgt spid="3">
+                                            <p:txEl>
+                                              <p:pRg st="2" end="2"/>
+                                            </p:txEl>
+                                          </p:spTgt>
+                                        </p:tgtEl>
+                                        <p:attrNameLst>
+                                          <p:attrName>fillcolor</p:attrName>
+                                        </p:attrNameLst>
+                                      </p:cBhvr>
+                                      <p:to>
+                                        <a:srgbClr val="E7E6E6"/>
+                                      </p:to>
+                                    </p:animClr>
+                                    <p:set>
+                                      <p:cBhvr>
+                                        <p:cTn id="8" dur="10" fill="hold"/>
+                                        <p:tgtEl>
+                                          <p:spTgt spid="3">
+                                            <p:txEl>
+                                              <p:pRg st="2" end="2"/>
+                                            </p:txEl>
+                                          </p:spTgt>
+                                        </p:tgtEl>
+                                        <p:attrNameLst>
+                                          <p:attrName>fill.type</p:attrName>
+                                        </p:attrNameLst>
+                                      </p:cBhvr>
+                                      <p:to>
+                                        <p:strVal val="solid"/>
+                                      </p:to>
+                                    </p:set>
+                                    <p:set>
+                                      <p:cBhvr>
+                                        <p:cTn id="9" dur="10" fill="hold"/>
+                                        <p:tgtEl>
+                                          <p:spTgt spid="3">
+                                            <p:txEl>
+                                              <p:pRg st="2" end="2"/>
+                                            </p:txEl>
+                                          </p:spTgt>
+                                        </p:tgtEl>
+                                        <p:attrNameLst>
+                                          <p:attrName>fill.on</p:attrName>
+                                        </p:attrNameLst>
+                                      </p:cBhvr>
+                                      <p:to>
+                                        <p:strVal val="true"/>
+                                      </p:to>
+                                    </p:set>
+                                  </p:childTnLst>
+                                </p:cTn>
+                              </p:par>
+                              <p:par>
+                                <p:cTn id="10" presetID="19" presetClass="emph" presetSubtype="0" fill="hold" nodeType="withEffect">
+                                  <p:stCondLst>
+                                    <p:cond delay="0"/>
+                                  </p:stCondLst>
+                                  <p:childTnLst>
+                                    <p:animClr clrSpc="rgb" dir="cw">
+                                      <p:cBhvr override="childStyle">
+                                        <p:cTn id="11" dur="10" fill="hold"/>
+                                        <p:tgtEl>
+                                          <p:spTgt spid="3">
+                                            <p:txEl>
+                                              <p:pRg st="0" end="0"/>
+                                            </p:txEl>
+                                          </p:spTgt>
+                                        </p:tgtEl>
+                                        <p:attrNameLst>
+                                          <p:attrName>style.color</p:attrName>
+                                        </p:attrNameLst>
+                                      </p:cBhvr>
+                                      <p:to>
+                                        <a:srgbClr val="E7E6E6"/>
+                                      </p:to>
+                                    </p:animClr>
+                                    <p:animClr clrSpc="rgb" dir="cw">
+                                      <p:cBhvr>
+                                        <p:cTn id="12" dur="10" fill="hold"/>
+                                        <p:tgtEl>
+                                          <p:spTgt spid="3">
+                                            <p:txEl>
+                                              <p:pRg st="0" end="0"/>
+                                            </p:txEl>
+                                          </p:spTgt>
+                                        </p:tgtEl>
+                                        <p:attrNameLst>
+                                          <p:attrName>fillcolor</p:attrName>
+                                        </p:attrNameLst>
+                                      </p:cBhvr>
+                                      <p:to>
+                                        <a:srgbClr val="E7E6E6"/>
+                                      </p:to>
+                                    </p:animClr>
+                                    <p:set>
+                                      <p:cBhvr>
+                                        <p:cTn id="13" dur="10" fill="hold"/>
+                                        <p:tgtEl>
+                                          <p:spTgt spid="3">
+                                            <p:txEl>
+                                              <p:pRg st="0" end="0"/>
+                                            </p:txEl>
+                                          </p:spTgt>
+                                        </p:tgtEl>
+                                        <p:attrNameLst>
+                                          <p:attrName>fill.type</p:attrName>
+                                        </p:attrNameLst>
+                                      </p:cBhvr>
+                                      <p:to>
+                                        <p:strVal val="solid"/>
+                                      </p:to>
+                                    </p:set>
+                                    <p:set>
+                                      <p:cBhvr>
+                                        <p:cTn id="14" dur="10" fill="hold"/>
+                                        <p:tgtEl>
+                                          <p:spTgt spid="3">
+                                            <p:txEl>
+                                              <p:pRg st="0" end="0"/>
+                                            </p:txEl>
+                                          </p:spTgt>
+                                        </p:tgtEl>
+                                        <p:attrNameLst>
+                                          <p:attrName>fill.on</p:attrName>
+                                        </p:attrNameLst>
+                                      </p:cBhvr>
+                                      <p:to>
+                                        <p:strVal val="true"/>
+                                      </p:to>
+                                    </p:set>
+                                  </p:childTnLst>
+                                </p:cTn>
+                              </p:par>
+                            </p:childTnLst>
+                          </p:cTn>
+                        </p:par>
+                      </p:childTnLst>
+                    </p:cTn>
+                  </p:par>
+                </p:childTnLst>
+              </p:cTn>
+              <p:prevCondLst>
+                <p:cond evt="onPrev" delay="0">
+                  <p:tgtEl>
+                    <p:sldTgt/>
+                  </p:tgtEl>
+                </p:cond>
+              </p:prevCondLst>
+              <p:nextCondLst>
+                <p:cond evt="onNext" delay="0">
+                  <p:tgtEl>
+                    <p:sldTgt/>
+                  </p:tgtEl>
+                </p:cond>
+              </p:nextCondLst>
+            </p:seq>
+          </p:childTnLst>
+        </p:cTn>
+      </p:par>
+    </p:tnLst>
+  </p:timing>
+</p:sld>
+</file>
+
+<file path=ppt/slides/slide8.xml><?xml version="1.0" encoding="utf-8"?>
+<p:sld xmlns:a="http://schemas.openxmlformats.org/drawingml/2006/main" xmlns:r="http://schemas.openxmlformats.org/officeDocument/2006/relationships" xmlns:p="http://schemas.openxmlformats.org/presentationml/2006/main">
+  <p:cSld>
+    <p:spTree>
+      <p:nvGrpSpPr>
+        <p:cNvPr id="1" name=""/>
+        <p:cNvGrpSpPr/>
+        <p:nvPr/>
+      </p:nvGrpSpPr>
+      <p:grpSpPr>
+        <a:xfrm>
+          <a:off x="0" y="0"/>
+          <a:ext cx="0" cy="0"/>
+          <a:chOff x="0" y="0"/>
+          <a:chExt cx="0" cy="0"/>
+        </a:xfrm>
+      </p:grpSpPr>
+      <p:sp>
+        <p:nvSpPr>
+          <p:cNvPr id="2" name="Title 1">
+            <a:extLst>
+              <a:ext uri="{FF2B5EF4-FFF2-40B4-BE49-F238E27FC236}">
+                <a16:creationId xmlns:a16="http://schemas.microsoft.com/office/drawing/2014/main" id="{7632AD00-8EE4-4735-BEDE-BEB1F93D6FFE}"/>
+              </a:ext>
+            </a:extLst>
+          </p:cNvPr>
+          <p:cNvSpPr>
+            <a:spLocks noGrp="1"/>
+          </p:cNvSpPr>
+          <p:nvPr>
+            <p:ph type="title"/>
+          </p:nvPr>
+        </p:nvSpPr>
+        <p:spPr/>
+        <p:txBody>
+          <a:bodyPr/>
+          <a:lstStyle/>
+          <a:p>
+            <a:r>
+              <a:rPr lang="en-150" dirty="0"/>
+              <a:t>P</a:t>
+            </a:r>
+            <a:r>
+              <a:rPr lang="en-GB" dirty="0"/>
+              <a:t>r</a:t>
+            </a:r>
+            <a:r>
+              <a:rPr lang="en-150" dirty="0"/>
+              <a:t>e</a:t>
+            </a:r>
+            <a:r>
+              <a:rPr lang="en-GB" dirty="0"/>
+              <a:t>v</a:t>
+            </a:r>
+            <a:r>
+              <a:rPr lang="en-150" dirty="0"/>
+              <a:t>i</a:t>
+            </a:r>
+            <a:r>
+              <a:rPr lang="en-GB" dirty="0"/>
+              <a:t>o</a:t>
+            </a:r>
+            <a:r>
+              <a:rPr lang="en-150" dirty="0"/>
+              <a:t>u</a:t>
+            </a:r>
+            <a:r>
+              <a:rPr lang="en-GB" dirty="0"/>
+              <a:t>s</a:t>
+            </a:r>
+            <a:r>
+              <a:rPr lang="en-150" dirty="0"/>
+              <a:t> </a:t>
+            </a:r>
+            <a:r>
+              <a:rPr lang="en-GB" dirty="0"/>
+              <a:t>w</a:t>
+            </a:r>
+            <a:r>
+              <a:rPr lang="en-150" dirty="0"/>
+              <a:t>o</a:t>
+            </a:r>
+            <a:r>
+              <a:rPr lang="en-GB" dirty="0"/>
+              <a:t>r</a:t>
+            </a:r>
+            <a:r>
+              <a:rPr lang="en-150" dirty="0"/>
+              <a:t>k</a:t>
+            </a:r>
+            <a:endParaRPr lang="en-GB" dirty="0"/>
+          </a:p>
+        </p:txBody>
+      </p:sp>
+      <p:sp>
+        <p:nvSpPr>
+          <p:cNvPr id="3" name="Content Placeholder 2">
+            <a:extLst>
+              <a:ext uri="{FF2B5EF4-FFF2-40B4-BE49-F238E27FC236}">
+                <a16:creationId xmlns:a16="http://schemas.microsoft.com/office/drawing/2014/main" id="{9F59BE75-4890-4E9C-B99F-CDE75D2B9E9A}"/>
+              </a:ext>
+            </a:extLst>
+          </p:cNvPr>
+          <p:cNvSpPr>
+            <a:spLocks noGrp="1"/>
+          </p:cNvSpPr>
+          <p:nvPr>
+            <p:ph idx="1"/>
+          </p:nvPr>
+        </p:nvSpPr>
+        <p:spPr/>
+        <p:txBody>
+          <a:bodyPr/>
+          <a:lstStyle/>
+          <a:p>
+            <a:r>
+              <a:rPr lang="en-150" dirty="0"/>
+              <a:t>I</a:t>
+            </a:r>
+            <a:r>
+              <a:rPr lang="en-GB" dirty="0"/>
+              <a:t>n</a:t>
+            </a:r>
+            <a:r>
+              <a:rPr lang="en-150" dirty="0"/>
+              <a:t>t</a:t>
+            </a:r>
+            <a:r>
+              <a:rPr lang="en-GB" dirty="0"/>
+              <a:t>r</a:t>
+            </a:r>
+            <a:r>
+              <a:rPr lang="en-150" dirty="0"/>
+              <a:t>o</a:t>
+            </a:r>
+            <a:r>
+              <a:rPr lang="en-GB" dirty="0"/>
+              <a:t>d</a:t>
+            </a:r>
+            <a:r>
+              <a:rPr lang="en-150" dirty="0"/>
+              <a:t>u</a:t>
+            </a:r>
+            <a:r>
+              <a:rPr lang="en-GB" dirty="0"/>
+              <a:t>c</a:t>
+            </a:r>
+            <a:r>
+              <a:rPr lang="en-150" dirty="0"/>
+              <a:t>e</a:t>
+            </a:r>
+            <a:r>
+              <a:rPr lang="en-GB" dirty="0"/>
+              <a:t>d</a:t>
+            </a:r>
+            <a:r>
+              <a:rPr lang="en-150" dirty="0"/>
+              <a:t> </a:t>
+            </a:r>
+            <a:r>
+              <a:rPr lang="en-GB" dirty="0"/>
+              <a:t>i</a:t>
+            </a:r>
+            <a:r>
+              <a:rPr lang="en-150" dirty="0"/>
+              <a:t>n </a:t>
+            </a:r>
+            <a:r>
+              <a:rPr lang="en-GB" dirty="0"/>
+              <a:t>t</a:t>
+            </a:r>
+            <a:r>
+              <a:rPr lang="en-150" dirty="0"/>
+              <a:t>h</a:t>
+            </a:r>
+            <a:r>
+              <a:rPr lang="en-GB" dirty="0"/>
+              <a:t>e</a:t>
+            </a:r>
+            <a:r>
+              <a:rPr lang="en-150" dirty="0"/>
+              <a:t> </a:t>
+            </a:r>
+            <a:r>
+              <a:rPr lang="en-GB" dirty="0"/>
+              <a:t>c</a:t>
+            </a:r>
+            <a:r>
+              <a:rPr lang="en-150" dirty="0"/>
+              <a:t>o</a:t>
+            </a:r>
+            <a:r>
+              <a:rPr lang="en-GB" dirty="0"/>
+              <a:t>n</a:t>
+            </a:r>
+            <a:r>
+              <a:rPr lang="en-150" dirty="0"/>
+              <a:t>text of high-performance computing</a:t>
+            </a:r>
+            <a:r>
+              <a:rPr lang="en-150" baseline="30000" dirty="0"/>
+              <a:t>[1]</a:t>
+            </a:r>
+          </a:p>
+          <a:p>
+            <a:r>
+              <a:rPr lang="en-150" dirty="0"/>
+              <a:t>In real-time:</a:t>
+            </a:r>
+          </a:p>
+          <a:p>
+            <a:pPr lvl="1"/>
+            <a:r>
+              <a:rPr lang="en-150" dirty="0"/>
+              <a:t>We know that JLFP scheduler is no</a:t>
+            </a:r>
+            <a:r>
+              <a:rPr lang="en-GB" dirty="0"/>
+              <a:t>t</a:t>
+            </a:r>
+            <a:r>
+              <a:rPr lang="en-150" dirty="0"/>
+              <a:t> </a:t>
+            </a:r>
+            <a:r>
+              <a:rPr lang="en-GB" dirty="0"/>
+              <a:t>p</a:t>
+            </a:r>
+            <a:r>
+              <a:rPr lang="en-150" dirty="0"/>
+              <a:t>r</a:t>
+            </a:r>
+            <a:r>
+              <a:rPr lang="en-GB" dirty="0"/>
+              <a:t>e</a:t>
+            </a:r>
+            <a:r>
+              <a:rPr lang="en-150" dirty="0"/>
+              <a:t>d</a:t>
+            </a:r>
+            <a:r>
+              <a:rPr lang="en-GB" dirty="0"/>
+              <a:t>i</a:t>
+            </a:r>
+            <a:r>
+              <a:rPr lang="en-150" dirty="0"/>
+              <a:t>c</a:t>
+            </a:r>
+            <a:r>
+              <a:rPr lang="en-GB" dirty="0"/>
+              <a:t>t</a:t>
+            </a:r>
+            <a:r>
+              <a:rPr lang="en-150" dirty="0"/>
+              <a:t>a</a:t>
+            </a:r>
+            <a:r>
+              <a:rPr lang="en-GB" dirty="0"/>
+              <a:t>b</a:t>
+            </a:r>
+            <a:r>
+              <a:rPr lang="en-150" dirty="0"/>
+              <a:t>l</a:t>
+            </a:r>
+            <a:r>
+              <a:rPr lang="en-GB" dirty="0"/>
+              <a:t>e</a:t>
+            </a:r>
+            <a:r>
+              <a:rPr lang="en-150" dirty="0"/>
+              <a:t>/</a:t>
+            </a:r>
+            <a:r>
+              <a:rPr lang="en-GB" dirty="0"/>
+              <a:t>s</a:t>
+            </a:r>
+            <a:r>
+              <a:rPr lang="en-150" dirty="0"/>
+              <a:t>u</a:t>
+            </a:r>
+            <a:r>
+              <a:rPr lang="en-GB" dirty="0"/>
+              <a:t>s</a:t>
+            </a:r>
+            <a:r>
+              <a:rPr lang="en-150" dirty="0"/>
+              <a:t>t</a:t>
+            </a:r>
+            <a:r>
+              <a:rPr lang="en-GB" dirty="0"/>
+              <a:t>a</a:t>
+            </a:r>
+            <a:r>
+              <a:rPr lang="en-150" dirty="0"/>
+              <a:t>i</a:t>
+            </a:r>
+            <a:r>
+              <a:rPr lang="en-GB" dirty="0"/>
+              <a:t>n</a:t>
+            </a:r>
+            <a:r>
+              <a:rPr lang="en-150" dirty="0"/>
+              <a:t>a</a:t>
+            </a:r>
+            <a:r>
+              <a:rPr lang="en-GB" dirty="0"/>
+              <a:t>b</a:t>
+            </a:r>
+            <a:r>
+              <a:rPr lang="en-150" dirty="0"/>
+              <a:t>l</a:t>
+            </a:r>
+            <a:r>
+              <a:rPr lang="en-GB" dirty="0"/>
+              <a:t>e</a:t>
+            </a:r>
+            <a:r>
+              <a:rPr lang="en-150" baseline="30000" dirty="0"/>
+              <a:t>[2]</a:t>
+            </a:r>
+          </a:p>
+          <a:p>
+            <a:pPr lvl="1"/>
+            <a:r>
+              <a:rPr lang="en-150" dirty="0"/>
+              <a:t>Most of the work is focused in fully-preemptive solutions:</a:t>
+            </a:r>
+          </a:p>
+          <a:p>
+            <a:pPr lvl="2"/>
+            <a:r>
+              <a:rPr lang="en-GB" dirty="0"/>
+              <a:t>O</a:t>
+            </a:r>
+            <a:r>
+              <a:rPr lang="en-150" dirty="0"/>
+              <a:t>p</a:t>
+            </a:r>
+            <a:r>
+              <a:rPr lang="en-GB" dirty="0"/>
+              <a:t>t</a:t>
+            </a:r>
+            <a:r>
+              <a:rPr lang="en-150" dirty="0"/>
+              <a:t>i</a:t>
+            </a:r>
+            <a:r>
+              <a:rPr lang="en-GB" dirty="0"/>
+              <a:t>m</a:t>
+            </a:r>
+            <a:r>
+              <a:rPr lang="en-150" dirty="0"/>
+              <a:t>a</a:t>
+            </a:r>
+            <a:r>
+              <a:rPr lang="en-GB" dirty="0"/>
+              <a:t>l</a:t>
+            </a:r>
+            <a:r>
+              <a:rPr lang="en-150" dirty="0"/>
+              <a:t> </a:t>
+            </a:r>
+            <a:r>
+              <a:rPr lang="en-GB" dirty="0"/>
+              <a:t>s</a:t>
+            </a:r>
+            <a:r>
+              <a:rPr lang="en-150" dirty="0"/>
+              <a:t>c</a:t>
+            </a:r>
+            <a:r>
+              <a:rPr lang="en-GB" dirty="0"/>
+              <a:t>h</a:t>
+            </a:r>
+            <a:r>
+              <a:rPr lang="en-150" dirty="0"/>
+              <a:t>e</a:t>
+            </a:r>
+            <a:r>
+              <a:rPr lang="en-GB" dirty="0"/>
+              <a:t>d</a:t>
+            </a:r>
+            <a:r>
+              <a:rPr lang="en-150" dirty="0"/>
+              <a:t>u</a:t>
+            </a:r>
+            <a:r>
+              <a:rPr lang="en-GB" dirty="0"/>
+              <a:t>l</a:t>
+            </a:r>
+            <a:r>
+              <a:rPr lang="en-150" dirty="0"/>
+              <a:t>e</a:t>
+            </a:r>
+            <a:r>
+              <a:rPr lang="en-GB" dirty="0"/>
+              <a:t>r</a:t>
+            </a:r>
+            <a:r>
+              <a:rPr lang="en-150" dirty="0"/>
+              <a:t> </a:t>
+            </a:r>
+            <a:r>
+              <a:rPr lang="en-GB" dirty="0"/>
+              <a:t>f</a:t>
+            </a:r>
+            <a:r>
+              <a:rPr lang="en-150" dirty="0"/>
+              <a:t>o</a:t>
+            </a:r>
+            <a:r>
+              <a:rPr lang="en-GB" dirty="0"/>
+              <a:t>r</a:t>
+            </a:r>
+            <a:r>
+              <a:rPr lang="en-150" dirty="0"/>
+              <a:t> </a:t>
+            </a:r>
+            <a:r>
+              <a:rPr lang="en-GB" dirty="0"/>
+              <a:t>r</a:t>
+            </a:r>
+            <a:r>
+              <a:rPr lang="en-150" dirty="0"/>
+              <a:t>i</a:t>
+            </a:r>
+            <a:r>
+              <a:rPr lang="en-GB" dirty="0"/>
+              <a:t>g</a:t>
+            </a:r>
+            <a:r>
+              <a:rPr lang="en-150" dirty="0"/>
+              <a:t>i</a:t>
+            </a:r>
+            <a:r>
+              <a:rPr lang="en-GB" dirty="0"/>
+              <a:t>d</a:t>
+            </a:r>
+            <a:r>
+              <a:rPr lang="en-150" dirty="0"/>
+              <a:t> </a:t>
+            </a:r>
+            <a:r>
+              <a:rPr lang="en-GB" dirty="0"/>
+              <a:t>g</a:t>
+            </a:r>
+            <a:r>
+              <a:rPr lang="en-150" dirty="0"/>
+              <a:t>a</a:t>
+            </a:r>
+            <a:r>
+              <a:rPr lang="en-GB" dirty="0"/>
+              <a:t>n</a:t>
+            </a:r>
+            <a:r>
+              <a:rPr lang="en-150" dirty="0"/>
+              <a:t>g (</a:t>
+            </a:r>
+            <a:r>
+              <a:rPr lang="en-GB" dirty="0"/>
+              <a:t>D</a:t>
+            </a:r>
+            <a:r>
+              <a:rPr lang="en-150" dirty="0"/>
+              <a:t>P-</a:t>
+            </a:r>
+            <a:r>
+              <a:rPr lang="en-GB" dirty="0"/>
+              <a:t>F</a:t>
+            </a:r>
+            <a:r>
+              <a:rPr lang="en-150" dirty="0"/>
+              <a:t>air)</a:t>
+            </a:r>
+            <a:r>
+              <a:rPr lang="en-150" baseline="30000" dirty="0"/>
+              <a:t>[3]</a:t>
+            </a:r>
+          </a:p>
+          <a:p>
+            <a:pPr lvl="2"/>
+            <a:r>
+              <a:rPr lang="en-150" dirty="0"/>
+              <a:t>Moldable scheduler</a:t>
+            </a:r>
+            <a:r>
+              <a:rPr lang="en-150" baseline="30000" dirty="0"/>
+              <a:t>[4]</a:t>
+            </a:r>
+          </a:p>
+          <a:p>
+            <a:pPr lvl="1"/>
+            <a:r>
+              <a:rPr lang="en-150" dirty="0"/>
+              <a:t>Bundled scheduling</a:t>
+            </a:r>
+            <a:r>
+              <a:rPr lang="en-150" baseline="30000" dirty="0"/>
+              <a:t>[5]</a:t>
+            </a:r>
+          </a:p>
+          <a:p>
+            <a:pPr lvl="2"/>
+            <a:r>
+              <a:rPr lang="en-GB" dirty="0"/>
+              <a:t>T</a:t>
+            </a:r>
+            <a:r>
+              <a:rPr lang="en-150" dirty="0"/>
+              <a:t>a</a:t>
+            </a:r>
+            <a:r>
+              <a:rPr lang="en-GB" dirty="0"/>
+              <a:t>s</a:t>
+            </a:r>
+            <a:r>
+              <a:rPr lang="en-150" dirty="0"/>
+              <a:t>k</a:t>
+            </a:r>
+            <a:r>
+              <a:rPr lang="en-GB" dirty="0"/>
+              <a:t>s</a:t>
+            </a:r>
+            <a:r>
+              <a:rPr lang="en-150" dirty="0"/>
+              <a:t> </a:t>
+            </a:r>
+            <a:r>
+              <a:rPr lang="en-GB" dirty="0"/>
+              <a:t>w</a:t>
+            </a:r>
+            <a:r>
+              <a:rPr lang="en-150" dirty="0"/>
+              <a:t>i</a:t>
+            </a:r>
+            <a:r>
+              <a:rPr lang="en-GB" dirty="0"/>
+              <a:t>t</a:t>
+            </a:r>
+            <a:r>
+              <a:rPr lang="en-150" dirty="0"/>
+              <a:t>h </a:t>
+            </a:r>
+            <a:r>
+              <a:rPr lang="en-GB" dirty="0"/>
+              <a:t>p</a:t>
+            </a:r>
+            <a:r>
+              <a:rPr lang="en-150" dirty="0"/>
+              <a:t>r</a:t>
+            </a:r>
+            <a:r>
+              <a:rPr lang="en-GB" dirty="0"/>
+              <a:t>e</a:t>
+            </a:r>
+            <a:r>
+              <a:rPr lang="en-150" dirty="0"/>
+              <a:t>c</a:t>
+            </a:r>
+            <a:r>
+              <a:rPr lang="en-GB" dirty="0"/>
+              <a:t>e</a:t>
+            </a:r>
+            <a:r>
+              <a:rPr lang="en-150" dirty="0"/>
+              <a:t>d</a:t>
+            </a:r>
+            <a:r>
+              <a:rPr lang="en-GB" dirty="0"/>
+              <a:t>e</a:t>
+            </a:r>
+            <a:r>
+              <a:rPr lang="en-150" dirty="0"/>
+              <a:t>n</a:t>
+            </a:r>
+            <a:r>
+              <a:rPr lang="en-GB" dirty="0"/>
+              <a:t>c</a:t>
+            </a:r>
+            <a:r>
+              <a:rPr lang="en-150" dirty="0"/>
+              <a:t>e </a:t>
+            </a:r>
+            <a:r>
+              <a:rPr lang="en-GB" dirty="0"/>
+              <a:t>c</a:t>
+            </a:r>
+            <a:r>
+              <a:rPr lang="en-150" dirty="0"/>
+              <a:t>o</a:t>
+            </a:r>
+            <a:r>
+              <a:rPr lang="en-GB" dirty="0"/>
+              <a:t>n</a:t>
+            </a:r>
+            <a:r>
+              <a:rPr lang="en-150" dirty="0"/>
+              <a:t>s</a:t>
+            </a:r>
+            <a:r>
+              <a:rPr lang="en-GB" dirty="0"/>
+              <a:t>t</a:t>
+            </a:r>
+            <a:r>
+              <a:rPr lang="en-150" dirty="0"/>
+              <a:t>r</a:t>
+            </a:r>
+            <a:r>
+              <a:rPr lang="en-GB" dirty="0"/>
+              <a:t>a</a:t>
+            </a:r>
+            <a:r>
+              <a:rPr lang="en-150" dirty="0"/>
+              <a:t>i</a:t>
+            </a:r>
+            <a:r>
+              <a:rPr lang="en-GB" dirty="0"/>
+              <a:t>n</a:t>
+            </a:r>
+            <a:r>
+              <a:rPr lang="en-150" dirty="0"/>
+              <a:t>t</a:t>
+            </a:r>
+            <a:r>
+              <a:rPr lang="en-GB" dirty="0"/>
+              <a:t>s</a:t>
+            </a:r>
+            <a:r>
+              <a:rPr lang="en-150" dirty="0"/>
+              <a:t> </a:t>
+            </a:r>
+            <a:r>
+              <a:rPr lang="en-GB" dirty="0"/>
+              <a:t>m</a:t>
+            </a:r>
+            <a:r>
+              <a:rPr lang="en-150" dirty="0"/>
+              <a:t>o</a:t>
+            </a:r>
+            <a:r>
+              <a:rPr lang="en-GB" dirty="0"/>
+              <a:t>d</a:t>
+            </a:r>
+            <a:r>
+              <a:rPr lang="en-150" dirty="0"/>
+              <a:t>e</a:t>
+            </a:r>
+            <a:r>
+              <a:rPr lang="en-GB" dirty="0"/>
+              <a:t>l</a:t>
+            </a:r>
+            <a:r>
+              <a:rPr lang="en-150" dirty="0"/>
+              <a:t>l</a:t>
+            </a:r>
+            <a:r>
+              <a:rPr lang="en-GB" dirty="0"/>
+              <a:t>e</a:t>
+            </a:r>
+            <a:r>
+              <a:rPr lang="en-150" dirty="0"/>
+              <a:t>d </a:t>
+            </a:r>
+            <a:r>
+              <a:rPr lang="en-GB" dirty="0"/>
+              <a:t>a</a:t>
+            </a:r>
+            <a:r>
+              <a:rPr lang="en-150" dirty="0"/>
+              <a:t>s </a:t>
+            </a:r>
+            <a:r>
+              <a:rPr lang="en-GB" dirty="0"/>
+              <a:t>a</a:t>
+            </a:r>
+            <a:r>
+              <a:rPr lang="en-150" dirty="0"/>
+              <a:t> </a:t>
+            </a:r>
+            <a:r>
+              <a:rPr lang="en-GB" dirty="0"/>
+              <a:t>s</a:t>
+            </a:r>
+            <a:r>
+              <a:rPr lang="en-150" dirty="0"/>
+              <a:t>u</a:t>
+            </a:r>
+            <a:r>
+              <a:rPr lang="en-GB" dirty="0"/>
+              <a:t>c</a:t>
+            </a:r>
+            <a:r>
+              <a:rPr lang="en-150" dirty="0"/>
+              <a:t>c</a:t>
+            </a:r>
+            <a:r>
+              <a:rPr lang="en-GB" dirty="0"/>
+              <a:t>e</a:t>
+            </a:r>
+            <a:r>
+              <a:rPr lang="en-150" dirty="0"/>
+              <a:t>s</a:t>
+            </a:r>
+            <a:r>
+              <a:rPr lang="en-GB" dirty="0"/>
+              <a:t>s</a:t>
+            </a:r>
+            <a:r>
+              <a:rPr lang="en-150" dirty="0"/>
+              <a:t>i</a:t>
+            </a:r>
+            <a:r>
+              <a:rPr lang="en-GB" dirty="0"/>
+              <a:t>o</a:t>
+            </a:r>
+            <a:r>
+              <a:rPr lang="en-150" dirty="0"/>
+              <a:t>n </a:t>
+            </a:r>
+            <a:r>
+              <a:rPr lang="en-GB" dirty="0"/>
+              <a:t>o</a:t>
+            </a:r>
+            <a:r>
+              <a:rPr lang="en-150" dirty="0"/>
+              <a:t>f </a:t>
+            </a:r>
+            <a:r>
+              <a:rPr lang="en-GB" dirty="0"/>
+              <a:t>b</a:t>
+            </a:r>
+            <a:r>
+              <a:rPr lang="en-150" dirty="0"/>
+              <a:t>u</a:t>
+            </a:r>
+            <a:r>
+              <a:rPr lang="en-GB" dirty="0"/>
+              <a:t>n</a:t>
+            </a:r>
+            <a:r>
+              <a:rPr lang="en-150" dirty="0"/>
+              <a:t>d</a:t>
+            </a:r>
+            <a:r>
+              <a:rPr lang="en-GB" dirty="0"/>
+              <a:t>l</a:t>
+            </a:r>
+            <a:r>
+              <a:rPr lang="en-150" dirty="0"/>
+              <a:t>e</a:t>
+            </a:r>
+            <a:r>
+              <a:rPr lang="en-GB" dirty="0"/>
+              <a:t>s</a:t>
+            </a:r>
+            <a:endParaRPr lang="en-150" dirty="0"/>
+          </a:p>
+          <a:p>
+            <a:pPr lvl="2"/>
+            <a:r>
+              <a:rPr lang="en-150" dirty="0"/>
+              <a:t>Our limited-preemptive definition comes from here</a:t>
+            </a:r>
+          </a:p>
+        </p:txBody>
+      </p:sp>
+      <p:sp>
+        <p:nvSpPr>
+          <p:cNvPr id="4" name="Slide Number Placeholder 3">
+            <a:extLst>
+              <a:ext uri="{FF2B5EF4-FFF2-40B4-BE49-F238E27FC236}">
+                <a16:creationId xmlns:a16="http://schemas.microsoft.com/office/drawing/2014/main" id="{FF40137C-F653-40C2-B18A-E7333D5550ED}"/>
+              </a:ext>
+            </a:extLst>
+          </p:cNvPr>
+          <p:cNvSpPr>
+            <a:spLocks noGrp="1"/>
+          </p:cNvSpPr>
+          <p:nvPr>
+            <p:ph type="sldNum" sz="quarter" idx="12"/>
+          </p:nvPr>
+        </p:nvSpPr>
+        <p:spPr/>
+        <p:txBody>
+          <a:bodyPr/>
+          <a:lstStyle/>
+          <a:p>
+            <a:fld id="{6565F0C3-D9E9-4961-A3A4-87F2116D4289}" type="slidenum">
+              <a:rPr lang="en-GB" smtClean="0"/>
+              <a:t>8</a:t>
+            </a:fld>
+            <a:endParaRPr lang="en-GB" dirty="0"/>
+          </a:p>
+        </p:txBody>
+      </p:sp>
+      <p:sp>
+        <p:nvSpPr>
+          <p:cNvPr id="5" name="TextBox 4">
+            <a:extLst>
+              <a:ext uri="{FF2B5EF4-FFF2-40B4-BE49-F238E27FC236}">
+                <a16:creationId xmlns:a16="http://schemas.microsoft.com/office/drawing/2014/main" id="{374BDFA7-9760-4F17-BA63-549C8364FEE0}"/>
+              </a:ext>
+            </a:extLst>
+          </p:cNvPr>
+          <p:cNvSpPr txBox="1"/>
+          <p:nvPr/>
+        </p:nvSpPr>
+        <p:spPr>
+          <a:xfrm>
+            <a:off x="1965435" y="6230227"/>
+            <a:ext cx="1860331" cy="338554"/>
+          </a:xfrm>
+          <a:prstGeom prst="rect">
+            <a:avLst/>
+          </a:prstGeom>
+          <a:noFill/>
+        </p:spPr>
+        <p:txBody>
+          <a:bodyPr wrap="square" rtlCol="0">
+            <a:spAutoFit/>
+          </a:bodyPr>
+          <a:lstStyle/>
+          <a:p>
+            <a:r>
+              <a:rPr lang="en-150" sz="1600" baseline="30000" dirty="0">
+                <a:solidFill>
+                  <a:srgbClr val="FFFFFF"/>
+                </a:solidFill>
+                <a:latin typeface="+mj-lt"/>
+                <a:ea typeface="Noto Sans CJK SC" pitchFamily="2"/>
+                <a:cs typeface="Arial" panose="020B0604020202020204" pitchFamily="34" charset="0"/>
+              </a:rPr>
+              <a:t>[1]</a:t>
+            </a:r>
+            <a:r>
+              <a:rPr lang="en-GB" sz="1600" dirty="0">
+                <a:solidFill>
+                  <a:srgbClr val="FFFFFF"/>
+                </a:solidFill>
+                <a:latin typeface="+mj-lt"/>
+                <a:ea typeface="Noto Sans CJK SC" pitchFamily="2"/>
+                <a:cs typeface="Arial" panose="020B0604020202020204" pitchFamily="34" charset="0"/>
+              </a:rPr>
+              <a:t>Ousterhout, 1982</a:t>
+            </a:r>
+            <a:endParaRPr lang="en-GB" sz="1600" dirty="0">
+              <a:latin typeface="+mj-lt"/>
+              <a:cs typeface="Arial" panose="020B0604020202020204" pitchFamily="34" charset="0"/>
+            </a:endParaRPr>
+          </a:p>
+        </p:txBody>
+      </p:sp>
+      <p:sp>
+        <p:nvSpPr>
+          <p:cNvPr id="6" name="Rectangle 5">
+            <a:extLst>
+              <a:ext uri="{FF2B5EF4-FFF2-40B4-BE49-F238E27FC236}">
+                <a16:creationId xmlns:a16="http://schemas.microsoft.com/office/drawing/2014/main" id="{177CB406-3919-47F1-9CDC-EA2140840398}"/>
+              </a:ext>
+            </a:extLst>
+          </p:cNvPr>
+          <p:cNvSpPr/>
+          <p:nvPr/>
+        </p:nvSpPr>
+        <p:spPr>
+          <a:xfrm>
+            <a:off x="1970201" y="6509688"/>
+            <a:ext cx="2233938" cy="338554"/>
+          </a:xfrm>
+          <a:prstGeom prst="rect">
+            <a:avLst/>
+          </a:prstGeom>
+          <a:noFill/>
+        </p:spPr>
+        <p:txBody>
+          <a:bodyPr wrap="square" rtlCol="0">
+            <a:spAutoFit/>
+          </a:bodyPr>
+          <a:lstStyle/>
+          <a:p>
+            <a:r>
+              <a:rPr lang="en-150" sz="1600" baseline="30000" dirty="0">
+                <a:solidFill>
+                  <a:srgbClr val="FFFFFF"/>
+                </a:solidFill>
+                <a:latin typeface="+mj-lt"/>
+                <a:cs typeface="Arial" panose="020B0604020202020204" pitchFamily="34" charset="0"/>
+              </a:rPr>
+              <a:t>[2]</a:t>
+            </a:r>
+            <a:r>
+              <a:rPr lang="en-GB" sz="1600" dirty="0">
+                <a:solidFill>
+                  <a:srgbClr val="FFFFFF"/>
+                </a:solidFill>
+                <a:latin typeface="+mj-lt"/>
+                <a:cs typeface="Arial" panose="020B0604020202020204" pitchFamily="34" charset="0"/>
+              </a:rPr>
+              <a:t>Goossens et al., 2010</a:t>
+            </a:r>
+          </a:p>
+        </p:txBody>
+      </p:sp>
+      <p:sp>
+        <p:nvSpPr>
+          <p:cNvPr id="7" name="TextBox 6">
+            <a:extLst>
+              <a:ext uri="{FF2B5EF4-FFF2-40B4-BE49-F238E27FC236}">
+                <a16:creationId xmlns:a16="http://schemas.microsoft.com/office/drawing/2014/main" id="{C90DA36A-725C-4698-8AB5-96B138DAB20A}"/>
+              </a:ext>
+            </a:extLst>
+          </p:cNvPr>
+          <p:cNvSpPr txBox="1"/>
+          <p:nvPr/>
+        </p:nvSpPr>
+        <p:spPr>
+          <a:xfrm>
+            <a:off x="4204139" y="6231435"/>
+            <a:ext cx="2233937" cy="338554"/>
+          </a:xfrm>
+          <a:prstGeom prst="rect">
+            <a:avLst/>
+          </a:prstGeom>
+          <a:noFill/>
+        </p:spPr>
+        <p:txBody>
+          <a:bodyPr wrap="square" rtlCol="0">
+            <a:spAutoFit/>
+          </a:bodyPr>
+          <a:lstStyle>
+            <a:defPPr>
+              <a:defRPr lang="en-US"/>
+            </a:defPPr>
+            <a:lvl1pPr>
+              <a:defRPr sz="1600" baseline="30000">
+                <a:solidFill>
+                  <a:srgbClr val="FFFFFF"/>
+                </a:solidFill>
+                <a:latin typeface="+mj-lt"/>
+                <a:cs typeface="Arial" panose="020B0604020202020204" pitchFamily="34" charset="0"/>
+              </a:defRPr>
+            </a:lvl1pPr>
+          </a:lstStyle>
+          <a:p>
+            <a:r>
+              <a:rPr lang="en-GB" dirty="0"/>
+              <a:t>[</a:t>
+            </a:r>
+            <a:r>
+              <a:rPr lang="en-150" dirty="0"/>
+              <a:t>3</a:t>
+            </a:r>
+            <a:r>
+              <a:rPr lang="en-GB" dirty="0"/>
+              <a:t>]</a:t>
+            </a:r>
+            <a:r>
+              <a:rPr lang="en-GB" baseline="0" dirty="0"/>
+              <a:t>Goossens et al., 2016</a:t>
+            </a:r>
+          </a:p>
+        </p:txBody>
+      </p:sp>
+      <p:sp>
+        <p:nvSpPr>
+          <p:cNvPr id="8" name="Rectangle 7">
+            <a:extLst>
+              <a:ext uri="{FF2B5EF4-FFF2-40B4-BE49-F238E27FC236}">
+                <a16:creationId xmlns:a16="http://schemas.microsoft.com/office/drawing/2014/main" id="{ABD7AEE6-C2FA-4ABD-9DE7-114CBD552E90}"/>
+              </a:ext>
+            </a:extLst>
+          </p:cNvPr>
+          <p:cNvSpPr/>
+          <p:nvPr/>
+        </p:nvSpPr>
+        <p:spPr>
+          <a:xfrm>
+            <a:off x="4204139" y="6505185"/>
+            <a:ext cx="2038129" cy="338554"/>
+          </a:xfrm>
+          <a:prstGeom prst="rect">
+            <a:avLst/>
+          </a:prstGeom>
+          <a:noFill/>
+        </p:spPr>
+        <p:txBody>
+          <a:bodyPr wrap="square" rtlCol="0">
+            <a:spAutoFit/>
+          </a:bodyPr>
+          <a:lstStyle/>
+          <a:p>
+            <a:r>
+              <a:rPr lang="en-GB" sz="1600" baseline="30000" dirty="0">
+                <a:solidFill>
+                  <a:srgbClr val="FFFFFF"/>
+                </a:solidFill>
+                <a:latin typeface="+mj-lt"/>
+                <a:cs typeface="Arial" panose="020B0604020202020204" pitchFamily="34" charset="0"/>
+              </a:rPr>
+              <a:t>[</a:t>
+            </a:r>
+            <a:r>
+              <a:rPr lang="en-150" sz="1600" baseline="30000" dirty="0">
+                <a:solidFill>
+                  <a:srgbClr val="FFFFFF"/>
+                </a:solidFill>
+                <a:latin typeface="+mj-lt"/>
+                <a:cs typeface="Arial" panose="020B0604020202020204" pitchFamily="34" charset="0"/>
+              </a:rPr>
+              <a:t>4</a:t>
+            </a:r>
+            <a:r>
+              <a:rPr lang="en-GB" sz="1600" baseline="30000" dirty="0">
+                <a:solidFill>
+                  <a:srgbClr val="FFFFFF"/>
+                </a:solidFill>
+                <a:latin typeface="+mj-lt"/>
+                <a:cs typeface="Arial" panose="020B0604020202020204" pitchFamily="34" charset="0"/>
+              </a:rPr>
+              <a:t>]</a:t>
+            </a:r>
+            <a:r>
+              <a:rPr lang="en-GB" sz="1600" dirty="0">
+                <a:solidFill>
+                  <a:srgbClr val="FFFFFF"/>
+                </a:solidFill>
+                <a:latin typeface="+mj-lt"/>
+                <a:cs typeface="Arial" panose="020B0604020202020204" pitchFamily="34" charset="0"/>
+              </a:rPr>
+              <a:t>Berten et al., 2011</a:t>
+            </a:r>
+          </a:p>
+        </p:txBody>
+      </p:sp>
+      <p:sp>
+        <p:nvSpPr>
+          <p:cNvPr id="9" name="Rectangle 8">
+            <a:extLst>
+              <a:ext uri="{FF2B5EF4-FFF2-40B4-BE49-F238E27FC236}">
+                <a16:creationId xmlns:a16="http://schemas.microsoft.com/office/drawing/2014/main" id="{BF952FAB-C182-4EE4-9293-695C1BDAB1CE}"/>
+              </a:ext>
+            </a:extLst>
+          </p:cNvPr>
+          <p:cNvSpPr/>
+          <p:nvPr/>
+        </p:nvSpPr>
+        <p:spPr>
+          <a:xfrm>
+            <a:off x="6438076" y="6230227"/>
+            <a:ext cx="1989573" cy="338554"/>
+          </a:xfrm>
+          <a:prstGeom prst="rect">
+            <a:avLst/>
+          </a:prstGeom>
+          <a:noFill/>
+        </p:spPr>
+        <p:txBody>
+          <a:bodyPr wrap="square" rtlCol="0">
+            <a:spAutoFit/>
+          </a:bodyPr>
+          <a:lstStyle/>
+          <a:p>
+            <a:r>
+              <a:rPr lang="en-GB" sz="1600" baseline="30000" dirty="0">
+                <a:solidFill>
+                  <a:srgbClr val="FFFFFF"/>
+                </a:solidFill>
+                <a:latin typeface="+mj-lt"/>
+                <a:cs typeface="Arial" panose="020B0604020202020204" pitchFamily="34" charset="0"/>
+              </a:rPr>
+              <a:t>[4]</a:t>
+            </a:r>
+            <a:r>
+              <a:rPr lang="en-GB" sz="1600" dirty="0">
+                <a:solidFill>
+                  <a:srgbClr val="FFFFFF"/>
+                </a:solidFill>
+                <a:latin typeface="+mj-lt"/>
+                <a:cs typeface="Arial" panose="020B0604020202020204" pitchFamily="34" charset="0"/>
+              </a:rPr>
+              <a:t>Wasly et al., 2017</a:t>
+            </a:r>
+          </a:p>
+        </p:txBody>
+      </p:sp>
+    </p:spTree>
+    <p:extLst>
+      <p:ext uri="{BB962C8B-B14F-4D97-AF65-F5344CB8AC3E}">
+        <p14:creationId xmlns:p14="http://schemas.microsoft.com/office/powerpoint/2010/main" val="1948147825"/>
+      </p:ext>
+    </p:extLst>
+  </p:cSld>
+  <p:clrMapOvr>
+    <a:masterClrMapping/>
+  </p:clrMapOvr>
+  <p:timing>
+    <p:tnLst>
+      <p:par>
+        <p:cTn id="1" dur="indefinite" restart="never" nodeType="tmRoot">
+          <p:childTnLst>
+            <p:seq concurrent="1" nextAc="seek">
+              <p:cTn id="2" dur="indefinite" nodeType="mainSeq">
+                <p:childTnLst>
+                  <p:par>
+                    <p:cTn id="3" fill="hold">
+                      <p:stCondLst>
+                        <p:cond delay="indefinite"/>
+                      </p:stCondLst>
+                      <p:childTnLst>
+                        <p:par>
+                          <p:cTn id="4" fill="hold">
+                            <p:stCondLst>
+                              <p:cond delay="0"/>
+                            </p:stCondLst>
+                            <p:childTnLst>
+                              <p:par>
+                                <p:cTn id="5" presetID="1" presetClass="entr" presetSubtype="0" fill="hold" grpId="0" nodeType="clickEffect">
+                                  <p:stCondLst>
+                                    <p:cond delay="0"/>
+                                  </p:stCondLst>
+                                  <p:childTnLst>
+                                    <p:set>
+                                      <p:cBhvr>
+                                        <p:cTn id="6" dur="1" fill="hold">
+                                          <p:stCondLst>
+                                            <p:cond delay="0"/>
+                                          </p:stCondLst>
+                                        </p:cTn>
+                                        <p:tgtEl>
+                                          <p:spTgt spid="3">
+                                            <p:txEl>
+                                              <p:pRg st="0" end="0"/>
+                                            </p:txEl>
+                                          </p:spTgt>
+                                        </p:tgtEl>
+                                        <p:attrNameLst>
+                                          <p:attrName>style.visibility</p:attrName>
+                                        </p:attrNameLst>
+                                      </p:cBhvr>
+                                      <p:to>
+                                        <p:strVal val="visible"/>
+                                      </p:to>
+                                    </p:set>
+                                  </p:childTnLst>
+                                </p:cTn>
+                              </p:par>
+                              <p:par>
+                                <p:cTn id="7" presetID="1" presetClass="entr" presetSubtype="0" fill="hold" grpId="0" nodeType="withEffect">
+                                  <p:stCondLst>
+                                    <p:cond delay="0"/>
+                                  </p:stCondLst>
+                                  <p:childTnLst>
+                                    <p:set>
+                                      <p:cBhvr>
+                                        <p:cTn id="8" dur="1" fill="hold">
+                                          <p:stCondLst>
+                                            <p:cond delay="0"/>
+                                          </p:stCondLst>
+                                        </p:cTn>
+                                        <p:tgtEl>
+                                          <p:spTgt spid="5"/>
+                                        </p:tgtEl>
+                                        <p:attrNameLst>
+                                          <p:attrName>style.visibility</p:attrName>
+                                        </p:attrNameLst>
+                                      </p:cBhvr>
+                                      <p:to>
+                                        <p:strVal val="visible"/>
+                                      </p:to>
+                                    </p:set>
+                                  </p:childTnLst>
+                                </p:cTn>
+                              </p:par>
+                            </p:childTnLst>
+                          </p:cTn>
+                        </p:par>
+                      </p:childTnLst>
+                    </p:cTn>
+                  </p:par>
+                  <p:par>
+                    <p:cTn id="9" fill="hold">
+                      <p:stCondLst>
+                        <p:cond delay="indefinite"/>
+                      </p:stCondLst>
+                      <p:childTnLst>
+                        <p:par>
+                          <p:cTn id="10" fill="hold">
+                            <p:stCondLst>
+                              <p:cond delay="0"/>
+                            </p:stCondLst>
+                            <p:childTnLst>
+                              <p:par>
+                                <p:cTn id="11" presetID="1" presetClass="entr" presetSubtype="0" fill="hold" grpId="0" nodeType="clickEffect">
+                                  <p:stCondLst>
+                                    <p:cond delay="0"/>
+                                  </p:stCondLst>
+                                  <p:childTnLst>
+                                    <p:set>
+                                      <p:cBhvr>
+                                        <p:cTn id="12" dur="1" fill="hold">
+                                          <p:stCondLst>
+                                            <p:cond delay="0"/>
+                                          </p:stCondLst>
+                                        </p:cTn>
+                                        <p:tgtEl>
+                                          <p:spTgt spid="3">
+                                            <p:txEl>
+                                              <p:pRg st="1" end="1"/>
+                                            </p:txEl>
+                                          </p:spTgt>
+                                        </p:tgtEl>
+                                        <p:attrNameLst>
+                                          <p:attrName>style.visibility</p:attrName>
+                                        </p:attrNameLst>
+                                      </p:cBhvr>
+                                      <p:to>
+                                        <p:strVal val="visible"/>
+                                      </p:to>
+                                    </p:set>
+                                  </p:childTnLst>
+                                </p:cTn>
+                              </p:par>
+                            </p:childTnLst>
+                          </p:cTn>
+                        </p:par>
+                      </p:childTnLst>
+                    </p:cTn>
+                  </p:par>
+                  <p:par>
+                    <p:cTn id="13" fill="hold">
+                      <p:stCondLst>
+                        <p:cond delay="indefinite"/>
+                      </p:stCondLst>
+                      <p:childTnLst>
+                        <p:par>
+                          <p:cTn id="14" fill="hold">
+                            <p:stCondLst>
+                              <p:cond delay="0"/>
+                            </p:stCondLst>
+                            <p:childTnLst>
+                              <p:par>
+                                <p:cTn id="15" presetID="1" presetClass="entr" presetSubtype="0" fill="hold" grpId="0" nodeType="clickEffect">
+                                  <p:stCondLst>
+                                    <p:cond delay="0"/>
+                                  </p:stCondLst>
+                                  <p:childTnLst>
+                                    <p:set>
+                                      <p:cBhvr>
+                                        <p:cTn id="16" dur="1" fill="hold">
+                                          <p:stCondLst>
+                                            <p:cond delay="0"/>
+                                          </p:stCondLst>
+                                        </p:cTn>
+                                        <p:tgtEl>
+                                          <p:spTgt spid="3">
+                                            <p:txEl>
+                                              <p:pRg st="2" end="2"/>
+                                            </p:txEl>
+                                          </p:spTgt>
+                                        </p:tgtEl>
+                                        <p:attrNameLst>
+                                          <p:attrName>style.visibility</p:attrName>
+                                        </p:attrNameLst>
+                                      </p:cBhvr>
+                                      <p:to>
+                                        <p:strVal val="visible"/>
+                                      </p:to>
+                                    </p:set>
+                                  </p:childTnLst>
+                                </p:cTn>
+                              </p:par>
+                              <p:par>
+                                <p:cTn id="17" presetID="1" presetClass="entr" presetSubtype="0" fill="hold" grpId="0" nodeType="withEffect">
+                                  <p:stCondLst>
+                                    <p:cond delay="0"/>
+                                  </p:stCondLst>
+                                  <p:childTnLst>
+                                    <p:set>
+                                      <p:cBhvr>
+                                        <p:cTn id="18" dur="1" fill="hold">
+                                          <p:stCondLst>
+                                            <p:cond delay="0"/>
+                                          </p:stCondLst>
+                                        </p:cTn>
+                                        <p:tgtEl>
+                                          <p:spTgt spid="6"/>
+                                        </p:tgtEl>
+                                        <p:attrNameLst>
+                                          <p:attrName>style.visibility</p:attrName>
+                                        </p:attrNameLst>
+                                      </p:cBhvr>
+                                      <p:to>
+                                        <p:strVal val="visible"/>
+                                      </p:to>
+                                    </p:set>
+                                  </p:childTnLst>
+                                </p:cTn>
+                              </p:par>
+                            </p:childTnLst>
+                          </p:cTn>
+                        </p:par>
+                      </p:childTnLst>
+                    </p:cTn>
+                  </p:par>
+                  <p:par>
+                    <p:cTn id="19" fill="hold">
+                      <p:stCondLst>
+                        <p:cond delay="indefinite"/>
+                      </p:stCondLst>
+                      <p:childTnLst>
+                        <p:par>
+                          <p:cTn id="20" fill="hold">
+                            <p:stCondLst>
+                              <p:cond delay="0"/>
+                            </p:stCondLst>
+                            <p:childTnLst>
+                              <p:par>
+                                <p:cTn id="21" presetID="1" presetClass="entr" presetSubtype="0" fill="hold" grpId="0" nodeType="clickEffect">
+                                  <p:stCondLst>
+                                    <p:cond delay="0"/>
+                                  </p:stCondLst>
+                                  <p:childTnLst>
+                                    <p:set>
+                                      <p:cBhvr>
+                                        <p:cTn id="22" dur="1" fill="hold">
+                                          <p:stCondLst>
+                                            <p:cond delay="0"/>
+                                          </p:stCondLst>
+                                        </p:cTn>
+                                        <p:tgtEl>
+                                          <p:spTgt spid="3">
+                                            <p:txEl>
+                                              <p:pRg st="3" end="3"/>
+                                            </p:txEl>
+                                          </p:spTgt>
+                                        </p:tgtEl>
+                                        <p:attrNameLst>
+                                          <p:attrName>style.visibility</p:attrName>
+                                        </p:attrNameLst>
+                                      </p:cBhvr>
+                                      <p:to>
+                                        <p:strVal val="visible"/>
+                                      </p:to>
+                                    </p:set>
+                                  </p:childTnLst>
+                                </p:cTn>
+                              </p:par>
+                              <p:par>
+                                <p:cTn id="23" presetID="1" presetClass="entr" presetSubtype="0" fill="hold" grpId="0" nodeType="withEffect">
+                                  <p:stCondLst>
+                                    <p:cond delay="0"/>
+                                  </p:stCondLst>
+                                  <p:childTnLst>
+                                    <p:set>
+                                      <p:cBhvr>
+                                        <p:cTn id="24" dur="1" fill="hold">
+                                          <p:stCondLst>
+                                            <p:cond delay="0"/>
+                                          </p:stCondLst>
+                                        </p:cTn>
+                                        <p:tgtEl>
+                                          <p:spTgt spid="3">
+                                            <p:txEl>
+                                              <p:pRg st="4" end="4"/>
+                                            </p:txEl>
+                                          </p:spTgt>
+                                        </p:tgtEl>
+                                        <p:attrNameLst>
+                                          <p:attrName>style.visibility</p:attrName>
+                                        </p:attrNameLst>
+                                      </p:cBhvr>
+                                      <p:to>
+                                        <p:strVal val="visible"/>
+                                      </p:to>
+                                    </p:set>
+                                  </p:childTnLst>
+                                </p:cTn>
+                              </p:par>
+                              <p:par>
+                                <p:cTn id="25" presetID="1" presetClass="entr" presetSubtype="0" fill="hold" grpId="0" nodeType="withEffect">
+                                  <p:stCondLst>
+                                    <p:cond delay="0"/>
+                                  </p:stCondLst>
+                                  <p:childTnLst>
+                                    <p:set>
+                                      <p:cBhvr>
+                                        <p:cTn id="26" dur="1" fill="hold">
+                                          <p:stCondLst>
+                                            <p:cond delay="0"/>
+                                          </p:stCondLst>
+                                        </p:cTn>
+                                        <p:tgtEl>
+                                          <p:spTgt spid="3">
+                                            <p:txEl>
+                                              <p:pRg st="5" end="5"/>
+                                            </p:txEl>
+                                          </p:spTgt>
+                                        </p:tgtEl>
+                                        <p:attrNameLst>
+                                          <p:attrName>style.visibility</p:attrName>
+                                        </p:attrNameLst>
+                                      </p:cBhvr>
+                                      <p:to>
+                                        <p:strVal val="visible"/>
+                                      </p:to>
+                                    </p:set>
+                                  </p:childTnLst>
+                                </p:cTn>
+                              </p:par>
+                              <p:par>
+                                <p:cTn id="27" presetID="1" presetClass="entr" presetSubtype="0" fill="hold" grpId="0" nodeType="withEffect">
+                                  <p:stCondLst>
+                                    <p:cond delay="0"/>
+                                  </p:stCondLst>
+                                  <p:childTnLst>
+                                    <p:set>
+                                      <p:cBhvr>
+                                        <p:cTn id="28" dur="1" fill="hold">
+                                          <p:stCondLst>
+                                            <p:cond delay="0"/>
+                                          </p:stCondLst>
+                                        </p:cTn>
+                                        <p:tgtEl>
+                                          <p:spTgt spid="7"/>
+                                        </p:tgtEl>
+                                        <p:attrNameLst>
+                                          <p:attrName>style.visibility</p:attrName>
+                                        </p:attrNameLst>
+                                      </p:cBhvr>
+                                      <p:to>
+                                        <p:strVal val="visible"/>
+                                      </p:to>
+                                    </p:set>
+                                  </p:childTnLst>
+                                </p:cTn>
+                              </p:par>
+                              <p:par>
+                                <p:cTn id="29" presetID="1" presetClass="entr" presetSubtype="0" fill="hold" grpId="0" nodeType="withEffect">
+                                  <p:stCondLst>
+                                    <p:cond delay="0"/>
+                                  </p:stCondLst>
+                                  <p:childTnLst>
+                                    <p:set>
+                                      <p:cBhvr>
+                                        <p:cTn id="30" dur="1" fill="hold">
+                                          <p:stCondLst>
+                                            <p:cond delay="0"/>
+                                          </p:stCondLst>
+                                        </p:cTn>
+                                        <p:tgtEl>
+                                          <p:spTgt spid="8"/>
+                                        </p:tgtEl>
+                                        <p:attrNameLst>
+                                          <p:attrName>style.visibility</p:attrName>
+                                        </p:attrNameLst>
+                                      </p:cBhvr>
+                                      <p:to>
+                                        <p:strVal val="visible"/>
+                                      </p:to>
+                                    </p:set>
+                                  </p:childTnLst>
+                                </p:cTn>
+                              </p:par>
+                            </p:childTnLst>
+                          </p:cTn>
+                        </p:par>
+                      </p:childTnLst>
+                    </p:cTn>
+                  </p:par>
+                  <p:par>
+                    <p:cTn id="31" fill="hold">
+                      <p:stCondLst>
+                        <p:cond delay="indefinite"/>
+                      </p:stCondLst>
+                      <p:childTnLst>
+                        <p:par>
+                          <p:cTn id="32" fill="hold">
+                            <p:stCondLst>
+                              <p:cond delay="0"/>
+                            </p:stCondLst>
+                            <p:childTnLst>
+                              <p:par>
+                                <p:cTn id="33" presetID="1" presetClass="entr" presetSubtype="0" fill="hold" grpId="0" nodeType="clickEffect">
+                                  <p:stCondLst>
+                                    <p:cond delay="0"/>
+                                  </p:stCondLst>
+                                  <p:childTnLst>
+                                    <p:set>
+                                      <p:cBhvr>
+                                        <p:cTn id="34" dur="1" fill="hold">
+                                          <p:stCondLst>
+                                            <p:cond delay="0"/>
+                                          </p:stCondLst>
+                                        </p:cTn>
+                                        <p:tgtEl>
+                                          <p:spTgt spid="3">
+                                            <p:txEl>
+                                              <p:pRg st="6" end="6"/>
+                                            </p:txEl>
+                                          </p:spTgt>
+                                        </p:tgtEl>
+                                        <p:attrNameLst>
+                                          <p:attrName>style.visibility</p:attrName>
+                                        </p:attrNameLst>
+                                      </p:cBhvr>
+                                      <p:to>
+                                        <p:strVal val="visible"/>
+                                      </p:to>
+                                    </p:set>
+                                  </p:childTnLst>
+                                </p:cTn>
+                              </p:par>
+                              <p:par>
+                                <p:cTn id="35" presetID="1" presetClass="entr" presetSubtype="0" fill="hold" grpId="0" nodeType="withEffect">
+                                  <p:stCondLst>
+                                    <p:cond delay="0"/>
+                                  </p:stCondLst>
+                                  <p:childTnLst>
+                                    <p:set>
+                                      <p:cBhvr>
+                                        <p:cTn id="36" dur="1" fill="hold">
+                                          <p:stCondLst>
+                                            <p:cond delay="0"/>
+                                          </p:stCondLst>
+                                        </p:cTn>
+                                        <p:tgtEl>
+                                          <p:spTgt spid="3">
+                                            <p:txEl>
+                                              <p:pRg st="7" end="7"/>
+                                            </p:txEl>
+                                          </p:spTgt>
+                                        </p:tgtEl>
+                                        <p:attrNameLst>
+                                          <p:attrName>style.visibility</p:attrName>
+                                        </p:attrNameLst>
+                                      </p:cBhvr>
+                                      <p:to>
+                                        <p:strVal val="visible"/>
+                                      </p:to>
+                                    </p:set>
+                                  </p:childTnLst>
+                                </p:cTn>
+                              </p:par>
+                              <p:par>
+                                <p:cTn id="37" presetID="1" presetClass="entr" presetSubtype="0" fill="hold" grpId="0" nodeType="withEffect">
+                                  <p:stCondLst>
+                                    <p:cond delay="0"/>
+                                  </p:stCondLst>
+                                  <p:childTnLst>
+                                    <p:set>
+                                      <p:cBhvr>
+                                        <p:cTn id="38" dur="1" fill="hold">
+                                          <p:stCondLst>
+                                            <p:cond delay="0"/>
+                                          </p:stCondLst>
+                                        </p:cTn>
+                                        <p:tgtEl>
+                                          <p:spTgt spid="9"/>
+                                        </p:tgtEl>
+                                        <p:attrNameLst>
+                                          <p:attrName>style.visibility</p:attrName>
+                                        </p:attrNameLst>
+                                      </p:cBhvr>
+                                      <p:to>
+                                        <p:strVal val="visible"/>
+                                      </p:to>
+                                    </p:set>
+                                  </p:childTnLst>
+                                </p:cTn>
+                              </p:par>
+                              <p:par>
+                                <p:cTn id="39" presetID="1" presetClass="entr" presetSubtype="0" fill="hold" grpId="0" nodeType="withEffect">
+                                  <p:stCondLst>
+                                    <p:cond delay="0"/>
+                                  </p:stCondLst>
+                                  <p:childTnLst>
+                                    <p:set>
+                                      <p:cBhvr>
+                                        <p:cTn id="40" dur="1" fill="hold">
+                                          <p:stCondLst>
+                                            <p:cond delay="0"/>
+                                          </p:stCondLst>
+                                        </p:cTn>
+                                        <p:tgtEl>
+                                          <p:spTgt spid="3">
+                                            <p:txEl>
+                                              <p:pRg st="8" end="8"/>
+                                            </p:txEl>
+                                          </p:spTgt>
+                                        </p:tgtEl>
+                                        <p:attrNameLst>
+                                          <p:attrName>style.visibility</p:attrName>
+                                        </p:attrNameLst>
+                                      </p:cBhvr>
+                                      <p:to>
+                                        <p:strVal val="visible"/>
+                                      </p:to>
+                                    </p:set>
+                                  </p:childTnLst>
+                                </p:cTn>
+                              </p:par>
+                            </p:childTnLst>
+                          </p:cTn>
+                        </p:par>
+                      </p:childTnLst>
+                    </p:cTn>
+                  </p:par>
+                </p:childTnLst>
+              </p:cTn>
+              <p:prevCondLst>
+                <p:cond evt="onPrev" delay="0">
+                  <p:tgtEl>
+                    <p:sldTgt/>
+                  </p:tgtEl>
+                </p:cond>
+              </p:prevCondLst>
+              <p:nextCondLst>
+                <p:cond evt="onNext" delay="0">
+                  <p:tgtEl>
+                    <p:sldTgt/>
+                  </p:tgtEl>
+                </p:cond>
+              </p:nextCondLst>
+            </p:seq>
+          </p:childTnLst>
+        </p:cTn>
+      </p:par>
+    </p:tnLst>
+    <p:bldLst>
+      <p:bldP spid="3" grpId="0" uiExpand="1" build="p"/>
+      <p:bldP spid="5" grpId="0"/>
+      <p:bldP spid="6" grpId="0"/>
+      <p:bldP spid="7" grpId="0"/>
+      <p:bldP spid="8" grpId="0"/>
+      <p:bldP spid="9" grpId="0"/>
+    </p:bldLst>
+  </p:timing>
+</p:sld>
+</file>
+
+<file path=ppt/slides/slide9.xml><?xml version="1.0" encoding="utf-8"?>
+<p:sld xmlns:a="http://schemas.openxmlformats.org/drawingml/2006/main" xmlns:r="http://schemas.openxmlformats.org/officeDocument/2006/relationships" xmlns:p="http://schemas.openxmlformats.org/presentationml/2006/main">
+  <p:cSld>
+    <p:spTree>
+      <p:nvGrpSpPr>
+        <p:cNvPr id="1" name=""/>
+        <p:cNvGrpSpPr/>
+        <p:nvPr/>
+      </p:nvGrpSpPr>
+      <p:grpSpPr>
+        <a:xfrm>
+          <a:off x="0" y="0"/>
+          <a:ext cx="0" cy="0"/>
+          <a:chOff x="0" y="0"/>
+          <a:chExt cx="0" cy="0"/>
+        </a:xfrm>
+      </p:grpSpPr>
+      <p:sp>
+        <p:nvSpPr>
+          <p:cNvPr id="2" name="Title 1">
+            <a:extLst>
+              <a:ext uri="{FF2B5EF4-FFF2-40B4-BE49-F238E27FC236}">
+                <a16:creationId xmlns:a16="http://schemas.microsoft.com/office/drawing/2014/main" id="{0EE24D4B-C6E4-46E8-800B-B31B15B9C01D}"/>
+              </a:ext>
+            </a:extLst>
+          </p:cNvPr>
+          <p:cNvSpPr>
+            <a:spLocks noGrp="1"/>
+          </p:cNvSpPr>
+          <p:nvPr>
+            <p:ph type="title"/>
+          </p:nvPr>
+        </p:nvSpPr>
+        <p:spPr/>
+        <p:txBody>
+          <a:bodyPr/>
+          <a:lstStyle/>
+          <a:p>
+            <a:r>
+              <a:rPr lang="en-150" dirty="0"/>
+              <a:t>Summarizing</a:t>
+            </a:r>
+            <a:endParaRPr lang="en-GB" dirty="0"/>
+          </a:p>
+        </p:txBody>
+      </p:sp>
+      <p:sp>
+        <p:nvSpPr>
+          <p:cNvPr id="4" name="Slide Number Placeholder 3">
+            <a:extLst>
+              <a:ext uri="{FF2B5EF4-FFF2-40B4-BE49-F238E27FC236}">
+                <a16:creationId xmlns:a16="http://schemas.microsoft.com/office/drawing/2014/main" id="{52B3402A-A4A9-4664-BAE6-9AF34DA43696}"/>
+              </a:ext>
+            </a:extLst>
+          </p:cNvPr>
+          <p:cNvSpPr>
+            <a:spLocks noGrp="1"/>
+          </p:cNvSpPr>
+          <p:nvPr>
+            <p:ph type="sldNum" sz="quarter" idx="12"/>
+          </p:nvPr>
+        </p:nvSpPr>
+        <p:spPr/>
+        <p:txBody>
+          <a:bodyPr/>
+          <a:lstStyle/>
+          <a:p>
+            <a:fld id="{6565F0C3-D9E9-4961-A3A4-87F2116D4289}" type="slidenum">
+              <a:rPr lang="en-GB" smtClean="0"/>
+              <a:t>9</a:t>
+            </a:fld>
+            <a:endParaRPr lang="en-GB" dirty="0"/>
+          </a:p>
+        </p:txBody>
+      </p:sp>
+      <p:pic>
+        <p:nvPicPr>
+          <p:cNvPr id="6" name="Picture 5" descr="A screenshot of a cell phone&#10;&#10;Description automatically generated">
+            <a:extLst>
+              <a:ext uri="{FF2B5EF4-FFF2-40B4-BE49-F238E27FC236}">
+                <a16:creationId xmlns:a16="http://schemas.microsoft.com/office/drawing/2014/main" id="{550A419C-D1B9-49FD-B4F6-0F3B2131475B}"/>
+              </a:ext>
+            </a:extLst>
+          </p:cNvPr>
+          <p:cNvPicPr>
+            <a:picLocks noChangeAspect="1"/>
+          </p:cNvPicPr>
+          <p:nvPr/>
+        </p:nvPicPr>
+        <p:blipFill>
+          <a:blip r:embed="rId2">
+            <a:extLst>
+              <a:ext uri="{28A0092B-C50C-407E-A947-70E740481C1C}">
+                <a14:useLocalDpi xmlns:a14="http://schemas.microsoft.com/office/drawing/2010/main" val="0"/>
+              </a:ext>
+            </a:extLst>
+          </a:blip>
+          <a:stretch>
+            <a:fillRect/>
+          </a:stretch>
+        </p:blipFill>
+        <p:spPr>
+          <a:xfrm>
+            <a:off x="491842" y="1597572"/>
+            <a:ext cx="11208316" cy="4167350"/>
+          </a:xfrm>
+          <a:prstGeom prst="rect">
+            <a:avLst/>
+          </a:prstGeom>
+        </p:spPr>
+      </p:pic>
+    </p:spTree>
+    <p:extLst>
+      <p:ext uri="{BB962C8B-B14F-4D97-AF65-F5344CB8AC3E}">
+        <p14:creationId xmlns:p14="http://schemas.microsoft.com/office/powerpoint/2010/main" val="3352319689"/>
+      </p:ext>
+    </p:extLst>
+  </p:cSld>
+  <p:clrMapOvr>
+    <a:masterClrMapping/>
+  </p:clrMapOvr>
 </p:sld>
 </file>
 

</xml_diff>

<commit_message>
Finished adding explanation of JLFP problem
</commit_message>
<xml_diff>
--- a/Notes/TFM_presentations/2020_02_24_v2/2020_02_24_v2.pptx
+++ b/Notes/TFM_presentations/2020_02_24_v2/2020_02_24_v2.pptx
@@ -14095,6 +14095,618 @@
           </a:prstGeom>
         </p:spPr>
       </p:pic>
+      <mc:AlternateContent xmlns:mc="http://schemas.openxmlformats.org/markup-compatibility/2006">
+        <mc:Choice xmlns:a14="http://schemas.microsoft.com/office/drawing/2010/main" Requires="a14">
+          <p:sp>
+            <p:nvSpPr>
+              <p:cNvPr id="18" name="TextBox 17">
+                <a:extLst>
+                  <a:ext uri="{FF2B5EF4-FFF2-40B4-BE49-F238E27FC236}">
+                    <a16:creationId xmlns:a16="http://schemas.microsoft.com/office/drawing/2014/main" id="{9B7F500E-8946-4B1A-9BBA-E4C390965BC5}"/>
+                  </a:ext>
+                </a:extLst>
+              </p:cNvPr>
+              <p:cNvSpPr txBox="1"/>
+              <p:nvPr/>
+            </p:nvSpPr>
+            <p:spPr>
+              <a:xfrm>
+                <a:off x="5312662" y="3919950"/>
+                <a:ext cx="1702217" cy="369332"/>
+              </a:xfrm>
+              <a:prstGeom prst="rect">
+                <a:avLst/>
+              </a:prstGeom>
+              <a:noFill/>
+            </p:spPr>
+            <p:txBody>
+              <a:bodyPr wrap="square" rtlCol="0">
+                <a:spAutoFit/>
+              </a:bodyPr>
+              <a:lstStyle/>
+              <a:p>
+                <a:r>
+                  <a:rPr lang="en-150" dirty="0"/>
+                  <a:t>S</a:t>
+                </a:r>
+                <a:r>
+                  <a:rPr lang="en-GB" dirty="0"/>
+                  <a:t>c</a:t>
+                </a:r>
+                <a:r>
+                  <a:rPr lang="en-150" dirty="0"/>
+                  <a:t>h</a:t>
+                </a:r>
+                <a:r>
+                  <a:rPr lang="en-GB" dirty="0"/>
+                  <a:t>e</a:t>
+                </a:r>
+                <a:r>
+                  <a:rPr lang="en-150" dirty="0"/>
+                  <a:t>d</a:t>
+                </a:r>
+                <a:r>
+                  <a:rPr lang="en-GB" dirty="0"/>
+                  <a:t>u</a:t>
+                </a:r>
+                <a:r>
+                  <a:rPr lang="en-150" dirty="0"/>
+                  <a:t>l</a:t>
+                </a:r>
+                <a:r>
+                  <a:rPr lang="en-GB" dirty="0"/>
+                  <a:t>i</a:t>
+                </a:r>
+                <a:r>
+                  <a:rPr lang="en-150" dirty="0"/>
+                  <a:t>n</a:t>
+                </a:r>
+                <a:r>
+                  <a:rPr lang="en-GB" dirty="0"/>
+                  <a:t>g</a:t>
+                </a:r>
+                <a:r>
+                  <a:rPr lang="en-150" dirty="0"/>
+                  <a:t>: </a:t>
+                </a:r>
+                <a14:m>
+                  <m:oMath xmlns:m="http://schemas.openxmlformats.org/officeDocument/2006/math">
+                    <m:sSub>
+                      <m:sSubPr>
+                        <m:ctrlPr>
+                          <a:rPr lang="en-150" b="0" i="1" smtClean="0">
+                            <a:latin typeface="Cambria Math" panose="02040503050406030204" pitchFamily="18" charset="0"/>
+                          </a:rPr>
+                        </m:ctrlPr>
+                      </m:sSubPr>
+                      <m:e>
+                        <m:r>
+                          <a:rPr lang="en-150" b="0" i="1" smtClean="0">
+                            <a:latin typeface="Cambria Math" panose="02040503050406030204" pitchFamily="18" charset="0"/>
+                          </a:rPr>
+                          <m:t>𝐽</m:t>
+                        </m:r>
+                      </m:e>
+                      <m:sub>
+                        <m:r>
+                          <a:rPr lang="en-150" b="0" i="1" smtClean="0">
+                            <a:latin typeface="Cambria Math" panose="02040503050406030204" pitchFamily="18" charset="0"/>
+                          </a:rPr>
+                          <m:t>0</m:t>
+                        </m:r>
+                      </m:sub>
+                    </m:sSub>
+                  </m:oMath>
+                </a14:m>
+                <a:endParaRPr lang="en-GB" dirty="0"/>
+              </a:p>
+            </p:txBody>
+          </p:sp>
+        </mc:Choice>
+        <mc:Fallback>
+          <p:sp>
+            <p:nvSpPr>
+              <p:cNvPr id="18" name="TextBox 17">
+                <a:extLst>
+                  <a:ext uri="{FF2B5EF4-FFF2-40B4-BE49-F238E27FC236}">
+                    <a16:creationId xmlns:a16="http://schemas.microsoft.com/office/drawing/2014/main" id="{9B7F500E-8946-4B1A-9BBA-E4C390965BC5}"/>
+                  </a:ext>
+                </a:extLst>
+              </p:cNvPr>
+              <p:cNvSpPr txBox="1">
+                <a:spLocks noRot="1" noChangeAspect="1" noMove="1" noResize="1" noEditPoints="1" noAdjustHandles="1" noChangeArrowheads="1" noChangeShapeType="1" noTextEdit="1"/>
+              </p:cNvSpPr>
+              <p:nvPr/>
+            </p:nvSpPr>
+            <p:spPr>
+              <a:xfrm>
+                <a:off x="5312662" y="3919950"/>
+                <a:ext cx="1702217" cy="369332"/>
+              </a:xfrm>
+              <a:prstGeom prst="rect">
+                <a:avLst/>
+              </a:prstGeom>
+              <a:blipFill>
+                <a:blip r:embed="rId8"/>
+                <a:stretch>
+                  <a:fillRect l="-2857" t="-8197" b="-24590"/>
+                </a:stretch>
+              </a:blipFill>
+            </p:spPr>
+            <p:txBody>
+              <a:bodyPr/>
+              <a:lstStyle/>
+              <a:p>
+                <a:r>
+                  <a:rPr lang="en-GB">
+                    <a:noFill/>
+                  </a:rPr>
+                  <a:t> </a:t>
+                </a:r>
+              </a:p>
+            </p:txBody>
+          </p:sp>
+        </mc:Fallback>
+      </mc:AlternateContent>
+      <mc:AlternateContent xmlns:mc="http://schemas.openxmlformats.org/markup-compatibility/2006">
+        <mc:Choice xmlns:a14="http://schemas.microsoft.com/office/drawing/2010/main" Requires="a14">
+          <p:sp>
+            <p:nvSpPr>
+              <p:cNvPr id="17" name="TextBox 16">
+                <a:extLst>
+                  <a:ext uri="{FF2B5EF4-FFF2-40B4-BE49-F238E27FC236}">
+                    <a16:creationId xmlns:a16="http://schemas.microsoft.com/office/drawing/2014/main" id="{493A6B90-0674-4F84-BA44-B1D844177C6E}"/>
+                  </a:ext>
+                </a:extLst>
+              </p:cNvPr>
+              <p:cNvSpPr txBox="1"/>
+              <p:nvPr/>
+            </p:nvSpPr>
+            <p:spPr>
+              <a:xfrm>
+                <a:off x="5312663" y="3920066"/>
+                <a:ext cx="1702217" cy="369332"/>
+              </a:xfrm>
+              <a:prstGeom prst="rect">
+                <a:avLst/>
+              </a:prstGeom>
+              <a:noFill/>
+            </p:spPr>
+            <p:txBody>
+              <a:bodyPr wrap="square" rtlCol="0">
+                <a:spAutoFit/>
+              </a:bodyPr>
+              <a:lstStyle/>
+              <a:p>
+                <a:r>
+                  <a:rPr lang="en-150" dirty="0"/>
+                  <a:t>S</a:t>
+                </a:r>
+                <a:r>
+                  <a:rPr lang="en-GB" dirty="0"/>
+                  <a:t>c</a:t>
+                </a:r>
+                <a:r>
+                  <a:rPr lang="en-150" dirty="0"/>
+                  <a:t>h</a:t>
+                </a:r>
+                <a:r>
+                  <a:rPr lang="en-GB" dirty="0"/>
+                  <a:t>e</a:t>
+                </a:r>
+                <a:r>
+                  <a:rPr lang="en-150" dirty="0"/>
+                  <a:t>d</a:t>
+                </a:r>
+                <a:r>
+                  <a:rPr lang="en-GB" dirty="0"/>
+                  <a:t>u</a:t>
+                </a:r>
+                <a:r>
+                  <a:rPr lang="en-150" dirty="0"/>
+                  <a:t>l</a:t>
+                </a:r>
+                <a:r>
+                  <a:rPr lang="en-GB" dirty="0"/>
+                  <a:t>i</a:t>
+                </a:r>
+                <a:r>
+                  <a:rPr lang="en-150" dirty="0"/>
+                  <a:t>n</a:t>
+                </a:r>
+                <a:r>
+                  <a:rPr lang="en-GB" dirty="0"/>
+                  <a:t>g</a:t>
+                </a:r>
+                <a:r>
+                  <a:rPr lang="en-150" dirty="0"/>
+                  <a:t>: </a:t>
+                </a:r>
+                <a14:m>
+                  <m:oMath xmlns:m="http://schemas.openxmlformats.org/officeDocument/2006/math">
+                    <m:sSub>
+                      <m:sSubPr>
+                        <m:ctrlPr>
+                          <a:rPr lang="en-150" b="0" i="1" smtClean="0">
+                            <a:latin typeface="Cambria Math" panose="02040503050406030204" pitchFamily="18" charset="0"/>
+                          </a:rPr>
+                        </m:ctrlPr>
+                      </m:sSubPr>
+                      <m:e>
+                        <m:r>
+                          <a:rPr lang="en-150" b="0" i="1" smtClean="0">
+                            <a:latin typeface="Cambria Math" panose="02040503050406030204" pitchFamily="18" charset="0"/>
+                          </a:rPr>
+                          <m:t>𝐽</m:t>
+                        </m:r>
+                      </m:e>
+                      <m:sub>
+                        <m:r>
+                          <a:rPr lang="en-150" b="0" i="1" smtClean="0">
+                            <a:latin typeface="Cambria Math" panose="02040503050406030204" pitchFamily="18" charset="0"/>
+                          </a:rPr>
+                          <m:t>1</m:t>
+                        </m:r>
+                      </m:sub>
+                    </m:sSub>
+                  </m:oMath>
+                </a14:m>
+                <a:endParaRPr lang="en-GB" dirty="0"/>
+              </a:p>
+            </p:txBody>
+          </p:sp>
+        </mc:Choice>
+        <mc:Fallback>
+          <p:sp>
+            <p:nvSpPr>
+              <p:cNvPr id="17" name="TextBox 16">
+                <a:extLst>
+                  <a:ext uri="{FF2B5EF4-FFF2-40B4-BE49-F238E27FC236}">
+                    <a16:creationId xmlns:a16="http://schemas.microsoft.com/office/drawing/2014/main" id="{493A6B90-0674-4F84-BA44-B1D844177C6E}"/>
+                  </a:ext>
+                </a:extLst>
+              </p:cNvPr>
+              <p:cNvSpPr txBox="1">
+                <a:spLocks noRot="1" noChangeAspect="1" noMove="1" noResize="1" noEditPoints="1" noAdjustHandles="1" noChangeArrowheads="1" noChangeShapeType="1" noTextEdit="1"/>
+              </p:cNvSpPr>
+              <p:nvPr/>
+            </p:nvSpPr>
+            <p:spPr>
+              <a:xfrm>
+                <a:off x="5312663" y="3920066"/>
+                <a:ext cx="1702217" cy="369332"/>
+              </a:xfrm>
+              <a:prstGeom prst="rect">
+                <a:avLst/>
+              </a:prstGeom>
+              <a:blipFill>
+                <a:blip r:embed="rId9"/>
+                <a:stretch>
+                  <a:fillRect l="-2857" t="-8197" b="-24590"/>
+                </a:stretch>
+              </a:blipFill>
+            </p:spPr>
+            <p:txBody>
+              <a:bodyPr/>
+              <a:lstStyle/>
+              <a:p>
+                <a:r>
+                  <a:rPr lang="en-GB">
+                    <a:noFill/>
+                  </a:rPr>
+                  <a:t> </a:t>
+                </a:r>
+              </a:p>
+            </p:txBody>
+          </p:sp>
+        </mc:Fallback>
+      </mc:AlternateContent>
+      <mc:AlternateContent xmlns:mc="http://schemas.openxmlformats.org/markup-compatibility/2006">
+        <mc:Choice xmlns:a14="http://schemas.microsoft.com/office/drawing/2010/main" Requires="a14">
+          <p:sp>
+            <p:nvSpPr>
+              <p:cNvPr id="19" name="TextBox 18">
+                <a:extLst>
+                  <a:ext uri="{FF2B5EF4-FFF2-40B4-BE49-F238E27FC236}">
+                    <a16:creationId xmlns:a16="http://schemas.microsoft.com/office/drawing/2014/main" id="{EB34E394-0A34-4C22-A616-6C7839402D4C}"/>
+                  </a:ext>
+                </a:extLst>
+              </p:cNvPr>
+              <p:cNvSpPr txBox="1"/>
+              <p:nvPr/>
+            </p:nvSpPr>
+            <p:spPr>
+              <a:xfrm>
+                <a:off x="5312662" y="3919950"/>
+                <a:ext cx="1702217" cy="369332"/>
+              </a:xfrm>
+              <a:prstGeom prst="rect">
+                <a:avLst/>
+              </a:prstGeom>
+              <a:noFill/>
+            </p:spPr>
+            <p:txBody>
+              <a:bodyPr wrap="square" rtlCol="0">
+                <a:spAutoFit/>
+              </a:bodyPr>
+              <a:lstStyle/>
+              <a:p>
+                <a:r>
+                  <a:rPr lang="en-150" dirty="0"/>
+                  <a:t>S</a:t>
+                </a:r>
+                <a:r>
+                  <a:rPr lang="en-GB" dirty="0"/>
+                  <a:t>c</a:t>
+                </a:r>
+                <a:r>
+                  <a:rPr lang="en-150" dirty="0"/>
+                  <a:t>h</a:t>
+                </a:r>
+                <a:r>
+                  <a:rPr lang="en-GB" dirty="0"/>
+                  <a:t>e</a:t>
+                </a:r>
+                <a:r>
+                  <a:rPr lang="en-150" dirty="0"/>
+                  <a:t>d</a:t>
+                </a:r>
+                <a:r>
+                  <a:rPr lang="en-GB" dirty="0"/>
+                  <a:t>u</a:t>
+                </a:r>
+                <a:r>
+                  <a:rPr lang="en-150" dirty="0"/>
+                  <a:t>l</a:t>
+                </a:r>
+                <a:r>
+                  <a:rPr lang="en-GB" dirty="0"/>
+                  <a:t>i</a:t>
+                </a:r>
+                <a:r>
+                  <a:rPr lang="en-150" dirty="0"/>
+                  <a:t>n</a:t>
+                </a:r>
+                <a:r>
+                  <a:rPr lang="en-GB" dirty="0"/>
+                  <a:t>g</a:t>
+                </a:r>
+                <a:r>
+                  <a:rPr lang="en-150" dirty="0"/>
+                  <a:t>: </a:t>
+                </a:r>
+                <a14:m>
+                  <m:oMath xmlns:m="http://schemas.openxmlformats.org/officeDocument/2006/math">
+                    <m:sSub>
+                      <m:sSubPr>
+                        <m:ctrlPr>
+                          <a:rPr lang="en-150" b="0" i="1" smtClean="0">
+                            <a:latin typeface="Cambria Math" panose="02040503050406030204" pitchFamily="18" charset="0"/>
+                          </a:rPr>
+                        </m:ctrlPr>
+                      </m:sSubPr>
+                      <m:e>
+                        <m:r>
+                          <a:rPr lang="en-150" b="0" i="1" smtClean="0">
+                            <a:latin typeface="Cambria Math" panose="02040503050406030204" pitchFamily="18" charset="0"/>
+                          </a:rPr>
+                          <m:t>𝐽</m:t>
+                        </m:r>
+                      </m:e>
+                      <m:sub>
+                        <m:r>
+                          <a:rPr lang="en-150" b="0" i="1" smtClean="0">
+                            <a:latin typeface="Cambria Math" panose="02040503050406030204" pitchFamily="18" charset="0"/>
+                          </a:rPr>
+                          <m:t>2</m:t>
+                        </m:r>
+                      </m:sub>
+                    </m:sSub>
+                  </m:oMath>
+                </a14:m>
+                <a:endParaRPr lang="en-GB" dirty="0"/>
+              </a:p>
+            </p:txBody>
+          </p:sp>
+        </mc:Choice>
+        <mc:Fallback>
+          <p:sp>
+            <p:nvSpPr>
+              <p:cNvPr id="19" name="TextBox 18">
+                <a:extLst>
+                  <a:ext uri="{FF2B5EF4-FFF2-40B4-BE49-F238E27FC236}">
+                    <a16:creationId xmlns:a16="http://schemas.microsoft.com/office/drawing/2014/main" id="{EB34E394-0A34-4C22-A616-6C7839402D4C}"/>
+                  </a:ext>
+                </a:extLst>
+              </p:cNvPr>
+              <p:cNvSpPr txBox="1">
+                <a:spLocks noRot="1" noChangeAspect="1" noMove="1" noResize="1" noEditPoints="1" noAdjustHandles="1" noChangeArrowheads="1" noChangeShapeType="1" noTextEdit="1"/>
+              </p:cNvSpPr>
+              <p:nvPr/>
+            </p:nvSpPr>
+            <p:spPr>
+              <a:xfrm>
+                <a:off x="5312662" y="3919950"/>
+                <a:ext cx="1702217" cy="369332"/>
+              </a:xfrm>
+              <a:prstGeom prst="rect">
+                <a:avLst/>
+              </a:prstGeom>
+              <a:blipFill>
+                <a:blip r:embed="rId10"/>
+                <a:stretch>
+                  <a:fillRect l="-2857" t="-8197" b="-24590"/>
+                </a:stretch>
+              </a:blipFill>
+            </p:spPr>
+            <p:txBody>
+              <a:bodyPr/>
+              <a:lstStyle/>
+              <a:p>
+                <a:r>
+                  <a:rPr lang="en-GB">
+                    <a:noFill/>
+                  </a:rPr>
+                  <a:t> </a:t>
+                </a:r>
+              </a:p>
+            </p:txBody>
+          </p:sp>
+        </mc:Fallback>
+      </mc:AlternateContent>
+      <mc:AlternateContent xmlns:mc="http://schemas.openxmlformats.org/markup-compatibility/2006">
+        <mc:Choice xmlns:a14="http://schemas.microsoft.com/office/drawing/2010/main" Requires="a14">
+          <p:sp>
+            <p:nvSpPr>
+              <p:cNvPr id="20" name="TextBox 19">
+                <a:extLst>
+                  <a:ext uri="{FF2B5EF4-FFF2-40B4-BE49-F238E27FC236}">
+                    <a16:creationId xmlns:a16="http://schemas.microsoft.com/office/drawing/2014/main" id="{2CE901D1-E60E-4EC9-B51E-70B618A9D119}"/>
+                  </a:ext>
+                </a:extLst>
+              </p:cNvPr>
+              <p:cNvSpPr txBox="1"/>
+              <p:nvPr/>
+            </p:nvSpPr>
+            <p:spPr>
+              <a:xfrm>
+                <a:off x="5312662" y="3919950"/>
+                <a:ext cx="1702217" cy="369332"/>
+              </a:xfrm>
+              <a:prstGeom prst="rect">
+                <a:avLst/>
+              </a:prstGeom>
+              <a:noFill/>
+            </p:spPr>
+            <p:txBody>
+              <a:bodyPr wrap="square" rtlCol="0">
+                <a:spAutoFit/>
+              </a:bodyPr>
+              <a:lstStyle/>
+              <a:p>
+                <a:r>
+                  <a:rPr lang="en-150" dirty="0"/>
+                  <a:t>S</a:t>
+                </a:r>
+                <a:r>
+                  <a:rPr lang="en-GB" dirty="0"/>
+                  <a:t>c</a:t>
+                </a:r>
+                <a:r>
+                  <a:rPr lang="en-150" dirty="0"/>
+                  <a:t>h</a:t>
+                </a:r>
+                <a:r>
+                  <a:rPr lang="en-GB" dirty="0"/>
+                  <a:t>e</a:t>
+                </a:r>
+                <a:r>
+                  <a:rPr lang="en-150" dirty="0"/>
+                  <a:t>d</a:t>
+                </a:r>
+                <a:r>
+                  <a:rPr lang="en-GB" dirty="0"/>
+                  <a:t>u</a:t>
+                </a:r>
+                <a:r>
+                  <a:rPr lang="en-150" dirty="0"/>
+                  <a:t>l</a:t>
+                </a:r>
+                <a:r>
+                  <a:rPr lang="en-GB" dirty="0"/>
+                  <a:t>i</a:t>
+                </a:r>
+                <a:r>
+                  <a:rPr lang="en-150" dirty="0"/>
+                  <a:t>n</a:t>
+                </a:r>
+                <a:r>
+                  <a:rPr lang="en-GB" dirty="0"/>
+                  <a:t>g</a:t>
+                </a:r>
+                <a:r>
+                  <a:rPr lang="en-150" dirty="0"/>
+                  <a:t>: </a:t>
+                </a:r>
+                <a14:m>
+                  <m:oMath xmlns:m="http://schemas.openxmlformats.org/officeDocument/2006/math">
+                    <m:sSub>
+                      <m:sSubPr>
+                        <m:ctrlPr>
+                          <a:rPr lang="en-150" b="0" i="1" smtClean="0">
+                            <a:latin typeface="Cambria Math" panose="02040503050406030204" pitchFamily="18" charset="0"/>
+                          </a:rPr>
+                        </m:ctrlPr>
+                      </m:sSubPr>
+                      <m:e>
+                        <m:r>
+                          <a:rPr lang="en-150" b="0" i="1" smtClean="0">
+                            <a:latin typeface="Cambria Math" panose="02040503050406030204" pitchFamily="18" charset="0"/>
+                          </a:rPr>
+                          <m:t>𝐽</m:t>
+                        </m:r>
+                      </m:e>
+                      <m:sub>
+                        <m:r>
+                          <a:rPr lang="en-150" b="0" i="1" smtClean="0">
+                            <a:latin typeface="Cambria Math" panose="02040503050406030204" pitchFamily="18" charset="0"/>
+                          </a:rPr>
+                          <m:t>3</m:t>
+                        </m:r>
+                      </m:sub>
+                    </m:sSub>
+                  </m:oMath>
+                </a14:m>
+                <a:endParaRPr lang="en-GB" dirty="0"/>
+              </a:p>
+            </p:txBody>
+          </p:sp>
+        </mc:Choice>
+        <mc:Fallback>
+          <p:sp>
+            <p:nvSpPr>
+              <p:cNvPr id="20" name="TextBox 19">
+                <a:extLst>
+                  <a:ext uri="{FF2B5EF4-FFF2-40B4-BE49-F238E27FC236}">
+                    <a16:creationId xmlns:a16="http://schemas.microsoft.com/office/drawing/2014/main" id="{2CE901D1-E60E-4EC9-B51E-70B618A9D119}"/>
+                  </a:ext>
+                </a:extLst>
+              </p:cNvPr>
+              <p:cNvSpPr txBox="1">
+                <a:spLocks noRot="1" noChangeAspect="1" noMove="1" noResize="1" noEditPoints="1" noAdjustHandles="1" noChangeArrowheads="1" noChangeShapeType="1" noTextEdit="1"/>
+              </p:cNvSpPr>
+              <p:nvPr/>
+            </p:nvSpPr>
+            <p:spPr>
+              <a:xfrm>
+                <a:off x="5312662" y="3919950"/>
+                <a:ext cx="1702217" cy="369332"/>
+              </a:xfrm>
+              <a:prstGeom prst="rect">
+                <a:avLst/>
+              </a:prstGeom>
+              <a:blipFill>
+                <a:blip r:embed="rId11"/>
+                <a:stretch>
+                  <a:fillRect l="-2857" t="-8197" b="-24590"/>
+                </a:stretch>
+              </a:blipFill>
+            </p:spPr>
+            <p:txBody>
+              <a:bodyPr/>
+              <a:lstStyle/>
+              <a:p>
+                <a:r>
+                  <a:rPr lang="en-GB">
+                    <a:noFill/>
+                  </a:rPr>
+                  <a:t> </a:t>
+                </a:r>
+              </a:p>
+            </p:txBody>
+          </p:sp>
+        </mc:Fallback>
+      </mc:AlternateContent>
     </p:spTree>
     <p:extLst>
       <p:ext uri="{BB962C8B-B14F-4D97-AF65-F5344CB8AC3E}">
@@ -14105,6 +14717,588 @@
   <p:clrMapOvr>
     <a:masterClrMapping/>
   </p:clrMapOvr>
+  <p:timing>
+    <p:tnLst>
+      <p:par>
+        <p:cTn id="1" dur="indefinite" restart="never" nodeType="tmRoot">
+          <p:childTnLst>
+            <p:seq concurrent="1" nextAc="seek">
+              <p:cTn id="2" dur="indefinite" nodeType="mainSeq">
+                <p:childTnLst>
+                  <p:par>
+                    <p:cTn id="3" fill="hold">
+                      <p:stCondLst>
+                        <p:cond delay="indefinite"/>
+                      </p:stCondLst>
+                      <p:childTnLst>
+                        <p:par>
+                          <p:cTn id="4" fill="hold">
+                            <p:stCondLst>
+                              <p:cond delay="0"/>
+                            </p:stCondLst>
+                            <p:childTnLst>
+                              <p:par>
+                                <p:cTn id="5" presetID="1" presetClass="entr" presetSubtype="0" fill="hold" nodeType="clickEffect">
+                                  <p:stCondLst>
+                                    <p:cond delay="0"/>
+                                  </p:stCondLst>
+                                  <p:childTnLst>
+                                    <p:set>
+                                      <p:cBhvr>
+                                        <p:cTn id="6" dur="1" fill="hold">
+                                          <p:stCondLst>
+                                            <p:cond delay="0"/>
+                                          </p:stCondLst>
+                                        </p:cTn>
+                                        <p:tgtEl>
+                                          <p:spTgt spid="8"/>
+                                        </p:tgtEl>
+                                        <p:attrNameLst>
+                                          <p:attrName>style.visibility</p:attrName>
+                                        </p:attrNameLst>
+                                      </p:cBhvr>
+                                      <p:to>
+                                        <p:strVal val="visible"/>
+                                      </p:to>
+                                    </p:set>
+                                  </p:childTnLst>
+                                </p:cTn>
+                              </p:par>
+                              <p:par>
+                                <p:cTn id="7" presetID="1" presetClass="entr" presetSubtype="0" fill="hold" nodeType="withEffect">
+                                  <p:stCondLst>
+                                    <p:cond delay="0"/>
+                                  </p:stCondLst>
+                                  <p:childTnLst>
+                                    <p:set>
+                                      <p:cBhvr>
+                                        <p:cTn id="8" dur="1" fill="hold">
+                                          <p:stCondLst>
+                                            <p:cond delay="0"/>
+                                          </p:stCondLst>
+                                        </p:cTn>
+                                        <p:tgtEl>
+                                          <p:spTgt spid="5"/>
+                                        </p:tgtEl>
+                                        <p:attrNameLst>
+                                          <p:attrName>style.visibility</p:attrName>
+                                        </p:attrNameLst>
+                                      </p:cBhvr>
+                                      <p:to>
+                                        <p:strVal val="visible"/>
+                                      </p:to>
+                                    </p:set>
+                                  </p:childTnLst>
+                                </p:cTn>
+                              </p:par>
+                              <p:par>
+                                <p:cTn id="9" presetID="1" presetClass="entr" presetSubtype="0" fill="hold" grpId="0" nodeType="withEffect">
+                                  <p:stCondLst>
+                                    <p:cond delay="0"/>
+                                  </p:stCondLst>
+                                  <p:childTnLst>
+                                    <p:set>
+                                      <p:cBhvr>
+                                        <p:cTn id="10" dur="1" fill="hold">
+                                          <p:stCondLst>
+                                            <p:cond delay="0"/>
+                                          </p:stCondLst>
+                                        </p:cTn>
+                                        <p:tgtEl>
+                                          <p:spTgt spid="18"/>
+                                        </p:tgtEl>
+                                        <p:attrNameLst>
+                                          <p:attrName>style.visibility</p:attrName>
+                                        </p:attrNameLst>
+                                      </p:cBhvr>
+                                      <p:to>
+                                        <p:strVal val="visible"/>
+                                      </p:to>
+                                    </p:set>
+                                  </p:childTnLst>
+                                </p:cTn>
+                              </p:par>
+                            </p:childTnLst>
+                          </p:cTn>
+                        </p:par>
+                      </p:childTnLst>
+                    </p:cTn>
+                  </p:par>
+                  <p:par>
+                    <p:cTn id="11" fill="hold">
+                      <p:stCondLst>
+                        <p:cond delay="indefinite"/>
+                      </p:stCondLst>
+                      <p:childTnLst>
+                        <p:par>
+                          <p:cTn id="12" fill="hold">
+                            <p:stCondLst>
+                              <p:cond delay="0"/>
+                            </p:stCondLst>
+                            <p:childTnLst>
+                              <p:par>
+                                <p:cTn id="13" presetID="1" presetClass="entr" presetSubtype="0" fill="hold" nodeType="clickEffect">
+                                  <p:stCondLst>
+                                    <p:cond delay="0"/>
+                                  </p:stCondLst>
+                                  <p:childTnLst>
+                                    <p:set>
+                                      <p:cBhvr>
+                                        <p:cTn id="14" dur="1" fill="hold">
+                                          <p:stCondLst>
+                                            <p:cond delay="0"/>
+                                          </p:stCondLst>
+                                        </p:cTn>
+                                        <p:tgtEl>
+                                          <p:spTgt spid="10"/>
+                                        </p:tgtEl>
+                                        <p:attrNameLst>
+                                          <p:attrName>style.visibility</p:attrName>
+                                        </p:attrNameLst>
+                                      </p:cBhvr>
+                                      <p:to>
+                                        <p:strVal val="visible"/>
+                                      </p:to>
+                                    </p:set>
+                                  </p:childTnLst>
+                                </p:cTn>
+                              </p:par>
+                              <p:par>
+                                <p:cTn id="15" presetID="1" presetClass="entr" presetSubtype="0" fill="hold" grpId="0" nodeType="withEffect">
+                                  <p:stCondLst>
+                                    <p:cond delay="0"/>
+                                  </p:stCondLst>
+                                  <p:childTnLst>
+                                    <p:set>
+                                      <p:cBhvr>
+                                        <p:cTn id="16" dur="1" fill="hold">
+                                          <p:stCondLst>
+                                            <p:cond delay="0"/>
+                                          </p:stCondLst>
+                                        </p:cTn>
+                                        <p:tgtEl>
+                                          <p:spTgt spid="17"/>
+                                        </p:tgtEl>
+                                        <p:attrNameLst>
+                                          <p:attrName>style.visibility</p:attrName>
+                                        </p:attrNameLst>
+                                      </p:cBhvr>
+                                      <p:to>
+                                        <p:strVal val="visible"/>
+                                      </p:to>
+                                    </p:set>
+                                  </p:childTnLst>
+                                </p:cTn>
+                              </p:par>
+                              <p:par>
+                                <p:cTn id="17" presetID="1" presetClass="exit" presetSubtype="0" fill="hold" grpId="1" nodeType="withEffect">
+                                  <p:stCondLst>
+                                    <p:cond delay="0"/>
+                                  </p:stCondLst>
+                                  <p:childTnLst>
+                                    <p:set>
+                                      <p:cBhvr>
+                                        <p:cTn id="18" dur="1" fill="hold">
+                                          <p:stCondLst>
+                                            <p:cond delay="0"/>
+                                          </p:stCondLst>
+                                        </p:cTn>
+                                        <p:tgtEl>
+                                          <p:spTgt spid="18"/>
+                                        </p:tgtEl>
+                                        <p:attrNameLst>
+                                          <p:attrName>style.visibility</p:attrName>
+                                        </p:attrNameLst>
+                                      </p:cBhvr>
+                                      <p:to>
+                                        <p:strVal val="hidden"/>
+                                      </p:to>
+                                    </p:set>
+                                  </p:childTnLst>
+                                </p:cTn>
+                              </p:par>
+                            </p:childTnLst>
+                          </p:cTn>
+                        </p:par>
+                      </p:childTnLst>
+                    </p:cTn>
+                  </p:par>
+                  <p:par>
+                    <p:cTn id="19" fill="hold">
+                      <p:stCondLst>
+                        <p:cond delay="indefinite"/>
+                      </p:stCondLst>
+                      <p:childTnLst>
+                        <p:par>
+                          <p:cTn id="20" fill="hold">
+                            <p:stCondLst>
+                              <p:cond delay="0"/>
+                            </p:stCondLst>
+                            <p:childTnLst>
+                              <p:par>
+                                <p:cTn id="21" presetID="1" presetClass="entr" presetSubtype="0" fill="hold" grpId="0" nodeType="clickEffect">
+                                  <p:stCondLst>
+                                    <p:cond delay="0"/>
+                                  </p:stCondLst>
+                                  <p:childTnLst>
+                                    <p:set>
+                                      <p:cBhvr>
+                                        <p:cTn id="22" dur="1" fill="hold">
+                                          <p:stCondLst>
+                                            <p:cond delay="0"/>
+                                          </p:stCondLst>
+                                        </p:cTn>
+                                        <p:tgtEl>
+                                          <p:spTgt spid="19"/>
+                                        </p:tgtEl>
+                                        <p:attrNameLst>
+                                          <p:attrName>style.visibility</p:attrName>
+                                        </p:attrNameLst>
+                                      </p:cBhvr>
+                                      <p:to>
+                                        <p:strVal val="visible"/>
+                                      </p:to>
+                                    </p:set>
+                                  </p:childTnLst>
+                                </p:cTn>
+                              </p:par>
+                              <p:par>
+                                <p:cTn id="23" presetID="1" presetClass="exit" presetSubtype="0" fill="hold" grpId="1" nodeType="withEffect">
+                                  <p:stCondLst>
+                                    <p:cond delay="0"/>
+                                  </p:stCondLst>
+                                  <p:childTnLst>
+                                    <p:set>
+                                      <p:cBhvr>
+                                        <p:cTn id="24" dur="1" fill="hold">
+                                          <p:stCondLst>
+                                            <p:cond delay="0"/>
+                                          </p:stCondLst>
+                                        </p:cTn>
+                                        <p:tgtEl>
+                                          <p:spTgt spid="17"/>
+                                        </p:tgtEl>
+                                        <p:attrNameLst>
+                                          <p:attrName>style.visibility</p:attrName>
+                                        </p:attrNameLst>
+                                      </p:cBhvr>
+                                      <p:to>
+                                        <p:strVal val="hidden"/>
+                                      </p:to>
+                                    </p:set>
+                                  </p:childTnLst>
+                                </p:cTn>
+                              </p:par>
+                            </p:childTnLst>
+                          </p:cTn>
+                        </p:par>
+                      </p:childTnLst>
+                    </p:cTn>
+                  </p:par>
+                  <p:par>
+                    <p:cTn id="25" fill="hold">
+                      <p:stCondLst>
+                        <p:cond delay="indefinite"/>
+                      </p:stCondLst>
+                      <p:childTnLst>
+                        <p:par>
+                          <p:cTn id="26" fill="hold">
+                            <p:stCondLst>
+                              <p:cond delay="0"/>
+                            </p:stCondLst>
+                            <p:childTnLst>
+                              <p:par>
+                                <p:cTn id="27" presetID="1" presetClass="entr" presetSubtype="0" fill="hold" nodeType="clickEffect">
+                                  <p:stCondLst>
+                                    <p:cond delay="0"/>
+                                  </p:stCondLst>
+                                  <p:childTnLst>
+                                    <p:set>
+                                      <p:cBhvr>
+                                        <p:cTn id="28" dur="1" fill="hold">
+                                          <p:stCondLst>
+                                            <p:cond delay="0"/>
+                                          </p:stCondLst>
+                                        </p:cTn>
+                                        <p:tgtEl>
+                                          <p:spTgt spid="12"/>
+                                        </p:tgtEl>
+                                        <p:attrNameLst>
+                                          <p:attrName>style.visibility</p:attrName>
+                                        </p:attrNameLst>
+                                      </p:cBhvr>
+                                      <p:to>
+                                        <p:strVal val="visible"/>
+                                      </p:to>
+                                    </p:set>
+                                  </p:childTnLst>
+                                </p:cTn>
+                              </p:par>
+                              <p:par>
+                                <p:cTn id="29" presetID="1" presetClass="entr" presetSubtype="0" fill="hold" grpId="0" nodeType="withEffect">
+                                  <p:stCondLst>
+                                    <p:cond delay="0"/>
+                                  </p:stCondLst>
+                                  <p:childTnLst>
+                                    <p:set>
+                                      <p:cBhvr>
+                                        <p:cTn id="30" dur="1" fill="hold">
+                                          <p:stCondLst>
+                                            <p:cond delay="0"/>
+                                          </p:stCondLst>
+                                        </p:cTn>
+                                        <p:tgtEl>
+                                          <p:spTgt spid="20"/>
+                                        </p:tgtEl>
+                                        <p:attrNameLst>
+                                          <p:attrName>style.visibility</p:attrName>
+                                        </p:attrNameLst>
+                                      </p:cBhvr>
+                                      <p:to>
+                                        <p:strVal val="visible"/>
+                                      </p:to>
+                                    </p:set>
+                                  </p:childTnLst>
+                                </p:cTn>
+                              </p:par>
+                              <p:par>
+                                <p:cTn id="31" presetID="1" presetClass="exit" presetSubtype="0" fill="hold" grpId="1" nodeType="withEffect">
+                                  <p:stCondLst>
+                                    <p:cond delay="0"/>
+                                  </p:stCondLst>
+                                  <p:childTnLst>
+                                    <p:set>
+                                      <p:cBhvr>
+                                        <p:cTn id="32" dur="1" fill="hold">
+                                          <p:stCondLst>
+                                            <p:cond delay="0"/>
+                                          </p:stCondLst>
+                                        </p:cTn>
+                                        <p:tgtEl>
+                                          <p:spTgt spid="19"/>
+                                        </p:tgtEl>
+                                        <p:attrNameLst>
+                                          <p:attrName>style.visibility</p:attrName>
+                                        </p:attrNameLst>
+                                      </p:cBhvr>
+                                      <p:to>
+                                        <p:strVal val="hidden"/>
+                                      </p:to>
+                                    </p:set>
+                                  </p:childTnLst>
+                                </p:cTn>
+                              </p:par>
+                            </p:childTnLst>
+                          </p:cTn>
+                        </p:par>
+                      </p:childTnLst>
+                    </p:cTn>
+                  </p:par>
+                  <p:par>
+                    <p:cTn id="33" fill="hold">
+                      <p:stCondLst>
+                        <p:cond delay="indefinite"/>
+                      </p:stCondLst>
+                      <p:childTnLst>
+                        <p:par>
+                          <p:cTn id="34" fill="hold">
+                            <p:stCondLst>
+                              <p:cond delay="0"/>
+                            </p:stCondLst>
+                            <p:childTnLst>
+                              <p:par>
+                                <p:cTn id="35" presetID="1" presetClass="entr" presetSubtype="0" fill="hold" nodeType="clickEffect">
+                                  <p:stCondLst>
+                                    <p:cond delay="0"/>
+                                  </p:stCondLst>
+                                  <p:childTnLst>
+                                    <p:set>
+                                      <p:cBhvr>
+                                        <p:cTn id="36" dur="1" fill="hold">
+                                          <p:stCondLst>
+                                            <p:cond delay="0"/>
+                                          </p:stCondLst>
+                                        </p:cTn>
+                                        <p:tgtEl>
+                                          <p:spTgt spid="14"/>
+                                        </p:tgtEl>
+                                        <p:attrNameLst>
+                                          <p:attrName>style.visibility</p:attrName>
+                                        </p:attrNameLst>
+                                      </p:cBhvr>
+                                      <p:to>
+                                        <p:strVal val="visible"/>
+                                      </p:to>
+                                    </p:set>
+                                  </p:childTnLst>
+                                </p:cTn>
+                              </p:par>
+                              <p:par>
+                                <p:cTn id="37" presetID="1" presetClass="entr" presetSubtype="0" fill="hold" grpId="2" nodeType="withEffect">
+                                  <p:stCondLst>
+                                    <p:cond delay="0"/>
+                                  </p:stCondLst>
+                                  <p:childTnLst>
+                                    <p:set>
+                                      <p:cBhvr>
+                                        <p:cTn id="38" dur="1" fill="hold">
+                                          <p:stCondLst>
+                                            <p:cond delay="0"/>
+                                          </p:stCondLst>
+                                        </p:cTn>
+                                        <p:tgtEl>
+                                          <p:spTgt spid="17"/>
+                                        </p:tgtEl>
+                                        <p:attrNameLst>
+                                          <p:attrName>style.visibility</p:attrName>
+                                        </p:attrNameLst>
+                                      </p:cBhvr>
+                                      <p:to>
+                                        <p:strVal val="visible"/>
+                                      </p:to>
+                                    </p:set>
+                                  </p:childTnLst>
+                                </p:cTn>
+                              </p:par>
+                              <p:par>
+                                <p:cTn id="39" presetID="1" presetClass="exit" presetSubtype="0" fill="hold" grpId="1" nodeType="withEffect">
+                                  <p:stCondLst>
+                                    <p:cond delay="0"/>
+                                  </p:stCondLst>
+                                  <p:childTnLst>
+                                    <p:set>
+                                      <p:cBhvr>
+                                        <p:cTn id="40" dur="1" fill="hold">
+                                          <p:stCondLst>
+                                            <p:cond delay="0"/>
+                                          </p:stCondLst>
+                                        </p:cTn>
+                                        <p:tgtEl>
+                                          <p:spTgt spid="20"/>
+                                        </p:tgtEl>
+                                        <p:attrNameLst>
+                                          <p:attrName>style.visibility</p:attrName>
+                                        </p:attrNameLst>
+                                      </p:cBhvr>
+                                      <p:to>
+                                        <p:strVal val="hidden"/>
+                                      </p:to>
+                                    </p:set>
+                                  </p:childTnLst>
+                                </p:cTn>
+                              </p:par>
+                            </p:childTnLst>
+                          </p:cTn>
+                        </p:par>
+                      </p:childTnLst>
+                    </p:cTn>
+                  </p:par>
+                  <p:par>
+                    <p:cTn id="41" fill="hold">
+                      <p:stCondLst>
+                        <p:cond delay="indefinite"/>
+                      </p:stCondLst>
+                      <p:childTnLst>
+                        <p:par>
+                          <p:cTn id="42" fill="hold">
+                            <p:stCondLst>
+                              <p:cond delay="0"/>
+                            </p:stCondLst>
+                            <p:childTnLst>
+                              <p:par>
+                                <p:cTn id="43" presetID="1" presetClass="entr" presetSubtype="0" fill="hold" nodeType="clickEffect">
+                                  <p:stCondLst>
+                                    <p:cond delay="0"/>
+                                  </p:stCondLst>
+                                  <p:childTnLst>
+                                    <p:set>
+                                      <p:cBhvr>
+                                        <p:cTn id="44" dur="1" fill="hold">
+                                          <p:stCondLst>
+                                            <p:cond delay="0"/>
+                                          </p:stCondLst>
+                                        </p:cTn>
+                                        <p:tgtEl>
+                                          <p:spTgt spid="16"/>
+                                        </p:tgtEl>
+                                        <p:attrNameLst>
+                                          <p:attrName>style.visibility</p:attrName>
+                                        </p:attrNameLst>
+                                      </p:cBhvr>
+                                      <p:to>
+                                        <p:strVal val="visible"/>
+                                      </p:to>
+                                    </p:set>
+                                  </p:childTnLst>
+                                </p:cTn>
+                              </p:par>
+                              <p:par>
+                                <p:cTn id="45" presetID="1" presetClass="exit" presetSubtype="0" fill="hold" grpId="3" nodeType="withEffect">
+                                  <p:stCondLst>
+                                    <p:cond delay="0"/>
+                                  </p:stCondLst>
+                                  <p:childTnLst>
+                                    <p:set>
+                                      <p:cBhvr>
+                                        <p:cTn id="46" dur="1" fill="hold">
+                                          <p:stCondLst>
+                                            <p:cond delay="0"/>
+                                          </p:stCondLst>
+                                        </p:cTn>
+                                        <p:tgtEl>
+                                          <p:spTgt spid="17"/>
+                                        </p:tgtEl>
+                                        <p:attrNameLst>
+                                          <p:attrName>style.visibility</p:attrName>
+                                        </p:attrNameLst>
+                                      </p:cBhvr>
+                                      <p:to>
+                                        <p:strVal val="hidden"/>
+                                      </p:to>
+                                    </p:set>
+                                  </p:childTnLst>
+                                </p:cTn>
+                              </p:par>
+                            </p:childTnLst>
+                          </p:cTn>
+                        </p:par>
+                      </p:childTnLst>
+                    </p:cTn>
+                  </p:par>
+                </p:childTnLst>
+              </p:cTn>
+              <p:prevCondLst>
+                <p:cond evt="onPrev" delay="0">
+                  <p:tgtEl>
+                    <p:sldTgt/>
+                  </p:tgtEl>
+                </p:cond>
+              </p:prevCondLst>
+              <p:nextCondLst>
+                <p:cond evt="onNext" delay="0">
+                  <p:tgtEl>
+                    <p:sldTgt/>
+                  </p:tgtEl>
+                </p:cond>
+              </p:nextCondLst>
+            </p:seq>
+          </p:childTnLst>
+        </p:cTn>
+      </p:par>
+    </p:tnLst>
+    <p:bldLst>
+      <p:bldP spid="18" grpId="0"/>
+      <p:bldP spid="18" grpId="1"/>
+      <p:bldP spid="17" grpId="0"/>
+      <p:bldP spid="17" grpId="1"/>
+      <p:bldP spid="17" grpId="2"/>
+      <p:bldP spid="17" grpId="3"/>
+      <p:bldP spid="19" grpId="0"/>
+      <p:bldP spid="19" grpId="1"/>
+      <p:bldP spid="20" grpId="0"/>
+      <p:bldP spid="20" grpId="1"/>
+    </p:bldLst>
+  </p:timing>
 </p:sld>
 </file>
 

</xml_diff>

<commit_message>
Fixed some parts of the presentation
</commit_message>
<xml_diff>
--- a/Notes/TFM_presentations/2020_02_24_v2/2020_02_24_v2.pptx
+++ b/Notes/TFM_presentations/2020_02_24_v2/2020_02_24_v2.pptx
@@ -223,7 +223,7 @@
           <a:p>
             <a:fld id="{D07E13D9-DB12-424B-A0B8-3D2EDA86849F}" type="datetimeFigureOut">
               <a:rPr lang="en-GB" smtClean="0"/>
-              <a:t>19/02/2020</a:t>
+              <a:t>23/02/2020</a:t>
             </a:fld>
             <a:endParaRPr lang="en-GB" dirty="0"/>
           </a:p>
@@ -6100,7 +6100,7 @@
           <a:p>
             <a:fld id="{E38A22E1-EB92-4D54-BACA-04AA8A92E613}" type="datetime1">
               <a:rPr lang="en-GB" smtClean="0"/>
-              <a:t>19/02/2020</a:t>
+              <a:t>23/02/2020</a:t>
             </a:fld>
             <a:endParaRPr lang="en-GB" dirty="0"/>
           </a:p>
@@ -6317,7 +6317,7 @@
           <a:p>
             <a:fld id="{F7BBACEA-79DB-4B06-B53C-1515C6E9AA2A}" type="datetime1">
               <a:rPr lang="en-GB" smtClean="0"/>
-              <a:t>19/02/2020</a:t>
+              <a:t>23/02/2020</a:t>
             </a:fld>
             <a:endParaRPr lang="en-GB" dirty="0"/>
           </a:p>
@@ -6527,7 +6527,7 @@
           <a:p>
             <a:fld id="{1242A314-3A0B-49C4-ADB0-F8BBA4139E56}" type="datetime1">
               <a:rPr lang="en-GB" smtClean="0"/>
-              <a:t>19/02/2020</a:t>
+              <a:t>23/02/2020</a:t>
             </a:fld>
             <a:endParaRPr lang="en-GB" dirty="0"/>
           </a:p>
@@ -6727,7 +6727,7 @@
           <a:p>
             <a:fld id="{D240987B-0079-4EE9-8A70-14597C3743BC}" type="datetime1">
               <a:rPr lang="en-GB" smtClean="0"/>
-              <a:t>19/02/2020</a:t>
+              <a:t>23/02/2020</a:t>
             </a:fld>
             <a:endParaRPr lang="en-GB" dirty="0"/>
           </a:p>
@@ -7003,7 +7003,7 @@
           <a:p>
             <a:fld id="{9C436FE2-9B88-4810-AC3E-E01CD02C2930}" type="datetime1">
               <a:rPr lang="en-GB" smtClean="0"/>
-              <a:t>19/02/2020</a:t>
+              <a:t>23/02/2020</a:t>
             </a:fld>
             <a:endParaRPr lang="en-GB" dirty="0"/>
           </a:p>
@@ -7271,7 +7271,7 @@
           <a:p>
             <a:fld id="{08368621-535E-44A6-A126-3F2534EA9A7B}" type="datetime1">
               <a:rPr lang="en-GB" smtClean="0"/>
-              <a:t>19/02/2020</a:t>
+              <a:t>23/02/2020</a:t>
             </a:fld>
             <a:endParaRPr lang="en-GB" dirty="0"/>
           </a:p>
@@ -7686,7 +7686,7 @@
           <a:p>
             <a:fld id="{632F5B32-CFB7-415D-9B96-9BE2AE3D1AAC}" type="datetime1">
               <a:rPr lang="en-GB" smtClean="0"/>
-              <a:t>19/02/2020</a:t>
+              <a:t>23/02/2020</a:t>
             </a:fld>
             <a:endParaRPr lang="en-GB" dirty="0"/>
           </a:p>
@@ -7828,7 +7828,7 @@
           <a:p>
             <a:fld id="{C2A51E27-F50C-4FD5-A040-64C12EA57AB4}" type="datetime1">
               <a:rPr lang="en-GB" smtClean="0"/>
-              <a:t>19/02/2020</a:t>
+              <a:t>23/02/2020</a:t>
             </a:fld>
             <a:endParaRPr lang="en-GB" dirty="0"/>
           </a:p>
@@ -7941,7 +7941,7 @@
           <a:p>
             <a:fld id="{A60DBC3F-8614-44B4-9683-36A45BFFB7A1}" type="datetime1">
               <a:rPr lang="en-GB" smtClean="0"/>
-              <a:t>19/02/2020</a:t>
+              <a:t>23/02/2020</a:t>
             </a:fld>
             <a:endParaRPr lang="en-GB" dirty="0"/>
           </a:p>
@@ -8254,7 +8254,7 @@
           <a:p>
             <a:fld id="{23091C06-D056-41B0-9F5F-5E90B83401B6}" type="datetime1">
               <a:rPr lang="en-GB" smtClean="0"/>
-              <a:t>19/02/2020</a:t>
+              <a:t>23/02/2020</a:t>
             </a:fld>
             <a:endParaRPr lang="en-GB" dirty="0"/>
           </a:p>
@@ -8547,7 +8547,7 @@
           <a:p>
             <a:fld id="{119BFB93-9673-43A0-BDFE-39DE919D7FF9}" type="datetime1">
               <a:rPr lang="en-GB" smtClean="0"/>
-              <a:t>19/02/2020</a:t>
+              <a:t>23/02/2020</a:t>
             </a:fld>
             <a:endParaRPr lang="en-GB" dirty="0"/>
           </a:p>
@@ -8845,7 +8845,7 @@
             <a:fld id="{1D06A54C-354E-461C-AA7A-CD74CDD91362}" type="datetime1">
               <a:rPr lang="en-GB" smtClean="0"/>
               <a:pPr/>
-              <a:t>19/02/2020</a:t>
+              <a:t>23/02/2020</a:t>
             </a:fld>
             <a:endParaRPr lang="en-GB" dirty="0"/>
           </a:p>
@@ -11407,11 +11407,7 @@
             </a:r>
             <a:r>
               <a:rPr lang="en-GB" dirty="0"/>
-              <a:t>an accurate</a:t>
-            </a:r>
-            <a:r>
-              <a:rPr lang="en-150" dirty="0"/>
-              <a:t> </a:t>
+              <a:t>an accurate </a:t>
             </a:r>
             <a:r>
               <a:rPr lang="en-GB" noProof="0" dirty="0"/>
@@ -11763,8 +11759,8 @@
           </a:prstGeom>
         </p:spPr>
       </p:pic>
-      <mc:AlternateContent xmlns:mc="http://schemas.openxmlformats.org/markup-compatibility/2006">
-        <mc:Choice xmlns:a14="http://schemas.microsoft.com/office/drawing/2010/main" Requires="a14">
+      <mc:AlternateContent xmlns:mc="http://schemas.openxmlformats.org/markup-compatibility/2006" xmlns:a14="http://schemas.microsoft.com/office/drawing/2010/main">
+        <mc:Choice Requires="a14">
           <p:sp>
             <p:nvSpPr>
               <p:cNvPr id="5" name="TextBox 4">
@@ -11847,7 +11843,7 @@
             </p:txBody>
           </p:sp>
         </mc:Choice>
-        <mc:Fallback>
+        <mc:Fallback xmlns="">
           <p:sp>
             <p:nvSpPr>
               <p:cNvPr id="5" name="TextBox 4">
@@ -12192,8 +12188,8 @@
           </a:p>
         </p:txBody>
       </p:sp>
-      <mc:AlternateContent xmlns:mc="http://schemas.openxmlformats.org/markup-compatibility/2006">
-        <mc:Choice xmlns:a14="http://schemas.microsoft.com/office/drawing/2010/main" Requires="a14">
+      <mc:AlternateContent xmlns:mc="http://schemas.openxmlformats.org/markup-compatibility/2006" xmlns:a14="http://schemas.microsoft.com/office/drawing/2010/main">
+        <mc:Choice Requires="a14">
           <p:sp>
             <p:nvSpPr>
               <p:cNvPr id="3" name="Content Placeholder 2">
@@ -12366,7 +12362,7 @@
             </p:txBody>
           </p:sp>
         </mc:Choice>
-        <mc:Fallback>
+        <mc:Fallback xmlns="">
           <p:sp>
             <p:nvSpPr>
               <p:cNvPr id="3" name="Content Placeholder 2">
@@ -13043,8 +13039,8 @@
           </a:p>
         </p:txBody>
       </p:sp>
-      <mc:AlternateContent xmlns:mc="http://schemas.openxmlformats.org/markup-compatibility/2006">
-        <mc:Choice xmlns:a14="http://schemas.microsoft.com/office/drawing/2010/main" Requires="a14">
+      <mc:AlternateContent xmlns:mc="http://schemas.openxmlformats.org/markup-compatibility/2006" xmlns:a14="http://schemas.microsoft.com/office/drawing/2010/main">
+        <mc:Choice Requires="a14">
           <p:sp>
             <p:nvSpPr>
               <p:cNvPr id="10" name="Content Placeholder 2">
@@ -13441,7 +13437,7 @@
             </p:txBody>
           </p:sp>
         </mc:Choice>
-        <mc:Fallback>
+        <mc:Fallback xmlns="">
           <p:sp>
             <p:nvSpPr>
               <p:cNvPr id="10" name="Content Placeholder 2">
@@ -13486,8 +13482,8 @@
           </p:sp>
         </mc:Fallback>
       </mc:AlternateContent>
-      <mc:AlternateContent xmlns:mc="http://schemas.openxmlformats.org/markup-compatibility/2006">
-        <mc:Choice xmlns:a14="http://schemas.microsoft.com/office/drawing/2010/main" Requires="a14">
+      <mc:AlternateContent xmlns:mc="http://schemas.openxmlformats.org/markup-compatibility/2006" xmlns:a14="http://schemas.microsoft.com/office/drawing/2010/main">
+        <mc:Choice Requires="a14">
           <p:sp>
             <p:nvSpPr>
               <p:cNvPr id="11" name="Content Placeholder 2">
@@ -13782,7 +13778,7 @@
             </p:txBody>
           </p:sp>
         </mc:Choice>
-        <mc:Fallback>
+        <mc:Fallback xmlns="">
           <p:sp>
             <p:nvSpPr>
               <p:cNvPr id="11" name="Content Placeholder 2">
@@ -14425,8 +14421,8 @@
           </a:p>
         </p:txBody>
       </p:sp>
-      <mc:AlternateContent xmlns:mc="http://schemas.openxmlformats.org/markup-compatibility/2006">
-        <mc:Choice xmlns:a14="http://schemas.microsoft.com/office/drawing/2010/main" Requires="a14">
+      <mc:AlternateContent xmlns:mc="http://schemas.openxmlformats.org/markup-compatibility/2006" xmlns:a14="http://schemas.microsoft.com/office/drawing/2010/main">
+        <mc:Choice Requires="a14">
           <p:sp>
             <p:nvSpPr>
               <p:cNvPr id="3" name="Content Placeholder 2">
@@ -14814,7 +14810,7 @@
               </a:p>
               <a:p>
                 <a:r>
-                  <a:rPr lang="en-150" b="0" noProof="0" dirty="0"/>
+                  <a:rPr lang="en-GB" b="0" noProof="0" dirty="0"/>
                   <a:t>Create next state if: </a:t>
                 </a:r>
                 <a14:m>
@@ -14910,7 +14906,7 @@
             </p:txBody>
           </p:sp>
         </mc:Choice>
-        <mc:Fallback>
+        <mc:Fallback xmlns="">
           <p:sp>
             <p:nvSpPr>
               <p:cNvPr id="3" name="Content Placeholder 2">
@@ -28211,8 +28207,8 @@
           </a:prstGeom>
         </p:spPr>
       </p:pic>
-      <mc:AlternateContent xmlns:mc="http://schemas.openxmlformats.org/markup-compatibility/2006">
-        <mc:Choice xmlns:a14="http://schemas.microsoft.com/office/drawing/2010/main" Requires="a14">
+      <mc:AlternateContent xmlns:mc="http://schemas.openxmlformats.org/markup-compatibility/2006" xmlns:a14="http://schemas.microsoft.com/office/drawing/2010/main">
+        <mc:Choice Requires="a14">
           <p:sp>
             <p:nvSpPr>
               <p:cNvPr id="18" name="TB_j0">
@@ -28319,7 +28315,7 @@
             </p:txBody>
           </p:sp>
         </mc:Choice>
-        <mc:Fallback>
+        <mc:Fallback xmlns="">
           <p:sp>
             <p:nvSpPr>
               <p:cNvPr id="18" name="TB_j0">
@@ -28364,8 +28360,8 @@
           </p:sp>
         </mc:Fallback>
       </mc:AlternateContent>
-      <mc:AlternateContent xmlns:mc="http://schemas.openxmlformats.org/markup-compatibility/2006">
-        <mc:Choice xmlns:a14="http://schemas.microsoft.com/office/drawing/2010/main" Requires="a14">
+      <mc:AlternateContent xmlns:mc="http://schemas.openxmlformats.org/markup-compatibility/2006" xmlns:a14="http://schemas.microsoft.com/office/drawing/2010/main">
+        <mc:Choice Requires="a14">
           <p:sp>
             <p:nvSpPr>
               <p:cNvPr id="17" name="TB_j1">
@@ -28472,7 +28468,7 @@
             </p:txBody>
           </p:sp>
         </mc:Choice>
-        <mc:Fallback>
+        <mc:Fallback xmlns="">
           <p:sp>
             <p:nvSpPr>
               <p:cNvPr id="17" name="TB_j1">
@@ -28517,8 +28513,8 @@
           </p:sp>
         </mc:Fallback>
       </mc:AlternateContent>
-      <mc:AlternateContent xmlns:mc="http://schemas.openxmlformats.org/markup-compatibility/2006">
-        <mc:Choice xmlns:a14="http://schemas.microsoft.com/office/drawing/2010/main" Requires="a14">
+      <mc:AlternateContent xmlns:mc="http://schemas.openxmlformats.org/markup-compatibility/2006" xmlns:a14="http://schemas.microsoft.com/office/drawing/2010/main">
+        <mc:Choice Requires="a14">
           <p:sp>
             <p:nvSpPr>
               <p:cNvPr id="19" name="TB_j2">
@@ -28625,7 +28621,7 @@
             </p:txBody>
           </p:sp>
         </mc:Choice>
-        <mc:Fallback>
+        <mc:Fallback xmlns="">
           <p:sp>
             <p:nvSpPr>
               <p:cNvPr id="19" name="TB_j2">
@@ -28670,8 +28666,8 @@
           </p:sp>
         </mc:Fallback>
       </mc:AlternateContent>
-      <mc:AlternateContent xmlns:mc="http://schemas.openxmlformats.org/markup-compatibility/2006">
-        <mc:Choice xmlns:a14="http://schemas.microsoft.com/office/drawing/2010/main" Requires="a14">
+      <mc:AlternateContent xmlns:mc="http://schemas.openxmlformats.org/markup-compatibility/2006" xmlns:a14="http://schemas.microsoft.com/office/drawing/2010/main">
+        <mc:Choice Requires="a14">
           <p:sp>
             <p:nvSpPr>
               <p:cNvPr id="20" name="TB_j3">
@@ -28778,7 +28774,7 @@
             </p:txBody>
           </p:sp>
         </mc:Choice>
-        <mc:Fallback>
+        <mc:Fallback xmlns="">
           <p:sp>
             <p:nvSpPr>
               <p:cNvPr id="20" name="TB_j3">
@@ -36073,31 +36069,6 @@
       </p:sp>
       <p:sp>
         <p:nvSpPr>
-          <p:cNvPr id="3" name="Content Placeholder 2">
-            <a:extLst>
-              <a:ext uri="{FF2B5EF4-FFF2-40B4-BE49-F238E27FC236}">
-                <a16:creationId xmlns:a16="http://schemas.microsoft.com/office/drawing/2014/main" id="{0C3C43B6-C274-42DA-B602-F45BF9031656}"/>
-              </a:ext>
-            </a:extLst>
-          </p:cNvPr>
-          <p:cNvSpPr>
-            <a:spLocks noGrp="1"/>
-          </p:cNvSpPr>
-          <p:nvPr>
-            <p:ph idx="1"/>
-          </p:nvPr>
-        </p:nvSpPr>
-        <p:spPr/>
-        <p:txBody>
-          <a:bodyPr/>
-          <a:lstStyle/>
-          <a:p>
-            <a:endParaRPr lang="en-GB" dirty="0"/>
-          </a:p>
-        </p:txBody>
-      </p:sp>
-      <p:sp>
-        <p:nvSpPr>
           <p:cNvPr id="4" name="Slide Number Placeholder 3">
             <a:extLst>
               <a:ext uri="{FF2B5EF4-FFF2-40B4-BE49-F238E27FC236}">
@@ -36125,6 +36096,114 @@
           </a:p>
         </p:txBody>
       </p:sp>
+      <p:pic>
+        <p:nvPicPr>
+          <p:cNvPr id="20" name="T=5" descr="A close up of a map&#10;&#10;Description automatically generated">
+            <a:extLst>
+              <a:ext uri="{FF2B5EF4-FFF2-40B4-BE49-F238E27FC236}">
+                <a16:creationId xmlns:a16="http://schemas.microsoft.com/office/drawing/2014/main" id="{143C3407-4399-4669-B151-69F408F92191}"/>
+              </a:ext>
+            </a:extLst>
+          </p:cNvPr>
+          <p:cNvPicPr>
+            <a:picLocks noChangeAspect="1"/>
+          </p:cNvPicPr>
+          <p:nvPr/>
+        </p:nvPicPr>
+        <p:blipFill>
+          <a:blip r:embed="rId3">
+            <a:extLst>
+              <a:ext uri="{28A0092B-C50C-407E-A947-70E740481C1C}">
+                <a14:useLocalDpi xmlns:a14="http://schemas.microsoft.com/office/drawing/2010/main" val="0"/>
+              </a:ext>
+            </a:extLst>
+          </a:blip>
+          <a:stretch>
+            <a:fillRect/>
+          </a:stretch>
+        </p:blipFill>
+        <p:spPr>
+          <a:xfrm>
+            <a:off x="2720818" y="594599"/>
+            <a:ext cx="6750364" cy="5498194"/>
+          </a:xfrm>
+          <a:prstGeom prst="rect">
+            <a:avLst/>
+          </a:prstGeom>
+        </p:spPr>
+      </p:pic>
+      <p:pic>
+        <p:nvPicPr>
+          <p:cNvPr id="22" name="T=10" descr="A close up of a map&#10;&#10;Description automatically generated">
+            <a:extLst>
+              <a:ext uri="{FF2B5EF4-FFF2-40B4-BE49-F238E27FC236}">
+                <a16:creationId xmlns:a16="http://schemas.microsoft.com/office/drawing/2014/main" id="{6E051251-16EC-4822-B203-23CB416FA6E9}"/>
+              </a:ext>
+            </a:extLst>
+          </p:cNvPr>
+          <p:cNvPicPr>
+            <a:picLocks noChangeAspect="1"/>
+          </p:cNvPicPr>
+          <p:nvPr/>
+        </p:nvPicPr>
+        <p:blipFill>
+          <a:blip r:embed="rId4">
+            <a:extLst>
+              <a:ext uri="{28A0092B-C50C-407E-A947-70E740481C1C}">
+                <a14:useLocalDpi xmlns:a14="http://schemas.microsoft.com/office/drawing/2010/main" val="0"/>
+              </a:ext>
+            </a:extLst>
+          </a:blip>
+          <a:stretch>
+            <a:fillRect/>
+          </a:stretch>
+        </p:blipFill>
+        <p:spPr>
+          <a:xfrm>
+            <a:off x="2720818" y="594599"/>
+            <a:ext cx="6750364" cy="5498194"/>
+          </a:xfrm>
+          <a:prstGeom prst="rect">
+            <a:avLst/>
+          </a:prstGeom>
+        </p:spPr>
+      </p:pic>
+      <p:pic>
+        <p:nvPicPr>
+          <p:cNvPr id="24" name="T=20" descr="A close up of a map&#10;&#10;Description automatically generated">
+            <a:extLst>
+              <a:ext uri="{FF2B5EF4-FFF2-40B4-BE49-F238E27FC236}">
+                <a16:creationId xmlns:a16="http://schemas.microsoft.com/office/drawing/2014/main" id="{89227E96-5D83-4209-B43B-40B8ECAB4C1C}"/>
+              </a:ext>
+            </a:extLst>
+          </p:cNvPr>
+          <p:cNvPicPr>
+            <a:picLocks noChangeAspect="1"/>
+          </p:cNvPicPr>
+          <p:nvPr/>
+        </p:nvPicPr>
+        <p:blipFill>
+          <a:blip r:embed="rId5">
+            <a:extLst>
+              <a:ext uri="{28A0092B-C50C-407E-A947-70E740481C1C}">
+                <a14:useLocalDpi xmlns:a14="http://schemas.microsoft.com/office/drawing/2010/main" val="0"/>
+              </a:ext>
+            </a:extLst>
+          </a:blip>
+          <a:stretch>
+            <a:fillRect/>
+          </a:stretch>
+        </p:blipFill>
+        <p:spPr>
+          <a:xfrm>
+            <a:off x="2720818" y="594599"/>
+            <a:ext cx="6750364" cy="5498194"/>
+          </a:xfrm>
+          <a:prstGeom prst="rect">
+            <a:avLst/>
+          </a:prstGeom>
+        </p:spPr>
+      </p:pic>
     </p:spTree>
     <p:extLst>
       <p:ext uri="{BB962C8B-B14F-4D97-AF65-F5344CB8AC3E}">
@@ -36135,6 +36214,171 @@
   <p:clrMapOvr>
     <a:masterClrMapping/>
   </p:clrMapOvr>
+  <p:timing>
+    <p:tnLst>
+      <p:par>
+        <p:cTn id="1" dur="indefinite" restart="never" nodeType="tmRoot">
+          <p:childTnLst>
+            <p:seq concurrent="1" nextAc="seek">
+              <p:cTn id="2" dur="indefinite" nodeType="mainSeq">
+                <p:childTnLst>
+                  <p:par>
+                    <p:cTn id="3" fill="hold">
+                      <p:stCondLst>
+                        <p:cond delay="indefinite"/>
+                      </p:stCondLst>
+                      <p:childTnLst>
+                        <p:par>
+                          <p:cTn id="4" fill="hold">
+                            <p:stCondLst>
+                              <p:cond delay="0"/>
+                            </p:stCondLst>
+                            <p:childTnLst>
+                              <p:par>
+                                <p:cTn id="5" presetID="1" presetClass="entr" presetSubtype="0" fill="hold" nodeType="clickEffect">
+                                  <p:stCondLst>
+                                    <p:cond delay="0"/>
+                                  </p:stCondLst>
+                                  <p:childTnLst>
+                                    <p:set>
+                                      <p:cBhvr>
+                                        <p:cTn id="6" dur="1" fill="hold">
+                                          <p:stCondLst>
+                                            <p:cond delay="0"/>
+                                          </p:stCondLst>
+                                        </p:cTn>
+                                        <p:tgtEl>
+                                          <p:spTgt spid="20"/>
+                                        </p:tgtEl>
+                                        <p:attrNameLst>
+                                          <p:attrName>style.visibility</p:attrName>
+                                        </p:attrNameLst>
+                                      </p:cBhvr>
+                                      <p:to>
+                                        <p:strVal val="visible"/>
+                                      </p:to>
+                                    </p:set>
+                                  </p:childTnLst>
+                                </p:cTn>
+                              </p:par>
+                            </p:childTnLst>
+                          </p:cTn>
+                        </p:par>
+                      </p:childTnLst>
+                    </p:cTn>
+                  </p:par>
+                  <p:par>
+                    <p:cTn id="7" fill="hold">
+                      <p:stCondLst>
+                        <p:cond delay="indefinite"/>
+                      </p:stCondLst>
+                      <p:childTnLst>
+                        <p:par>
+                          <p:cTn id="8" fill="hold">
+                            <p:stCondLst>
+                              <p:cond delay="0"/>
+                            </p:stCondLst>
+                            <p:childTnLst>
+                              <p:par>
+                                <p:cTn id="9" presetID="1" presetClass="entr" presetSubtype="0" fill="hold" nodeType="clickEffect">
+                                  <p:stCondLst>
+                                    <p:cond delay="0"/>
+                                  </p:stCondLst>
+                                  <p:childTnLst>
+                                    <p:set>
+                                      <p:cBhvr>
+                                        <p:cTn id="10" dur="1" fill="hold">
+                                          <p:stCondLst>
+                                            <p:cond delay="0"/>
+                                          </p:stCondLst>
+                                        </p:cTn>
+                                        <p:tgtEl>
+                                          <p:spTgt spid="22"/>
+                                        </p:tgtEl>
+                                        <p:attrNameLst>
+                                          <p:attrName>style.visibility</p:attrName>
+                                        </p:attrNameLst>
+                                      </p:cBhvr>
+                                      <p:to>
+                                        <p:strVal val="visible"/>
+                                      </p:to>
+                                    </p:set>
+                                  </p:childTnLst>
+                                </p:cTn>
+                              </p:par>
+                            </p:childTnLst>
+                          </p:cTn>
+                        </p:par>
+                      </p:childTnLst>
+                    </p:cTn>
+                  </p:par>
+                  <p:par>
+                    <p:cTn id="11" fill="hold">
+                      <p:stCondLst>
+                        <p:cond delay="indefinite"/>
+                      </p:stCondLst>
+                      <p:childTnLst>
+                        <p:par>
+                          <p:cTn id="12" fill="hold">
+                            <p:stCondLst>
+                              <p:cond delay="0"/>
+                            </p:stCondLst>
+                            <p:childTnLst>
+                              <p:par>
+                                <p:cTn id="13" presetID="1" presetClass="entr" presetSubtype="0" fill="hold" nodeType="clickEffect">
+                                  <p:stCondLst>
+                                    <p:cond delay="0"/>
+                                  </p:stCondLst>
+                                  <p:childTnLst>
+                                    <p:set>
+                                      <p:cBhvr>
+                                        <p:cTn id="14" dur="1" fill="hold">
+                                          <p:stCondLst>
+                                            <p:cond delay="0"/>
+                                          </p:stCondLst>
+                                        </p:cTn>
+                                        <p:tgtEl>
+                                          <p:spTgt spid="24"/>
+                                        </p:tgtEl>
+                                        <p:attrNameLst>
+                                          <p:attrName>style.visibility</p:attrName>
+                                        </p:attrNameLst>
+                                      </p:cBhvr>
+                                      <p:to>
+                                        <p:strVal val="visible"/>
+                                      </p:to>
+                                    </p:set>
+                                  </p:childTnLst>
+                                </p:cTn>
+                              </p:par>
+                            </p:childTnLst>
+                          </p:cTn>
+                        </p:par>
+                      </p:childTnLst>
+                    </p:cTn>
+                  </p:par>
+                </p:childTnLst>
+              </p:cTn>
+              <p:prevCondLst>
+                <p:cond evt="onPrev" delay="0">
+                  <p:tgtEl>
+                    <p:sldTgt/>
+                  </p:tgtEl>
+                </p:cond>
+              </p:prevCondLst>
+              <p:nextCondLst>
+                <p:cond evt="onNext" delay="0">
+                  <p:tgtEl>
+                    <p:sldTgt/>
+                  </p:tgtEl>
+                </p:cond>
+              </p:nextCondLst>
+            </p:seq>
+          </p:childTnLst>
+        </p:cTn>
+      </p:par>
+    </p:tnLst>
+  </p:timing>
 </p:sld>
 </file>
 
@@ -36178,7 +36422,7 @@
           <a:p>
             <a:r>
               <a:rPr lang="en-GB" noProof="0" dirty="0"/>
-              <a:t>Questions?</a:t>
+              <a:t>Conclusions</a:t>
             </a:r>
           </a:p>
         </p:txBody>
@@ -36204,6 +36448,74 @@
           <a:bodyPr/>
           <a:lstStyle/>
           <a:p>
+            <a:r>
+              <a:rPr lang="en-GB" dirty="0"/>
+              <a:t>Gang scheduling is an interesting problem with a lot that can be done</a:t>
+            </a:r>
+          </a:p>
+          <a:p>
+            <a:r>
+              <a:rPr lang="en-GB" dirty="0"/>
+              <a:t>A faster and more accurate </a:t>
+            </a:r>
+            <a:r>
+              <a:rPr lang="en-150" dirty="0"/>
+              <a:t>analysis </a:t>
+            </a:r>
+            <a:r>
+              <a:rPr lang="en-GB" dirty="0"/>
+              <a:t>can be defined </a:t>
+            </a:r>
+            <a:r>
+              <a:rPr lang="en-150" dirty="0"/>
+              <a:t>w</a:t>
+            </a:r>
+            <a:r>
+              <a:rPr lang="en-GB" dirty="0"/>
+              <a:t>i</a:t>
+            </a:r>
+            <a:r>
+              <a:rPr lang="en-150" dirty="0"/>
+              <a:t>t</a:t>
+            </a:r>
+            <a:r>
+              <a:rPr lang="en-GB" dirty="0"/>
+              <a:t>h</a:t>
+            </a:r>
+            <a:r>
+              <a:rPr lang="en-150" dirty="0"/>
+              <a:t> </a:t>
+            </a:r>
+            <a:r>
+              <a:rPr lang="en-GB" dirty="0"/>
+              <a:t>S</a:t>
+            </a:r>
+            <a:r>
+              <a:rPr lang="en-150" dirty="0"/>
+              <a:t>AG</a:t>
+            </a:r>
+            <a:endParaRPr lang="en-GB" dirty="0"/>
+          </a:p>
+          <a:p>
+            <a:r>
+              <a:rPr lang="en-GB" dirty="0"/>
+              <a:t>Its</a:t>
+            </a:r>
+            <a:r>
+              <a:rPr lang="en-150" dirty="0"/>
+              <a:t> moldable</a:t>
+            </a:r>
+            <a:r>
+              <a:rPr lang="en-GB" dirty="0"/>
+              <a:t> properties can be used with the proper scheduler</a:t>
+            </a:r>
+            <a:endParaRPr lang="en-150" dirty="0"/>
+          </a:p>
+          <a:p>
+            <a:r>
+              <a:rPr lang="en-150" dirty="0"/>
+              <a:t>Questions?</a:t>
+            </a:r>
             <a:endParaRPr lang="en-GB" dirty="0"/>
           </a:p>
         </p:txBody>
@@ -36247,6 +36559,235 @@
   <p:clrMapOvr>
     <a:masterClrMapping/>
   </p:clrMapOvr>
+  <p:timing>
+    <p:tnLst>
+      <p:par>
+        <p:cTn id="1" dur="indefinite" restart="never" nodeType="tmRoot">
+          <p:childTnLst>
+            <p:seq concurrent="1" nextAc="seek">
+              <p:cTn id="2" dur="indefinite" nodeType="mainSeq">
+                <p:childTnLst>
+                  <p:par>
+                    <p:cTn id="3" fill="hold">
+                      <p:stCondLst>
+                        <p:cond delay="indefinite"/>
+                      </p:stCondLst>
+                      <p:childTnLst>
+                        <p:par>
+                          <p:cTn id="4" fill="hold">
+                            <p:stCondLst>
+                              <p:cond delay="0"/>
+                            </p:stCondLst>
+                            <p:childTnLst>
+                              <p:par>
+                                <p:cTn id="5" presetID="1" presetClass="entr" presetSubtype="0" fill="hold" grpId="0" nodeType="clickEffect">
+                                  <p:stCondLst>
+                                    <p:cond delay="0"/>
+                                  </p:stCondLst>
+                                  <p:childTnLst>
+                                    <p:set>
+                                      <p:cBhvr>
+                                        <p:cTn id="6" dur="1" fill="hold">
+                                          <p:stCondLst>
+                                            <p:cond delay="0"/>
+                                          </p:stCondLst>
+                                        </p:cTn>
+                                        <p:tgtEl>
+                                          <p:spTgt spid="3">
+                                            <p:txEl>
+                                              <p:pRg st="0" end="0"/>
+                                            </p:txEl>
+                                          </p:spTgt>
+                                        </p:tgtEl>
+                                        <p:attrNameLst>
+                                          <p:attrName>style.visibility</p:attrName>
+                                        </p:attrNameLst>
+                                      </p:cBhvr>
+                                      <p:to>
+                                        <p:strVal val="visible"/>
+                                      </p:to>
+                                    </p:set>
+                                  </p:childTnLst>
+                                </p:cTn>
+                              </p:par>
+                            </p:childTnLst>
+                          </p:cTn>
+                        </p:par>
+                      </p:childTnLst>
+                    </p:cTn>
+                  </p:par>
+                  <p:par>
+                    <p:cTn id="7" fill="hold">
+                      <p:stCondLst>
+                        <p:cond delay="indefinite"/>
+                      </p:stCondLst>
+                      <p:childTnLst>
+                        <p:par>
+                          <p:cTn id="8" fill="hold">
+                            <p:stCondLst>
+                              <p:cond delay="0"/>
+                            </p:stCondLst>
+                            <p:childTnLst>
+                              <p:par>
+                                <p:cTn id="9" presetID="1" presetClass="entr" presetSubtype="0" fill="hold" grpId="0" nodeType="clickEffect">
+                                  <p:stCondLst>
+                                    <p:cond delay="0"/>
+                                  </p:stCondLst>
+                                  <p:childTnLst>
+                                    <p:set>
+                                      <p:cBhvr>
+                                        <p:cTn id="10" dur="1" fill="hold">
+                                          <p:stCondLst>
+                                            <p:cond delay="0"/>
+                                          </p:stCondLst>
+                                        </p:cTn>
+                                        <p:tgtEl>
+                                          <p:spTgt spid="3">
+                                            <p:txEl>
+                                              <p:pRg st="1" end="1"/>
+                                            </p:txEl>
+                                          </p:spTgt>
+                                        </p:tgtEl>
+                                        <p:attrNameLst>
+                                          <p:attrName>style.visibility</p:attrName>
+                                        </p:attrNameLst>
+                                      </p:cBhvr>
+                                      <p:to>
+                                        <p:strVal val="visible"/>
+                                      </p:to>
+                                    </p:set>
+                                  </p:childTnLst>
+                                </p:cTn>
+                              </p:par>
+                            </p:childTnLst>
+                          </p:cTn>
+                        </p:par>
+                      </p:childTnLst>
+                    </p:cTn>
+                  </p:par>
+                  <p:par>
+                    <p:cTn id="11" fill="hold">
+                      <p:stCondLst>
+                        <p:cond delay="indefinite"/>
+                      </p:stCondLst>
+                      <p:childTnLst>
+                        <p:par>
+                          <p:cTn id="12" fill="hold">
+                            <p:stCondLst>
+                              <p:cond delay="0"/>
+                            </p:stCondLst>
+                            <p:childTnLst>
+                              <p:par>
+                                <p:cTn id="13" presetID="1" presetClass="entr" presetSubtype="0" fill="hold" grpId="0" nodeType="clickEffect">
+                                  <p:stCondLst>
+                                    <p:cond delay="0"/>
+                                  </p:stCondLst>
+                                  <p:childTnLst>
+                                    <p:set>
+                                      <p:cBhvr>
+                                        <p:cTn id="14" dur="1" fill="hold">
+                                          <p:stCondLst>
+                                            <p:cond delay="0"/>
+                                          </p:stCondLst>
+                                        </p:cTn>
+                                        <p:tgtEl>
+                                          <p:spTgt spid="3">
+                                            <p:txEl>
+                                              <p:pRg st="2" end="2"/>
+                                            </p:txEl>
+                                          </p:spTgt>
+                                        </p:tgtEl>
+                                        <p:attrNameLst>
+                                          <p:attrName>style.visibility</p:attrName>
+                                        </p:attrNameLst>
+                                      </p:cBhvr>
+                                      <p:to>
+                                        <p:strVal val="visible"/>
+                                      </p:to>
+                                    </p:set>
+                                  </p:childTnLst>
+                                </p:cTn>
+                              </p:par>
+                            </p:childTnLst>
+                          </p:cTn>
+                        </p:par>
+                      </p:childTnLst>
+                    </p:cTn>
+                  </p:par>
+                  <p:par>
+                    <p:cTn id="15" fill="hold">
+                      <p:stCondLst>
+                        <p:cond delay="indefinite"/>
+                      </p:stCondLst>
+                      <p:childTnLst>
+                        <p:par>
+                          <p:cTn id="16" fill="hold">
+                            <p:stCondLst>
+                              <p:cond delay="0"/>
+                            </p:stCondLst>
+                            <p:childTnLst>
+                              <p:par>
+                                <p:cTn id="17" presetID="1" presetClass="entr" presetSubtype="0" fill="hold" grpId="0" nodeType="clickEffect">
+                                  <p:stCondLst>
+                                    <p:cond delay="0"/>
+                                  </p:stCondLst>
+                                  <p:childTnLst>
+                                    <p:set>
+                                      <p:cBhvr>
+                                        <p:cTn id="18" dur="1" fill="hold">
+                                          <p:stCondLst>
+                                            <p:cond delay="0"/>
+                                          </p:stCondLst>
+                                        </p:cTn>
+                                        <p:tgtEl>
+                                          <p:spTgt spid="3">
+                                            <p:txEl>
+                                              <p:pRg st="3" end="3"/>
+                                            </p:txEl>
+                                          </p:spTgt>
+                                        </p:tgtEl>
+                                        <p:attrNameLst>
+                                          <p:attrName>style.visibility</p:attrName>
+                                        </p:attrNameLst>
+                                      </p:cBhvr>
+                                      <p:to>
+                                        <p:strVal val="visible"/>
+                                      </p:to>
+                                    </p:set>
+                                  </p:childTnLst>
+                                </p:cTn>
+                              </p:par>
+                            </p:childTnLst>
+                          </p:cTn>
+                        </p:par>
+                      </p:childTnLst>
+                    </p:cTn>
+                  </p:par>
+                </p:childTnLst>
+              </p:cTn>
+              <p:prevCondLst>
+                <p:cond evt="onPrev" delay="0">
+                  <p:tgtEl>
+                    <p:sldTgt/>
+                  </p:tgtEl>
+                </p:cond>
+              </p:prevCondLst>
+              <p:nextCondLst>
+                <p:cond evt="onNext" delay="0">
+                  <p:tgtEl>
+                    <p:sldTgt/>
+                  </p:tgtEl>
+                </p:cond>
+              </p:nextCondLst>
+            </p:seq>
+          </p:childTnLst>
+        </p:cTn>
+      </p:par>
+    </p:tnLst>
+    <p:bldLst>
+      <p:bldP spid="3" grpId="0" uiExpand="1" build="p"/>
+    </p:bldLst>
+  </p:timing>
 </p:sld>
 </file>
 
@@ -37370,78 +37911,6 @@
                                           </p:stCondLst>
                                         </p:cTn>
                                         <p:tgtEl>
-                                          <p:spTgt spid="5"/>
-                                        </p:tgtEl>
-                                        <p:attrNameLst>
-                                          <p:attrName>style.visibility</p:attrName>
-                                        </p:attrNameLst>
-                                      </p:cBhvr>
-                                      <p:to>
-                                        <p:strVal val="visible"/>
-                                      </p:to>
-                                    </p:set>
-                                  </p:childTnLst>
-                                </p:cTn>
-                              </p:par>
-                              <p:par>
-                                <p:cTn id="7" presetID="1" presetClass="entr" presetSubtype="0" fill="hold" grpId="0" nodeType="withEffect">
-                                  <p:stCondLst>
-                                    <p:cond delay="0"/>
-                                  </p:stCondLst>
-                                  <p:childTnLst>
-                                    <p:set>
-                                      <p:cBhvr>
-                                        <p:cTn id="8" dur="1" fill="hold">
-                                          <p:stCondLst>
-                                            <p:cond delay="0"/>
-                                          </p:stCondLst>
-                                        </p:cTn>
-                                        <p:tgtEl>
-                                          <p:spTgt spid="7"/>
-                                        </p:tgtEl>
-                                        <p:attrNameLst>
-                                          <p:attrName>style.visibility</p:attrName>
-                                        </p:attrNameLst>
-                                      </p:cBhvr>
-                                      <p:to>
-                                        <p:strVal val="visible"/>
-                                      </p:to>
-                                    </p:set>
-                                  </p:childTnLst>
-                                </p:cTn>
-                              </p:par>
-                            </p:childTnLst>
-                          </p:cTn>
-                        </p:par>
-                      </p:childTnLst>
-                    </p:cTn>
-                  </p:par>
-                  <p:par>
-                    <p:cTn id="9" fill="hold">
-                      <p:stCondLst>
-                        <p:cond delay="indefinite"/>
-                      </p:stCondLst>
-                      <p:childTnLst>
-                        <p:par>
-                          <p:cTn id="10" fill="hold">
-                            <p:stCondLst>
-                              <p:cond delay="0"/>
-                            </p:stCondLst>
-                            <p:childTnLst>
-                              <p:par>
-                                <p:cTn id="11" presetID="1" presetClass="entr" presetSubtype="0" fill="hold" nodeType="clickEffect">
-                                  <p:stCondLst>
-                                    <p:cond delay="0"/>
-                                  </p:stCondLst>
-                                  <p:childTnLst>
-                                    <p:set>
-                                      <p:cBhvr>
-                                        <p:cTn id="12" dur="1" fill="hold">
-                                          <p:stCondLst>
-                                            <p:cond delay="0"/>
-                                          </p:stCondLst>
-                                        </p:cTn>
-                                        <p:tgtEl>
                                           <p:spTgt spid="6"/>
                                         </p:tgtEl>
                                         <p:attrNameLst>
@@ -37456,14 +37925,14 @@
                                 </p:cTn>
                               </p:par>
                               <p:par>
-                                <p:cTn id="13" presetID="1" presetClass="entr" presetSubtype="0" fill="hold" nodeType="withEffect">
+                                <p:cTn id="7" presetID="1" presetClass="entr" presetSubtype="0" fill="hold" nodeType="withEffect">
                                   <p:stCondLst>
                                     <p:cond delay="0"/>
                                   </p:stCondLst>
                                   <p:childTnLst>
                                     <p:set>
                                       <p:cBhvr>
-                                        <p:cTn id="14" dur="1" fill="hold">
+                                        <p:cTn id="8" dur="1" fill="hold">
                                           <p:stCondLst>
                                             <p:cond delay="0"/>
                                           </p:stCondLst>
@@ -37483,14 +37952,14 @@
                                 </p:cTn>
                               </p:par>
                               <p:par>
-                                <p:cTn id="15" presetID="1" presetClass="entr" presetSubtype="0" fill="hold" grpId="0" nodeType="withEffect">
+                                <p:cTn id="9" presetID="1" presetClass="entr" presetSubtype="0" fill="hold" grpId="0" nodeType="withEffect">
                                   <p:stCondLst>
                                     <p:cond delay="0"/>
                                   </p:stCondLst>
                                   <p:childTnLst>
                                     <p:set>
                                       <p:cBhvr>
-                                        <p:cTn id="16" dur="1" fill="hold">
+                                        <p:cTn id="10" dur="1" fill="hold">
                                           <p:stCondLst>
                                             <p:cond delay="0"/>
                                           </p:stCondLst>
@@ -37510,14 +37979,14 @@
                                 </p:cTn>
                               </p:par>
                               <p:par>
-                                <p:cTn id="17" presetID="1" presetClass="entr" presetSubtype="0" fill="hold" grpId="0" nodeType="withEffect">
+                                <p:cTn id="11" presetID="1" presetClass="entr" presetSubtype="0" fill="hold" grpId="0" nodeType="withEffect">
                                   <p:stCondLst>
                                     <p:cond delay="0"/>
                                   </p:stCondLst>
                                   <p:childTnLst>
                                     <p:set>
                                       <p:cBhvr>
-                                        <p:cTn id="18" dur="1" fill="hold">
+                                        <p:cTn id="12" dur="1" fill="hold">
                                           <p:stCondLst>
                                             <p:cond delay="0"/>
                                           </p:stCondLst>
@@ -37547,26 +38016,26 @@
                     </p:cTn>
                   </p:par>
                   <p:par>
-                    <p:cTn id="19" fill="hold">
+                    <p:cTn id="13" fill="hold">
                       <p:stCondLst>
                         <p:cond delay="indefinite"/>
                       </p:stCondLst>
                       <p:childTnLst>
                         <p:par>
-                          <p:cTn id="20" fill="hold">
+                          <p:cTn id="14" fill="hold">
                             <p:stCondLst>
                               <p:cond delay="0"/>
                             </p:stCondLst>
                             <p:childTnLst>
                               <p:par>
-                                <p:cTn id="21" presetID="1" presetClass="entr" presetSubtype="0" fill="hold" grpId="0" nodeType="clickEffect">
+                                <p:cTn id="15" presetID="1" presetClass="entr" presetSubtype="0" fill="hold" grpId="0" nodeType="clickEffect">
                                   <p:stCondLst>
                                     <p:cond delay="0"/>
                                   </p:stCondLst>
                                   <p:childTnLst>
                                     <p:set>
                                       <p:cBhvr>
-                                        <p:cTn id="22" dur="1" fill="hold">
+                                        <p:cTn id="16" dur="1" fill="hold">
                                           <p:stCondLst>
                                             <p:cond delay="0"/>
                                           </p:stCondLst>
@@ -37618,7 +38087,6 @@
     </p:tnLst>
     <p:bldLst>
       <p:bldP spid="3" grpId="0" uiExpand="1" build="p"/>
-      <p:bldP spid="7" grpId="0"/>
       <p:bldP spid="8" grpId="0"/>
     </p:bldLst>
   </p:timing>
@@ -38328,15 +38796,7 @@
             </a:r>
             <a:r>
               <a:rPr lang="en-GB" noProof="0" dirty="0"/>
-              <a:t>: </a:t>
-            </a:r>
-            <a:r>
-              <a:rPr lang="en-150" noProof="0" dirty="0"/>
-              <a:t>n</a:t>
-            </a:r>
-            <a:r>
-              <a:rPr lang="en-GB" noProof="0" dirty="0"/>
-              <a:t>umber of cores can change during runtime</a:t>
+              <a:t>: number of cores can change during runtime</a:t>
             </a:r>
             <a:endParaRPr lang="en-GB" b="1" noProof="0" dirty="0"/>
           </a:p>

</xml_diff>

<commit_message>
Added new fixed slides
</commit_message>
<xml_diff>
--- a/Notes/TFM_presentations/2020_02_24_v2/2020_02_24_v2.pptx
+++ b/Notes/TFM_presentations/2020_02_24_v2/2020_02_24_v2.pptx
@@ -12220,220 +12220,48 @@
           </a:p>
         </p:txBody>
       </p:sp>
-      <mc:AlternateContent xmlns:mc="http://schemas.openxmlformats.org/markup-compatibility/2006" xmlns:a14="http://schemas.microsoft.com/office/drawing/2010/main">
-        <mc:Choice Requires="a14">
-          <p:sp>
-            <p:nvSpPr>
-              <p:cNvPr id="3" name="Content Placeholder 2">
-                <a:extLst>
-                  <a:ext uri="{FF2B5EF4-FFF2-40B4-BE49-F238E27FC236}">
-                    <a16:creationId xmlns:a16="http://schemas.microsoft.com/office/drawing/2014/main" id="{548D81FD-2868-4882-8387-BDCBDC704282}"/>
-                  </a:ext>
-                </a:extLst>
-              </p:cNvPr>
-              <p:cNvSpPr>
-                <a:spLocks noGrp="1"/>
-              </p:cNvSpPr>
-              <p:nvPr>
-                <p:ph idx="1"/>
-              </p:nvPr>
-            </p:nvSpPr>
-            <p:spPr/>
-            <p:txBody>
-              <a:bodyPr/>
-              <a:lstStyle/>
-              <a:p>
-                <a:r>
-                  <a:rPr lang="en-GB" noProof="0" dirty="0"/>
-                  <a:t>Based on Global JLFP scheduler</a:t>
-                </a:r>
-              </a:p>
-              <a:p>
-                <a:pPr lvl="1"/>
-                <a:r>
-                  <a:rPr lang="en-GB" noProof="0" dirty="0"/>
-                  <a:t>Work conserving scheduler</a:t>
-                </a:r>
-              </a:p>
-              <a:p>
-                <a:pPr lvl="1"/>
-                <a:r>
-                  <a:rPr lang="en-GB" noProof="0" dirty="0"/>
-                  <a:t>Job with highest priority goes first</a:t>
-                </a:r>
-              </a:p>
-              <a:p>
-                <a:r>
-                  <a:rPr lang="en-GB" noProof="0" dirty="0"/>
-                  <a:t>Assigns maximum cores available between </a:t>
-                </a:r>
-                <a14:m>
-                  <m:oMath xmlns:m="http://schemas.openxmlformats.org/officeDocument/2006/math">
-                    <m:sSubSup>
-                      <m:sSubSupPr>
-                        <m:ctrlPr>
-                          <a:rPr lang="en-GB" b="0" i="1" noProof="0" smtClean="0">
-                            <a:latin typeface="Cambria Math" panose="02040503050406030204" pitchFamily="18" charset="0"/>
-                          </a:rPr>
-                        </m:ctrlPr>
-                      </m:sSubSupPr>
-                      <m:e>
-                        <m:r>
-                          <a:rPr lang="en-GB" b="0" i="1" noProof="0" smtClean="0">
-                            <a:latin typeface="Cambria Math" panose="02040503050406030204" pitchFamily="18" charset="0"/>
-                          </a:rPr>
-                          <m:t>𝑠</m:t>
-                        </m:r>
-                      </m:e>
-                      <m:sub>
-                        <m:r>
-                          <a:rPr lang="en-GB" b="0" i="1" noProof="0" smtClean="0">
-                            <a:latin typeface="Cambria Math" panose="02040503050406030204" pitchFamily="18" charset="0"/>
-                          </a:rPr>
-                          <m:t>𝑖</m:t>
-                        </m:r>
-                      </m:sub>
-                      <m:sup>
-                        <m:func>
-                          <m:funcPr>
-                            <m:ctrlPr>
-                              <a:rPr lang="en-GB" b="0" i="1" noProof="0" smtClean="0">
-                                <a:latin typeface="Cambria Math" panose="02040503050406030204" pitchFamily="18" charset="0"/>
-                              </a:rPr>
-                            </m:ctrlPr>
-                          </m:funcPr>
-                          <m:fName>
-                            <m:r>
-                              <m:rPr>
-                                <m:sty m:val="p"/>
-                              </m:rPr>
-                              <a:rPr lang="en-GB" b="0" i="0" noProof="0" smtClean="0">
-                                <a:latin typeface="Cambria Math" panose="02040503050406030204" pitchFamily="18" charset="0"/>
-                              </a:rPr>
-                              <m:t>min</m:t>
-                            </m:r>
-                          </m:fName>
-                          <m:e>
-                            <m:r>
-                              <a:rPr lang="en-GB" b="0" i="1" noProof="0" smtClean="0">
-                                <a:latin typeface="Cambria Math" panose="02040503050406030204" pitchFamily="18" charset="0"/>
-                              </a:rPr>
-                              <m:t> </m:t>
-                            </m:r>
-                          </m:e>
-                        </m:func>
-                      </m:sup>
-                    </m:sSubSup>
-                  </m:oMath>
-                </a14:m>
-                <a:r>
-                  <a:rPr lang="en-GB" noProof="0" dirty="0"/>
-                  <a:t> and </a:t>
-                </a:r>
-                <a14:m>
-                  <m:oMath xmlns:m="http://schemas.openxmlformats.org/officeDocument/2006/math">
-                    <m:sSubSup>
-                      <m:sSubSupPr>
-                        <m:ctrlPr>
-                          <a:rPr lang="en-GB" b="0" i="1" noProof="0" smtClean="0">
-                            <a:latin typeface="Cambria Math" panose="02040503050406030204" pitchFamily="18" charset="0"/>
-                          </a:rPr>
-                        </m:ctrlPr>
-                      </m:sSubSupPr>
-                      <m:e>
-                        <m:r>
-                          <a:rPr lang="en-GB" b="0" i="1" noProof="0" smtClean="0">
-                            <a:latin typeface="Cambria Math" panose="02040503050406030204" pitchFamily="18" charset="0"/>
-                          </a:rPr>
-                          <m:t>𝑠</m:t>
-                        </m:r>
-                      </m:e>
-                      <m:sub>
-                        <m:r>
-                          <a:rPr lang="en-GB" b="0" i="1" noProof="0" smtClean="0">
-                            <a:latin typeface="Cambria Math" panose="02040503050406030204" pitchFamily="18" charset="0"/>
-                          </a:rPr>
-                          <m:t>𝑖</m:t>
-                        </m:r>
-                      </m:sub>
-                      <m:sup>
-                        <m:func>
-                          <m:funcPr>
-                            <m:ctrlPr>
-                              <a:rPr lang="en-GB" b="0" i="1" noProof="0" smtClean="0">
-                                <a:latin typeface="Cambria Math" panose="02040503050406030204" pitchFamily="18" charset="0"/>
-                              </a:rPr>
-                            </m:ctrlPr>
-                          </m:funcPr>
-                          <m:fName>
-                            <m:r>
-                              <m:rPr>
-                                <m:sty m:val="p"/>
-                              </m:rPr>
-                              <a:rPr lang="en-GB" b="0" i="0" noProof="0" smtClean="0">
-                                <a:latin typeface="Cambria Math" panose="02040503050406030204" pitchFamily="18" charset="0"/>
-                              </a:rPr>
-                              <m:t>max</m:t>
-                            </m:r>
-                          </m:fName>
-                          <m:e>
-                            <m:r>
-                              <a:rPr lang="en-GB" b="0" i="1" noProof="0" smtClean="0">
-                                <a:latin typeface="Cambria Math" panose="02040503050406030204" pitchFamily="18" charset="0"/>
-                              </a:rPr>
-                              <m:t> </m:t>
-                            </m:r>
-                          </m:e>
-                        </m:func>
-                      </m:sup>
-                    </m:sSubSup>
-                  </m:oMath>
-                </a14:m>
-                <a:endParaRPr lang="en-GB" noProof="0" dirty="0"/>
-              </a:p>
-            </p:txBody>
-          </p:sp>
-        </mc:Choice>
-        <mc:Fallback xmlns="">
-          <p:sp>
-            <p:nvSpPr>
-              <p:cNvPr id="3" name="Content Placeholder 2">
-                <a:extLst>
-                  <a:ext uri="{FF2B5EF4-FFF2-40B4-BE49-F238E27FC236}">
-                    <a16:creationId xmlns:a16="http://schemas.microsoft.com/office/drawing/2014/main" id="{548D81FD-2868-4882-8387-BDCBDC704282}"/>
-                  </a:ext>
-                </a:extLst>
-              </p:cNvPr>
-              <p:cNvSpPr>
-                <a:spLocks noGrp="1" noRot="1" noChangeAspect="1" noMove="1" noResize="1" noEditPoints="1" noAdjustHandles="1" noChangeArrowheads="1" noChangeShapeType="1" noTextEdit="1"/>
-              </p:cNvSpPr>
-              <p:nvPr>
-                <p:ph idx="1"/>
-              </p:nvPr>
-            </p:nvSpPr>
-            <p:spPr>
-              <a:blipFill>
-                <a:blip r:embed="rId3"/>
-                <a:stretch>
-                  <a:fillRect l="-1043" t="-2313"/>
-                </a:stretch>
-              </a:blipFill>
-            </p:spPr>
-            <p:txBody>
-              <a:bodyPr/>
-              <a:lstStyle/>
-              <a:p>
-                <a:r>
-                  <a:rPr lang="en-GB">
-                    <a:noFill/>
-                  </a:rPr>
-                  <a:t> </a:t>
-                </a:r>
-              </a:p>
-            </p:txBody>
-          </p:sp>
-        </mc:Fallback>
-      </mc:AlternateContent>
+      <p:sp>
+        <p:nvSpPr>
+          <p:cNvPr id="3" name="Content Placeholder 2">
+            <a:extLst>
+              <a:ext uri="{FF2B5EF4-FFF2-40B4-BE49-F238E27FC236}">
+                <a16:creationId xmlns:a16="http://schemas.microsoft.com/office/drawing/2014/main" id="{548D81FD-2868-4882-8387-BDCBDC704282}"/>
+              </a:ext>
+            </a:extLst>
+          </p:cNvPr>
+          <p:cNvSpPr>
+            <a:spLocks noGrp="1"/>
+          </p:cNvSpPr>
+          <p:nvPr>
+            <p:ph idx="1"/>
+          </p:nvPr>
+        </p:nvSpPr>
+        <p:spPr/>
+        <p:txBody>
+          <a:bodyPr/>
+          <a:lstStyle/>
+          <a:p>
+            <a:r>
+              <a:rPr lang="en-GB" noProof="0" dirty="0"/>
+              <a:t>Based on Global JLFP scheduler</a:t>
+            </a:r>
+          </a:p>
+          <a:p>
+            <a:pPr lvl="1"/>
+            <a:r>
+              <a:rPr lang="en-GB" noProof="0" dirty="0"/>
+              <a:t>Work conserving scheduler</a:t>
+            </a:r>
+          </a:p>
+          <a:p>
+            <a:pPr lvl="1"/>
+            <a:r>
+              <a:rPr lang="en-GB" noProof="0" dirty="0"/>
+              <a:t>Job with highest priority goes first</a:t>
+            </a:r>
+          </a:p>
+        </p:txBody>
+      </p:sp>
       <p:sp>
         <p:nvSpPr>
           <p:cNvPr id="4" name="Slide Number Placeholder 3">
@@ -12463,6 +12291,391 @@
           </a:p>
         </p:txBody>
       </p:sp>
+      <mc:AlternateContent xmlns:mc="http://schemas.openxmlformats.org/markup-compatibility/2006">
+        <mc:Choice xmlns:a14="http://schemas.microsoft.com/office/drawing/2010/main" Requires="a14">
+          <p:sp>
+            <p:nvSpPr>
+              <p:cNvPr id="6" name="Content Placeholder 2">
+                <a:extLst>
+                  <a:ext uri="{FF2B5EF4-FFF2-40B4-BE49-F238E27FC236}">
+                    <a16:creationId xmlns:a16="http://schemas.microsoft.com/office/drawing/2014/main" id="{F89C5991-21F1-4A12-A760-2F1D6DEAD23E}"/>
+                  </a:ext>
+                </a:extLst>
+              </p:cNvPr>
+              <p:cNvSpPr txBox="1">
+                <a:spLocks/>
+              </p:cNvSpPr>
+              <p:nvPr/>
+            </p:nvSpPr>
+            <p:spPr>
+              <a:xfrm>
+                <a:off x="838200" y="2819599"/>
+                <a:ext cx="10515600" cy="609402"/>
+              </a:xfrm>
+              <a:prstGeom prst="rect">
+                <a:avLst/>
+              </a:prstGeom>
+            </p:spPr>
+            <p:txBody>
+              <a:bodyPr vert="horz" lIns="91440" tIns="45720" rIns="91440" bIns="45720" rtlCol="0">
+                <a:normAutofit/>
+              </a:bodyPr>
+              <a:lstStyle>
+                <a:lvl1pPr marL="228600" indent="-228600" algn="l" defTabSz="914400" rtl="0" eaLnBrk="1" latinLnBrk="0" hangingPunct="1">
+                  <a:lnSpc>
+                    <a:spcPct val="90000"/>
+                  </a:lnSpc>
+                  <a:spcBef>
+                    <a:spcPts val="1000"/>
+                  </a:spcBef>
+                  <a:buClr>
+                    <a:srgbClr val="00A6D6"/>
+                  </a:buClr>
+                  <a:buFont typeface="Arial" panose="020B0604020202020204" pitchFamily="34" charset="0"/>
+                  <a:buChar char="•"/>
+                  <a:defRPr sz="2800" kern="1200">
+                    <a:solidFill>
+                      <a:schemeClr val="tx1"/>
+                    </a:solidFill>
+                    <a:latin typeface="+mn-lt"/>
+                    <a:ea typeface="+mn-ea"/>
+                    <a:cs typeface="+mn-cs"/>
+                  </a:defRPr>
+                </a:lvl1pPr>
+                <a:lvl2pPr marL="685800" indent="-228600" algn="l" defTabSz="914400" rtl="0" eaLnBrk="1" latinLnBrk="0" hangingPunct="1">
+                  <a:lnSpc>
+                    <a:spcPct val="90000"/>
+                  </a:lnSpc>
+                  <a:spcBef>
+                    <a:spcPts val="500"/>
+                  </a:spcBef>
+                  <a:buClr>
+                    <a:srgbClr val="00A6D6"/>
+                  </a:buClr>
+                  <a:buFont typeface="Arial" panose="020B0604020202020204" pitchFamily="34" charset="0"/>
+                  <a:buChar char="•"/>
+                  <a:defRPr sz="2400" kern="1200">
+                    <a:solidFill>
+                      <a:schemeClr val="tx1"/>
+                    </a:solidFill>
+                    <a:latin typeface="+mn-lt"/>
+                    <a:ea typeface="+mn-ea"/>
+                    <a:cs typeface="+mn-cs"/>
+                  </a:defRPr>
+                </a:lvl2pPr>
+                <a:lvl3pPr marL="1143000" indent="-228600" algn="l" defTabSz="914400" rtl="0" eaLnBrk="1" latinLnBrk="0" hangingPunct="1">
+                  <a:lnSpc>
+                    <a:spcPct val="90000"/>
+                  </a:lnSpc>
+                  <a:spcBef>
+                    <a:spcPts val="500"/>
+                  </a:spcBef>
+                  <a:buClr>
+                    <a:srgbClr val="00A6D6"/>
+                  </a:buClr>
+                  <a:buFont typeface="Arial" panose="020B0604020202020204" pitchFamily="34" charset="0"/>
+                  <a:buChar char="•"/>
+                  <a:defRPr sz="2000" kern="1200">
+                    <a:solidFill>
+                      <a:schemeClr val="tx1"/>
+                    </a:solidFill>
+                    <a:latin typeface="+mn-lt"/>
+                    <a:ea typeface="+mn-ea"/>
+                    <a:cs typeface="+mn-cs"/>
+                  </a:defRPr>
+                </a:lvl3pPr>
+                <a:lvl4pPr marL="1600200" indent="-228600" algn="l" defTabSz="914400" rtl="0" eaLnBrk="1" latinLnBrk="0" hangingPunct="1">
+                  <a:lnSpc>
+                    <a:spcPct val="90000"/>
+                  </a:lnSpc>
+                  <a:spcBef>
+                    <a:spcPts val="500"/>
+                  </a:spcBef>
+                  <a:buClr>
+                    <a:srgbClr val="00A6D6"/>
+                  </a:buClr>
+                  <a:buFont typeface="Arial" panose="020B0604020202020204" pitchFamily="34" charset="0"/>
+                  <a:buChar char="•"/>
+                  <a:defRPr sz="1800" kern="1200">
+                    <a:solidFill>
+                      <a:schemeClr val="tx1"/>
+                    </a:solidFill>
+                    <a:latin typeface="+mn-lt"/>
+                    <a:ea typeface="+mn-ea"/>
+                    <a:cs typeface="+mn-cs"/>
+                  </a:defRPr>
+                </a:lvl4pPr>
+                <a:lvl5pPr marL="2057400" indent="-228600" algn="l" defTabSz="914400" rtl="0" eaLnBrk="1" latinLnBrk="0" hangingPunct="1">
+                  <a:lnSpc>
+                    <a:spcPct val="90000"/>
+                  </a:lnSpc>
+                  <a:spcBef>
+                    <a:spcPts val="500"/>
+                  </a:spcBef>
+                  <a:buClr>
+                    <a:srgbClr val="00A6D6"/>
+                  </a:buClr>
+                  <a:buFont typeface="Arial" panose="020B0604020202020204" pitchFamily="34" charset="0"/>
+                  <a:buChar char="•"/>
+                  <a:defRPr sz="1800" kern="1200">
+                    <a:solidFill>
+                      <a:schemeClr val="tx1"/>
+                    </a:solidFill>
+                    <a:latin typeface="+mn-lt"/>
+                    <a:ea typeface="+mn-ea"/>
+                    <a:cs typeface="+mn-cs"/>
+                  </a:defRPr>
+                </a:lvl5pPr>
+                <a:lvl6pPr marL="2514600" indent="-228600" algn="l" defTabSz="914400" rtl="0" eaLnBrk="1" latinLnBrk="0" hangingPunct="1">
+                  <a:lnSpc>
+                    <a:spcPct val="90000"/>
+                  </a:lnSpc>
+                  <a:spcBef>
+                    <a:spcPts val="500"/>
+                  </a:spcBef>
+                  <a:buFont typeface="Arial" panose="020B0604020202020204" pitchFamily="34" charset="0"/>
+                  <a:buChar char="•"/>
+                  <a:defRPr sz="1800" kern="1200">
+                    <a:solidFill>
+                      <a:schemeClr val="tx1"/>
+                    </a:solidFill>
+                    <a:latin typeface="+mn-lt"/>
+                    <a:ea typeface="+mn-ea"/>
+                    <a:cs typeface="+mn-cs"/>
+                  </a:defRPr>
+                </a:lvl6pPr>
+                <a:lvl7pPr marL="2971800" indent="-228600" algn="l" defTabSz="914400" rtl="0" eaLnBrk="1" latinLnBrk="0" hangingPunct="1">
+                  <a:lnSpc>
+                    <a:spcPct val="90000"/>
+                  </a:lnSpc>
+                  <a:spcBef>
+                    <a:spcPts val="500"/>
+                  </a:spcBef>
+                  <a:buFont typeface="Arial" panose="020B0604020202020204" pitchFamily="34" charset="0"/>
+                  <a:buChar char="•"/>
+                  <a:defRPr sz="1800" kern="1200">
+                    <a:solidFill>
+                      <a:schemeClr val="tx1"/>
+                    </a:solidFill>
+                    <a:latin typeface="+mn-lt"/>
+                    <a:ea typeface="+mn-ea"/>
+                    <a:cs typeface="+mn-cs"/>
+                  </a:defRPr>
+                </a:lvl7pPr>
+                <a:lvl8pPr marL="3429000" indent="-228600" algn="l" defTabSz="914400" rtl="0" eaLnBrk="1" latinLnBrk="0" hangingPunct="1">
+                  <a:lnSpc>
+                    <a:spcPct val="90000"/>
+                  </a:lnSpc>
+                  <a:spcBef>
+                    <a:spcPts val="500"/>
+                  </a:spcBef>
+                  <a:buFont typeface="Arial" panose="020B0604020202020204" pitchFamily="34" charset="0"/>
+                  <a:buChar char="•"/>
+                  <a:defRPr sz="1800" kern="1200">
+                    <a:solidFill>
+                      <a:schemeClr val="tx1"/>
+                    </a:solidFill>
+                    <a:latin typeface="+mn-lt"/>
+                    <a:ea typeface="+mn-ea"/>
+                    <a:cs typeface="+mn-cs"/>
+                  </a:defRPr>
+                </a:lvl8pPr>
+                <a:lvl9pPr marL="3886200" indent="-228600" algn="l" defTabSz="914400" rtl="0" eaLnBrk="1" latinLnBrk="0" hangingPunct="1">
+                  <a:lnSpc>
+                    <a:spcPct val="90000"/>
+                  </a:lnSpc>
+                  <a:spcBef>
+                    <a:spcPts val="500"/>
+                  </a:spcBef>
+                  <a:buFont typeface="Arial" panose="020B0604020202020204" pitchFamily="34" charset="0"/>
+                  <a:buChar char="•"/>
+                  <a:defRPr sz="1800" kern="1200">
+                    <a:solidFill>
+                      <a:schemeClr val="tx1"/>
+                    </a:solidFill>
+                    <a:latin typeface="+mn-lt"/>
+                    <a:ea typeface="+mn-ea"/>
+                    <a:cs typeface="+mn-cs"/>
+                  </a:defRPr>
+                </a:lvl9pPr>
+              </a:lstStyle>
+              <a:p>
+                <a:r>
+                  <a:rPr lang="en-GB" dirty="0"/>
+                  <a:t>Assigns maximum cores available between </a:t>
+                </a:r>
+                <a14:m>
+                  <m:oMath xmlns:m="http://schemas.openxmlformats.org/officeDocument/2006/math">
+                    <m:sSubSup>
+                      <m:sSubSupPr>
+                        <m:ctrlPr>
+                          <a:rPr lang="en-GB" i="1" smtClean="0">
+                            <a:latin typeface="Cambria Math" panose="02040503050406030204" pitchFamily="18" charset="0"/>
+                          </a:rPr>
+                        </m:ctrlPr>
+                      </m:sSubSupPr>
+                      <m:e>
+                        <m:r>
+                          <a:rPr lang="en-GB" i="1" smtClean="0">
+                            <a:latin typeface="Cambria Math" panose="02040503050406030204" pitchFamily="18" charset="0"/>
+                          </a:rPr>
+                          <m:t>𝑠</m:t>
+                        </m:r>
+                      </m:e>
+                      <m:sub>
+                        <m:r>
+                          <a:rPr lang="en-GB" i="1" smtClean="0">
+                            <a:latin typeface="Cambria Math" panose="02040503050406030204" pitchFamily="18" charset="0"/>
+                          </a:rPr>
+                          <m:t>𝑖</m:t>
+                        </m:r>
+                      </m:sub>
+                      <m:sup>
+                        <m:func>
+                          <m:funcPr>
+                            <m:ctrlPr>
+                              <a:rPr lang="en-GB" i="1" smtClean="0">
+                                <a:latin typeface="Cambria Math" panose="02040503050406030204" pitchFamily="18" charset="0"/>
+                              </a:rPr>
+                            </m:ctrlPr>
+                          </m:funcPr>
+                          <m:fName>
+                            <m:r>
+                              <m:rPr>
+                                <m:sty m:val="p"/>
+                              </m:rPr>
+                              <a:rPr lang="en-GB" smtClean="0">
+                                <a:latin typeface="Cambria Math" panose="02040503050406030204" pitchFamily="18" charset="0"/>
+                              </a:rPr>
+                              <m:t>min</m:t>
+                            </m:r>
+                          </m:fName>
+                          <m:e>
+                            <m:r>
+                              <a:rPr lang="en-GB" i="1" smtClean="0">
+                                <a:latin typeface="Cambria Math" panose="02040503050406030204" pitchFamily="18" charset="0"/>
+                              </a:rPr>
+                              <m:t> </m:t>
+                            </m:r>
+                          </m:e>
+                        </m:func>
+                      </m:sup>
+                    </m:sSubSup>
+                  </m:oMath>
+                </a14:m>
+                <a:r>
+                  <a:rPr lang="en-GB" dirty="0"/>
+                  <a:t> and </a:t>
+                </a:r>
+                <a14:m>
+                  <m:oMath xmlns:m="http://schemas.openxmlformats.org/officeDocument/2006/math">
+                    <m:sSubSup>
+                      <m:sSubSupPr>
+                        <m:ctrlPr>
+                          <a:rPr lang="en-GB" i="1" smtClean="0">
+                            <a:latin typeface="Cambria Math" panose="02040503050406030204" pitchFamily="18" charset="0"/>
+                          </a:rPr>
+                        </m:ctrlPr>
+                      </m:sSubSupPr>
+                      <m:e>
+                        <m:r>
+                          <a:rPr lang="en-GB" i="1" smtClean="0">
+                            <a:latin typeface="Cambria Math" panose="02040503050406030204" pitchFamily="18" charset="0"/>
+                          </a:rPr>
+                          <m:t>𝑠</m:t>
+                        </m:r>
+                      </m:e>
+                      <m:sub>
+                        <m:r>
+                          <a:rPr lang="en-GB" i="1" smtClean="0">
+                            <a:latin typeface="Cambria Math" panose="02040503050406030204" pitchFamily="18" charset="0"/>
+                          </a:rPr>
+                          <m:t>𝑖</m:t>
+                        </m:r>
+                      </m:sub>
+                      <m:sup>
+                        <m:func>
+                          <m:funcPr>
+                            <m:ctrlPr>
+                              <a:rPr lang="en-GB" i="1" smtClean="0">
+                                <a:latin typeface="Cambria Math" panose="02040503050406030204" pitchFamily="18" charset="0"/>
+                              </a:rPr>
+                            </m:ctrlPr>
+                          </m:funcPr>
+                          <m:fName>
+                            <m:r>
+                              <m:rPr>
+                                <m:sty m:val="p"/>
+                              </m:rPr>
+                              <a:rPr lang="en-GB" smtClean="0">
+                                <a:latin typeface="Cambria Math" panose="02040503050406030204" pitchFamily="18" charset="0"/>
+                              </a:rPr>
+                              <m:t>max</m:t>
+                            </m:r>
+                          </m:fName>
+                          <m:e>
+                            <m:r>
+                              <a:rPr lang="en-GB" i="1" smtClean="0">
+                                <a:latin typeface="Cambria Math" panose="02040503050406030204" pitchFamily="18" charset="0"/>
+                              </a:rPr>
+                              <m:t> </m:t>
+                            </m:r>
+                          </m:e>
+                        </m:func>
+                      </m:sup>
+                    </m:sSubSup>
+                  </m:oMath>
+                </a14:m>
+                <a:endParaRPr lang="en-GB" dirty="0"/>
+              </a:p>
+            </p:txBody>
+          </p:sp>
+        </mc:Choice>
+        <mc:Fallback>
+          <p:sp>
+            <p:nvSpPr>
+              <p:cNvPr id="6" name="Content Placeholder 2">
+                <a:extLst>
+                  <a:ext uri="{FF2B5EF4-FFF2-40B4-BE49-F238E27FC236}">
+                    <a16:creationId xmlns:a16="http://schemas.microsoft.com/office/drawing/2014/main" id="{F89C5991-21F1-4A12-A760-2F1D6DEAD23E}"/>
+                  </a:ext>
+                </a:extLst>
+              </p:cNvPr>
+              <p:cNvSpPr txBox="1">
+                <a:spLocks noRot="1" noChangeAspect="1" noMove="1" noResize="1" noEditPoints="1" noAdjustHandles="1" noChangeArrowheads="1" noChangeShapeType="1" noTextEdit="1"/>
+              </p:cNvSpPr>
+              <p:nvPr/>
+            </p:nvSpPr>
+            <p:spPr>
+              <a:xfrm>
+                <a:off x="838200" y="2819599"/>
+                <a:ext cx="10515600" cy="609402"/>
+              </a:xfrm>
+              <a:prstGeom prst="rect">
+                <a:avLst/>
+              </a:prstGeom>
+              <a:blipFill>
+                <a:blip r:embed="rId3"/>
+                <a:stretch>
+                  <a:fillRect l="-1043" t="-12000" b="-12000"/>
+                </a:stretch>
+              </a:blipFill>
+            </p:spPr>
+            <p:txBody>
+              <a:bodyPr/>
+              <a:lstStyle/>
+              <a:p>
+                <a:r>
+                  <a:rPr lang="en-GB">
+                    <a:noFill/>
+                  </a:rPr>
+                  <a:t> </a:t>
+                </a:r>
+              </a:p>
+            </p:txBody>
+          </p:sp>
+        </mc:Fallback>
+      </mc:AlternateContent>
     </p:spTree>
     <p:extLst>
       <p:ext uri="{BB962C8B-B14F-4D97-AF65-F5344CB8AC3E}">
@@ -12618,9 +12831,9 @@
                                           </p:stCondLst>
                                         </p:cTn>
                                         <p:tgtEl>
-                                          <p:spTgt spid="3">
+                                          <p:spTgt spid="6">
                                             <p:txEl>
-                                              <p:pRg st="3" end="3"/>
+                                              <p:pRg st="0" end="0"/>
                                             </p:txEl>
                                           </p:spTgt>
                                         </p:tgtEl>
@@ -12664,6 +12877,7 @@
     </p:tnLst>
     <p:bldLst>
       <p:bldP spid="3" grpId="0" uiExpand="1" build="p"/>
+      <p:bldP spid="6" grpId="0" uiExpand="1" build="p"/>
     </p:bldLst>
   </p:timing>
 </p:sld>

</xml_diff>

<commit_message>
Fixed maths in PDF presentation
</commit_message>
<xml_diff>
--- a/Notes/TFM_presentations/2020_02_24_v2/2020_02_24_v2.pptx
+++ b/Notes/TFM_presentations/2020_02_24_v2/2020_02_24_v2.pptx
@@ -223,7 +223,7 @@
           <a:p>
             <a:fld id="{D07E13D9-DB12-424B-A0B8-3D2EDA86849F}" type="datetimeFigureOut">
               <a:rPr lang="en-GB" smtClean="0"/>
-              <a:t>23/02/2020</a:t>
+              <a:t>24/02/2020</a:t>
             </a:fld>
             <a:endParaRPr lang="en-GB" dirty="0"/>
           </a:p>
@@ -6100,7 +6100,7 @@
           <a:p>
             <a:fld id="{E38A22E1-EB92-4D54-BACA-04AA8A92E613}" type="datetime1">
               <a:rPr lang="en-GB" smtClean="0"/>
-              <a:t>23/02/2020</a:t>
+              <a:t>24/02/2020</a:t>
             </a:fld>
             <a:endParaRPr lang="en-GB" dirty="0"/>
           </a:p>
@@ -6317,7 +6317,7 @@
           <a:p>
             <a:fld id="{F7BBACEA-79DB-4B06-B53C-1515C6E9AA2A}" type="datetime1">
               <a:rPr lang="en-GB" smtClean="0"/>
-              <a:t>23/02/2020</a:t>
+              <a:t>24/02/2020</a:t>
             </a:fld>
             <a:endParaRPr lang="en-GB" dirty="0"/>
           </a:p>
@@ -6527,7 +6527,7 @@
           <a:p>
             <a:fld id="{1242A314-3A0B-49C4-ADB0-F8BBA4139E56}" type="datetime1">
               <a:rPr lang="en-GB" smtClean="0"/>
-              <a:t>23/02/2020</a:t>
+              <a:t>24/02/2020</a:t>
             </a:fld>
             <a:endParaRPr lang="en-GB" dirty="0"/>
           </a:p>
@@ -6727,7 +6727,7 @@
           <a:p>
             <a:fld id="{D240987B-0079-4EE9-8A70-14597C3743BC}" type="datetime1">
               <a:rPr lang="en-GB" smtClean="0"/>
-              <a:t>23/02/2020</a:t>
+              <a:t>24/02/2020</a:t>
             </a:fld>
             <a:endParaRPr lang="en-GB" dirty="0"/>
           </a:p>
@@ -7003,7 +7003,7 @@
           <a:p>
             <a:fld id="{9C436FE2-9B88-4810-AC3E-E01CD02C2930}" type="datetime1">
               <a:rPr lang="en-GB" smtClean="0"/>
-              <a:t>23/02/2020</a:t>
+              <a:t>24/02/2020</a:t>
             </a:fld>
             <a:endParaRPr lang="en-GB" dirty="0"/>
           </a:p>
@@ -7271,7 +7271,7 @@
           <a:p>
             <a:fld id="{08368621-535E-44A6-A126-3F2534EA9A7B}" type="datetime1">
               <a:rPr lang="en-GB" smtClean="0"/>
-              <a:t>23/02/2020</a:t>
+              <a:t>24/02/2020</a:t>
             </a:fld>
             <a:endParaRPr lang="en-GB" dirty="0"/>
           </a:p>
@@ -7686,7 +7686,7 @@
           <a:p>
             <a:fld id="{632F5B32-CFB7-415D-9B96-9BE2AE3D1AAC}" type="datetime1">
               <a:rPr lang="en-GB" smtClean="0"/>
-              <a:t>23/02/2020</a:t>
+              <a:t>24/02/2020</a:t>
             </a:fld>
             <a:endParaRPr lang="en-GB" dirty="0"/>
           </a:p>
@@ -7828,7 +7828,7 @@
           <a:p>
             <a:fld id="{C2A51E27-F50C-4FD5-A040-64C12EA57AB4}" type="datetime1">
               <a:rPr lang="en-GB" smtClean="0"/>
-              <a:t>23/02/2020</a:t>
+              <a:t>24/02/2020</a:t>
             </a:fld>
             <a:endParaRPr lang="en-GB" dirty="0"/>
           </a:p>
@@ -7941,7 +7941,7 @@
           <a:p>
             <a:fld id="{A60DBC3F-8614-44B4-9683-36A45BFFB7A1}" type="datetime1">
               <a:rPr lang="en-GB" smtClean="0"/>
-              <a:t>23/02/2020</a:t>
+              <a:t>24/02/2020</a:t>
             </a:fld>
             <a:endParaRPr lang="en-GB" dirty="0"/>
           </a:p>
@@ -8254,7 +8254,7 @@
           <a:p>
             <a:fld id="{23091C06-D056-41B0-9F5F-5E90B83401B6}" type="datetime1">
               <a:rPr lang="en-GB" smtClean="0"/>
-              <a:t>23/02/2020</a:t>
+              <a:t>24/02/2020</a:t>
             </a:fld>
             <a:endParaRPr lang="en-GB" dirty="0"/>
           </a:p>
@@ -8547,7 +8547,7 @@
           <a:p>
             <a:fld id="{119BFB93-9673-43A0-BDFE-39DE919D7FF9}" type="datetime1">
               <a:rPr lang="en-GB" smtClean="0"/>
-              <a:t>23/02/2020</a:t>
+              <a:t>24/02/2020</a:t>
             </a:fld>
             <a:endParaRPr lang="en-GB" dirty="0"/>
           </a:p>
@@ -8845,7 +8845,7 @@
             <a:fld id="{1D06A54C-354E-461C-AA7A-CD74CDD91362}" type="datetime1">
               <a:rPr lang="en-GB" smtClean="0"/>
               <a:pPr/>
-              <a:t>23/02/2020</a:t>
+              <a:t>24/02/2020</a:t>
             </a:fld>
             <a:endParaRPr lang="en-GB" dirty="0"/>
           </a:p>
@@ -12236,7 +12236,12 @@
             <p:ph idx="1"/>
           </p:nvPr>
         </p:nvSpPr>
-        <p:spPr/>
+        <p:spPr>
+          <a:xfrm>
+            <a:off x="838200" y="1596045"/>
+            <a:ext cx="10515600" cy="1356162"/>
+          </a:xfrm>
+        </p:spPr>
         <p:txBody>
           <a:bodyPr/>
           <a:lstStyle/>
@@ -12291,8 +12296,8 @@
           </a:p>
         </p:txBody>
       </p:sp>
-      <mc:AlternateContent xmlns:mc="http://schemas.openxmlformats.org/markup-compatibility/2006">
-        <mc:Choice xmlns:a14="http://schemas.microsoft.com/office/drawing/2010/main" Requires="a14">
+      <mc:AlternateContent xmlns:mc="http://schemas.openxmlformats.org/markup-compatibility/2006" xmlns:a14="http://schemas.microsoft.com/office/drawing/2010/main">
+        <mc:Choice Requires="a14">
           <p:sp>
             <p:nvSpPr>
               <p:cNvPr id="6" name="Content Placeholder 2">
@@ -12631,7 +12636,7 @@
             </p:txBody>
           </p:sp>
         </mc:Choice>
-        <mc:Fallback>
+        <mc:Fallback xmlns="">
           <p:sp>
             <p:nvSpPr>
               <p:cNvPr id="6" name="Content Placeholder 2">
@@ -12831,11 +12836,7 @@
                                           </p:stCondLst>
                                         </p:cTn>
                                         <p:tgtEl>
-                                          <p:spTgt spid="6">
-                                            <p:txEl>
-                                              <p:pRg st="0" end="0"/>
-                                            </p:txEl>
-                                          </p:spTgt>
+                                          <p:spTgt spid="6"/>
                                         </p:tgtEl>
                                         <p:attrNameLst>
                                           <p:attrName>style.visibility</p:attrName>
@@ -12877,7 +12878,7 @@
     </p:tnLst>
     <p:bldLst>
       <p:bldP spid="3" grpId="0" uiExpand="1" build="p"/>
-      <p:bldP spid="6" grpId="0" uiExpand="1" build="p"/>
+      <p:bldP spid="6" grpId="0"/>
     </p:bldLst>
   </p:timing>
 </p:sld>

</xml_diff>